<commit_message>
Update 2.2 Event Loop PP
</commit_message>
<xml_diff>
--- a/Programming 4/02.2 Event Loops/02.2 Event Loops.pptx
+++ b/Programming 4/02.2 Event Loops/02.2 Event Loops.pptx
@@ -5,7 +5,7 @@
     <p:sldMasterId id="2147483648" r:id="rId1"/>
   </p:sldMasterIdLst>
   <p:notesMasterIdLst>
-    <p:notesMasterId r:id="rId28"/>
+    <p:notesMasterId r:id="rId25"/>
   </p:notesMasterIdLst>
   <p:sldIdLst>
     <p:sldId id="257" r:id="rId2"/>
@@ -18,22 +18,19 @@
     <p:sldId id="264" r:id="rId9"/>
     <p:sldId id="265" r:id="rId10"/>
     <p:sldId id="266" r:id="rId11"/>
-    <p:sldId id="267" r:id="rId12"/>
-    <p:sldId id="268" r:id="rId13"/>
-    <p:sldId id="269" r:id="rId14"/>
-    <p:sldId id="270" r:id="rId15"/>
-    <p:sldId id="271" r:id="rId16"/>
-    <p:sldId id="272" r:id="rId17"/>
-    <p:sldId id="273" r:id="rId18"/>
-    <p:sldId id="274" r:id="rId19"/>
-    <p:sldId id="275" r:id="rId20"/>
-    <p:sldId id="276" r:id="rId21"/>
-    <p:sldId id="277" r:id="rId22"/>
-    <p:sldId id="278" r:id="rId23"/>
-    <p:sldId id="279" r:id="rId24"/>
-    <p:sldId id="280" r:id="rId25"/>
-    <p:sldId id="281" r:id="rId26"/>
-    <p:sldId id="282" r:id="rId27"/>
+    <p:sldId id="283" r:id="rId12"/>
+    <p:sldId id="267" r:id="rId13"/>
+    <p:sldId id="268" r:id="rId14"/>
+    <p:sldId id="269" r:id="rId15"/>
+    <p:sldId id="270" r:id="rId16"/>
+    <p:sldId id="284" r:id="rId17"/>
+    <p:sldId id="285" r:id="rId18"/>
+    <p:sldId id="272" r:id="rId19"/>
+    <p:sldId id="273" r:id="rId20"/>
+    <p:sldId id="278" r:id="rId21"/>
+    <p:sldId id="279" r:id="rId22"/>
+    <p:sldId id="280" r:id="rId23"/>
+    <p:sldId id="286" r:id="rId24"/>
   </p:sldIdLst>
   <p:sldSz cx="9144000" cy="6858000" type="screen4x3"/>
   <p:notesSz cx="6858000" cy="9144000"/>
@@ -233,7 +230,7 @@
           <a:p>
             <a:fld id="{0C56B87A-A3BD-4348-9EBB-BDD19D6CE714}" type="datetimeFigureOut">
               <a:rPr lang="en-US" smtClean="0"/>
-              <a:t>7/31/19</a:t>
+              <a:t>8/1/2019</a:t>
             </a:fld>
             <a:endParaRPr lang="en-US"/>
           </a:p>
@@ -549,6 +546,65 @@
               <a:buFont typeface="Arial" charset="0"/>
               <a:buChar char="•"/>
             </a:pPr>
+            <a:r>
+              <a:rPr lang="en-US" dirty="0" smtClean="0"/>
+              <a:t>Most games have the same</a:t>
+            </a:r>
+            <a:r>
+              <a:rPr lang="en-US" baseline="0" dirty="0" smtClean="0"/>
+              <a:t> underlying structure</a:t>
+            </a:r>
+          </a:p>
+          <a:p>
+            <a:pPr marL="171450" indent="-171450">
+              <a:buFont typeface="Arial" charset="0"/>
+              <a:buChar char="•"/>
+            </a:pPr>
+            <a:endParaRPr lang="en-US" baseline="0" dirty="0" smtClean="0"/>
+          </a:p>
+          <a:p>
+            <a:pPr marL="171450" indent="-171450">
+              <a:buFont typeface="Arial" charset="0"/>
+              <a:buChar char="•"/>
+            </a:pPr>
+            <a:r>
+              <a:rPr lang="en-US" baseline="0" dirty="0" smtClean="0"/>
+              <a:t>Wait for input, update state and display state</a:t>
+            </a:r>
+          </a:p>
+          <a:p>
+            <a:pPr marL="171450" indent="-171450">
+              <a:buFont typeface="Arial" charset="0"/>
+              <a:buChar char="•"/>
+            </a:pPr>
+            <a:endParaRPr lang="en-US" baseline="0" dirty="0" smtClean="0"/>
+          </a:p>
+          <a:p>
+            <a:pPr marL="171450" indent="-171450">
+              <a:buFont typeface="Arial" charset="0"/>
+              <a:buChar char="•"/>
+            </a:pPr>
+            <a:r>
+              <a:rPr lang="en-US" baseline="0" dirty="0" smtClean="0"/>
+              <a:t>Input is generally done by the user, although the game state may also change due to game events or triggers – example in Sim City residents abandon a building if the crime rate is too high – this happens when a user doesn’t do anything</a:t>
+            </a:r>
+          </a:p>
+          <a:p>
+            <a:pPr marL="171450" indent="-171450">
+              <a:buFont typeface="Arial" charset="0"/>
+              <a:buChar char="•"/>
+            </a:pPr>
+            <a:endParaRPr lang="en-US" baseline="0" dirty="0" smtClean="0"/>
+          </a:p>
+          <a:p>
+            <a:pPr marL="171450" indent="-171450">
+              <a:buFont typeface="Arial" charset="0"/>
+              <a:buChar char="•"/>
+            </a:pPr>
+            <a:r>
+              <a:rPr lang="en-US" baseline="0" dirty="0" smtClean="0"/>
+              <a:t>In games, this often called the event loop or game cycle</a:t>
+            </a:r>
             <a:endParaRPr lang="en-US" dirty="0"/>
           </a:p>
         </p:txBody>
@@ -637,7 +693,48 @@
               <a:buFont typeface="Arial" charset="0"/>
               <a:buChar char="•"/>
             </a:pPr>
-            <a:endParaRPr lang="en-US" dirty="0"/>
+            <a:r>
+              <a:rPr lang="en-US" dirty="0" smtClean="0"/>
+              <a:t>The first step</a:t>
+            </a:r>
+            <a:r>
+              <a:rPr lang="en-US" baseline="0" dirty="0" smtClean="0"/>
+              <a:t> in any OO task is to think about what classes do I need</a:t>
+            </a:r>
+          </a:p>
+          <a:p>
+            <a:pPr marL="171450" indent="-171450">
+              <a:buFont typeface="Arial" charset="0"/>
+              <a:buChar char="•"/>
+            </a:pPr>
+            <a:endParaRPr lang="en-US" baseline="0" dirty="0" smtClean="0"/>
+          </a:p>
+          <a:p>
+            <a:pPr marL="171450" indent="-171450">
+              <a:buFont typeface="Arial" charset="0"/>
+              <a:buChar char="•"/>
+            </a:pPr>
+            <a:r>
+              <a:rPr lang="en-US" baseline="0" dirty="0" smtClean="0"/>
+              <a:t>For this practical, we will use Gnome and GnomeFamily</a:t>
+            </a:r>
+          </a:p>
+          <a:p>
+            <a:pPr marL="171450" indent="-171450">
+              <a:buFont typeface="Arial" charset="0"/>
+              <a:buChar char="•"/>
+            </a:pPr>
+            <a:endParaRPr lang="en-US" baseline="0" dirty="0" smtClean="0"/>
+          </a:p>
+          <a:p>
+            <a:pPr marL="171450" indent="-171450">
+              <a:buFont typeface="Arial" charset="0"/>
+              <a:buChar char="•"/>
+            </a:pPr>
+            <a:r>
+              <a:rPr lang="en-US" baseline="0" dirty="0" smtClean="0"/>
+              <a:t>Display, user input and game cycle are handled by the Form class</a:t>
+            </a:r>
           </a:p>
         </p:txBody>
       </p:sp>
@@ -667,7 +764,7 @@
     </p:spTree>
     <p:extLst>
       <p:ext uri="{BB962C8B-B14F-4D97-AF65-F5344CB8AC3E}">
-        <p14:creationId xmlns:p14="http://schemas.microsoft.com/office/powerpoint/2010/main" val="1963754339"/>
+        <p14:creationId xmlns:p14="http://schemas.microsoft.com/office/powerpoint/2010/main" val="790517489"/>
       </p:ext>
     </p:extLst>
   </p:cSld>
@@ -755,7 +852,7 @@
     </p:spTree>
     <p:extLst>
       <p:ext uri="{BB962C8B-B14F-4D97-AF65-F5344CB8AC3E}">
-        <p14:creationId xmlns:p14="http://schemas.microsoft.com/office/powerpoint/2010/main" val="2119125247"/>
+        <p14:creationId xmlns:p14="http://schemas.microsoft.com/office/powerpoint/2010/main" val="1963754339"/>
       </p:ext>
     </p:extLst>
   </p:cSld>
@@ -843,7 +940,7 @@
     </p:spTree>
     <p:extLst>
       <p:ext uri="{BB962C8B-B14F-4D97-AF65-F5344CB8AC3E}">
-        <p14:creationId xmlns:p14="http://schemas.microsoft.com/office/powerpoint/2010/main" val="1746250946"/>
+        <p14:creationId xmlns:p14="http://schemas.microsoft.com/office/powerpoint/2010/main" val="2119125247"/>
       </p:ext>
     </p:extLst>
   </p:cSld>
@@ -931,7 +1028,7 @@
     </p:spTree>
     <p:extLst>
       <p:ext uri="{BB962C8B-B14F-4D97-AF65-F5344CB8AC3E}">
-        <p14:creationId xmlns:p14="http://schemas.microsoft.com/office/powerpoint/2010/main" val="2048055926"/>
+        <p14:creationId xmlns:p14="http://schemas.microsoft.com/office/powerpoint/2010/main" val="1746250946"/>
       </p:ext>
     </p:extLst>
   </p:cSld>
@@ -1019,7 +1116,7 @@
     </p:spTree>
     <p:extLst>
       <p:ext uri="{BB962C8B-B14F-4D97-AF65-F5344CB8AC3E}">
-        <p14:creationId xmlns:p14="http://schemas.microsoft.com/office/powerpoint/2010/main" val="1001992516"/>
+        <p14:creationId xmlns:p14="http://schemas.microsoft.com/office/powerpoint/2010/main" val="2048055926"/>
       </p:ext>
     </p:extLst>
   </p:cSld>
@@ -1107,7 +1204,7 @@
     </p:spTree>
     <p:extLst>
       <p:ext uri="{BB962C8B-B14F-4D97-AF65-F5344CB8AC3E}">
-        <p14:creationId xmlns:p14="http://schemas.microsoft.com/office/powerpoint/2010/main" val="1909525249"/>
+        <p14:creationId xmlns:p14="http://schemas.microsoft.com/office/powerpoint/2010/main" val="511963336"/>
       </p:ext>
     </p:extLst>
   </p:cSld>
@@ -1165,6 +1262,10 @@
               <a:buFont typeface="Arial" charset="0"/>
               <a:buChar char="•"/>
             </a:pPr>
+            <a:r>
+              <a:rPr lang="en-US" dirty="0" smtClean="0"/>
+              <a:t>Make sure you use constant – my example is bad</a:t>
+            </a:r>
             <a:endParaRPr lang="en-US" dirty="0"/>
           </a:p>
         </p:txBody>
@@ -1195,7 +1296,7 @@
     </p:spTree>
     <p:extLst>
       <p:ext uri="{BB962C8B-B14F-4D97-AF65-F5344CB8AC3E}">
-        <p14:creationId xmlns:p14="http://schemas.microsoft.com/office/powerpoint/2010/main" val="1231956476"/>
+        <p14:creationId xmlns:p14="http://schemas.microsoft.com/office/powerpoint/2010/main" val="3888085404"/>
       </p:ext>
     </p:extLst>
   </p:cSld>
@@ -1253,6 +1354,105 @@
               <a:buFont typeface="Arial" charset="0"/>
               <a:buChar char="•"/>
             </a:pPr>
+            <a:r>
+              <a:rPr lang="en-US" dirty="0" smtClean="0"/>
+              <a:t>This is the Visual C++ way of creating arrays</a:t>
+            </a:r>
+          </a:p>
+          <a:p>
+            <a:pPr marL="171450" indent="-171450">
+              <a:buFont typeface="Arial" charset="0"/>
+              <a:buChar char="•"/>
+            </a:pPr>
+            <a:endParaRPr lang="en-US" dirty="0" smtClean="0"/>
+          </a:p>
+          <a:p>
+            <a:pPr marL="171450" indent="-171450">
+              <a:buFont typeface="Arial" charset="0"/>
+              <a:buChar char="•"/>
+            </a:pPr>
+            <a:r>
+              <a:rPr lang="en-US" dirty="0" smtClean="0"/>
+              <a:t>This</a:t>
+            </a:r>
+            <a:r>
+              <a:rPr lang="en-US" baseline="0" dirty="0" smtClean="0"/>
+              <a:t> syntax is odd but you will get use to it</a:t>
+            </a:r>
+          </a:p>
+          <a:p>
+            <a:pPr marL="171450" indent="-171450">
+              <a:buFont typeface="Arial" charset="0"/>
+              <a:buChar char="•"/>
+            </a:pPr>
+            <a:endParaRPr lang="en-US" baseline="0" dirty="0" smtClean="0"/>
+          </a:p>
+          <a:p>
+            <a:pPr marL="171450" indent="-171450">
+              <a:buFont typeface="Arial" charset="0"/>
+              <a:buChar char="•"/>
+            </a:pPr>
+            <a:r>
+              <a:rPr lang="en-US" baseline="0" dirty="0" smtClean="0"/>
+              <a:t>After you have created this, intArray is used like a regular array</a:t>
+            </a:r>
+          </a:p>
+          <a:p>
+            <a:pPr marL="171450" indent="-171450">
+              <a:buFont typeface="Arial" charset="0"/>
+              <a:buChar char="•"/>
+            </a:pPr>
+            <a:endParaRPr lang="en-US" baseline="0" dirty="0" smtClean="0"/>
+          </a:p>
+          <a:p>
+            <a:pPr marL="171450" indent="-171450">
+              <a:buFont typeface="Arial" charset="0"/>
+              <a:buChar char="•"/>
+            </a:pPr>
+            <a:r>
+              <a:rPr lang="en-US" baseline="0" dirty="0" smtClean="0"/>
+              <a:t>“intArray is a pointer to an array of integers”</a:t>
+            </a:r>
+          </a:p>
+          <a:p>
+            <a:pPr marL="171450" indent="-171450">
+              <a:buFont typeface="Arial" charset="0"/>
+              <a:buChar char="•"/>
+            </a:pPr>
+            <a:endParaRPr lang="en-US" baseline="0" dirty="0" smtClean="0"/>
+          </a:p>
+          <a:p>
+            <a:pPr marL="171450" indent="-171450">
+              <a:buFont typeface="Arial" charset="0"/>
+              <a:buChar char="•"/>
+            </a:pPr>
+            <a:r>
+              <a:rPr lang="en-US" baseline="0" dirty="0" smtClean="0"/>
+              <a:t>Allocate enough space for an array of 5 integers, and pointing intArray at it</a:t>
+            </a:r>
+          </a:p>
+          <a:p>
+            <a:pPr marL="171450" indent="-171450">
+              <a:buFont typeface="Arial" charset="0"/>
+              <a:buChar char="•"/>
+            </a:pPr>
+            <a:endParaRPr lang="en-US" baseline="0" dirty="0" smtClean="0"/>
+          </a:p>
+          <a:p>
+            <a:pPr marL="171450" indent="-171450">
+              <a:buFont typeface="Arial" charset="0"/>
+              <a:buChar char="•"/>
+            </a:pPr>
+            <a:r>
+              <a:rPr lang="en-US" baseline="0" dirty="0" smtClean="0"/>
+              <a:t>Set intArray’s value to start of that memory</a:t>
+            </a:r>
+          </a:p>
+          <a:p>
+            <a:pPr marL="171450" indent="-171450">
+              <a:buFont typeface="Arial" charset="0"/>
+              <a:buChar char="•"/>
+            </a:pPr>
             <a:endParaRPr lang="en-US" dirty="0"/>
           </a:p>
         </p:txBody>
@@ -1283,7 +1483,7 @@
     </p:spTree>
     <p:extLst>
       <p:ext uri="{BB962C8B-B14F-4D97-AF65-F5344CB8AC3E}">
-        <p14:creationId xmlns:p14="http://schemas.microsoft.com/office/powerpoint/2010/main" val="2022263161"/>
+        <p14:creationId xmlns:p14="http://schemas.microsoft.com/office/powerpoint/2010/main" val="1909525249"/>
       </p:ext>
     </p:extLst>
   </p:cSld>
@@ -1371,7 +1571,7 @@
     </p:spTree>
     <p:extLst>
       <p:ext uri="{BB962C8B-B14F-4D97-AF65-F5344CB8AC3E}">
-        <p14:creationId xmlns:p14="http://schemas.microsoft.com/office/powerpoint/2010/main" val="518290208"/>
+        <p14:creationId xmlns:p14="http://schemas.microsoft.com/office/powerpoint/2010/main" val="1231956476"/>
       </p:ext>
     </p:extLst>
   </p:cSld>
@@ -1459,7 +1659,7 @@
     </p:spTree>
     <p:extLst>
       <p:ext uri="{BB962C8B-B14F-4D97-AF65-F5344CB8AC3E}">
-        <p14:creationId xmlns:p14="http://schemas.microsoft.com/office/powerpoint/2010/main" val="818881943"/>
+        <p14:creationId xmlns:p14="http://schemas.microsoft.com/office/powerpoint/2010/main" val="1452612544"/>
       </p:ext>
     </p:extLst>
   </p:cSld>
@@ -1517,6 +1717,90 @@
               <a:buFont typeface="Arial" charset="0"/>
               <a:buChar char="•"/>
             </a:pPr>
+            <a:r>
+              <a:rPr lang="en-US" dirty="0" smtClean="0"/>
+              <a:t>Image source: https://bit.ly/2LUc0Du</a:t>
+            </a:r>
+          </a:p>
+          <a:p>
+            <a:pPr marL="171450" indent="-171450">
+              <a:buFont typeface="Arial" charset="0"/>
+              <a:buChar char="•"/>
+            </a:pPr>
+            <a:endParaRPr lang="en-US" dirty="0" smtClean="0"/>
+          </a:p>
+          <a:p>
+            <a:pPr marL="171450" indent="-171450">
+              <a:buFont typeface="Arial" charset="0"/>
+              <a:buChar char="•"/>
+            </a:pPr>
+            <a:r>
+              <a:rPr lang="en-US" dirty="0" smtClean="0"/>
+              <a:t>In Breakout,</a:t>
+            </a:r>
+            <a:r>
+              <a:rPr lang="en-US" baseline="0" dirty="0" smtClean="0"/>
+              <a:t> the ball moves constantly</a:t>
+            </a:r>
+          </a:p>
+          <a:p>
+            <a:pPr marL="171450" indent="-171450">
+              <a:buFont typeface="Arial" charset="0"/>
+              <a:buChar char="•"/>
+            </a:pPr>
+            <a:endParaRPr lang="en-US" baseline="0" dirty="0" smtClean="0"/>
+          </a:p>
+          <a:p>
+            <a:pPr marL="171450" indent="-171450">
+              <a:buFont typeface="Arial" charset="0"/>
+              <a:buChar char="•"/>
+            </a:pPr>
+            <a:r>
+              <a:rPr lang="en-US" baseline="0" dirty="0" smtClean="0"/>
+              <a:t>The player uses the arrow or </a:t>
+            </a:r>
+            <a:r>
+              <a:rPr lang="en-US" baseline="0" dirty="0" err="1" smtClean="0"/>
+              <a:t>aswd</a:t>
+            </a:r>
+            <a:r>
+              <a:rPr lang="en-US" baseline="0" dirty="0" smtClean="0"/>
+              <a:t> keys to move the paddle along the bottom of the screen</a:t>
+            </a:r>
+          </a:p>
+          <a:p>
+            <a:pPr marL="171450" indent="-171450">
+              <a:buFont typeface="Arial" charset="0"/>
+              <a:buChar char="•"/>
+            </a:pPr>
+            <a:endParaRPr lang="en-US" baseline="0" dirty="0" smtClean="0"/>
+          </a:p>
+          <a:p>
+            <a:pPr marL="171450" indent="-171450">
+              <a:buFont typeface="Arial" charset="0"/>
+              <a:buChar char="•"/>
+            </a:pPr>
+            <a:r>
+              <a:rPr lang="en-US" baseline="0" dirty="0" smtClean="0"/>
+              <a:t>If the ball hits the paddle it bounces off</a:t>
+            </a:r>
+          </a:p>
+          <a:p>
+            <a:pPr marL="171450" indent="-171450">
+              <a:buFont typeface="Arial" charset="0"/>
+              <a:buChar char="•"/>
+            </a:pPr>
+            <a:endParaRPr lang="en-US" baseline="0" dirty="0" smtClean="0"/>
+          </a:p>
+          <a:p>
+            <a:pPr marL="171450" indent="-171450">
+              <a:buFont typeface="Arial" charset="0"/>
+              <a:buChar char="•"/>
+            </a:pPr>
+            <a:r>
+              <a:rPr lang="en-US" baseline="0" dirty="0" smtClean="0"/>
+              <a:t>If the balls hits a brick at the top of the screen, the brick is destroyed and the ball bounces off </a:t>
+            </a:r>
             <a:endParaRPr lang="en-US" dirty="0"/>
           </a:p>
         </p:txBody>
@@ -1635,7 +1919,7 @@
     </p:spTree>
     <p:extLst>
       <p:ext uri="{BB962C8B-B14F-4D97-AF65-F5344CB8AC3E}">
-        <p14:creationId xmlns:p14="http://schemas.microsoft.com/office/powerpoint/2010/main" val="1143746214"/>
+        <p14:creationId xmlns:p14="http://schemas.microsoft.com/office/powerpoint/2010/main" val="1830694159"/>
       </p:ext>
     </p:extLst>
   </p:cSld>
@@ -1723,7 +2007,7 @@
     </p:spTree>
     <p:extLst>
       <p:ext uri="{BB962C8B-B14F-4D97-AF65-F5344CB8AC3E}">
-        <p14:creationId xmlns:p14="http://schemas.microsoft.com/office/powerpoint/2010/main" val="1452612544"/>
+        <p14:creationId xmlns:p14="http://schemas.microsoft.com/office/powerpoint/2010/main" val="1141692383"/>
       </p:ext>
     </p:extLst>
   </p:cSld>
@@ -1781,6 +2065,14 @@
               <a:buFont typeface="Arial" charset="0"/>
               <a:buChar char="•"/>
             </a:pPr>
+            <a:r>
+              <a:rPr lang="en-US" dirty="0" smtClean="0"/>
+              <a:t>Timer</a:t>
+            </a:r>
+            <a:r>
+              <a:rPr lang="en-US" baseline="0" dirty="0" smtClean="0"/>
+              <a:t> event is the game cycle – we check and update state, then redraw</a:t>
+            </a:r>
             <a:endParaRPr lang="en-US" dirty="0"/>
           </a:p>
         </p:txBody>
@@ -1811,271 +2103,7 @@
     </p:spTree>
     <p:extLst>
       <p:ext uri="{BB962C8B-B14F-4D97-AF65-F5344CB8AC3E}">
-        <p14:creationId xmlns:p14="http://schemas.microsoft.com/office/powerpoint/2010/main" val="1830694159"/>
-      </p:ext>
-    </p:extLst>
-  </p:cSld>
-  <p:clrMapOvr>
-    <a:masterClrMapping/>
-  </p:clrMapOvr>
-</p:notes>
-</file>
-
-<file path=ppt/notesSlides/notesSlide23.xml><?xml version="1.0" encoding="utf-8"?>
-<p:notes xmlns:a="http://schemas.openxmlformats.org/drawingml/2006/main" xmlns:r="http://schemas.openxmlformats.org/officeDocument/2006/relationships" xmlns:p="http://schemas.openxmlformats.org/presentationml/2006/main">
-  <p:cSld>
-    <p:spTree>
-      <p:nvGrpSpPr>
-        <p:cNvPr id="1" name=""/>
-        <p:cNvGrpSpPr/>
-        <p:nvPr/>
-      </p:nvGrpSpPr>
-      <p:grpSpPr>
-        <a:xfrm>
-          <a:off x="0" y="0"/>
-          <a:ext cx="0" cy="0"/>
-          <a:chOff x="0" y="0"/>
-          <a:chExt cx="0" cy="0"/>
-        </a:xfrm>
-      </p:grpSpPr>
-      <p:sp>
-        <p:nvSpPr>
-          <p:cNvPr id="2" name="Slide Image Placeholder 1"/>
-          <p:cNvSpPr>
-            <a:spLocks noGrp="1" noRot="1" noChangeAspect="1"/>
-          </p:cNvSpPr>
-          <p:nvPr>
-            <p:ph type="sldImg"/>
-          </p:nvPr>
-        </p:nvSpPr>
-        <p:spPr/>
-      </p:sp>
-      <p:sp>
-        <p:nvSpPr>
-          <p:cNvPr id="3" name="Notes Placeholder 2"/>
-          <p:cNvSpPr>
-            <a:spLocks noGrp="1"/>
-          </p:cNvSpPr>
-          <p:nvPr>
-            <p:ph type="body" idx="1"/>
-          </p:nvPr>
-        </p:nvSpPr>
-        <p:spPr/>
-        <p:txBody>
-          <a:bodyPr/>
-          <a:lstStyle/>
-          <a:p>
-            <a:pPr marL="171450" indent="-171450">
-              <a:buFont typeface="Arial" charset="0"/>
-              <a:buChar char="•"/>
-            </a:pPr>
-            <a:endParaRPr lang="en-US" dirty="0"/>
-          </a:p>
-        </p:txBody>
-      </p:sp>
-      <p:sp>
-        <p:nvSpPr>
-          <p:cNvPr id="4" name="Slide Number Placeholder 3"/>
-          <p:cNvSpPr>
-            <a:spLocks noGrp="1"/>
-          </p:cNvSpPr>
-          <p:nvPr>
-            <p:ph type="sldNum" sz="quarter" idx="10"/>
-          </p:nvPr>
-        </p:nvSpPr>
-        <p:spPr/>
-        <p:txBody>
-          <a:bodyPr/>
-          <a:lstStyle/>
-          <a:p>
-            <a:fld id="{5FA57C19-9E0E-4142-AAC1-12A23B691F36}" type="slidenum">
-              <a:rPr lang="en-US" smtClean="0"/>
-              <a:t>24</a:t>
-            </a:fld>
-            <a:endParaRPr lang="en-US"/>
-          </a:p>
-        </p:txBody>
-      </p:sp>
-    </p:spTree>
-    <p:extLst>
-      <p:ext uri="{BB962C8B-B14F-4D97-AF65-F5344CB8AC3E}">
-        <p14:creationId xmlns:p14="http://schemas.microsoft.com/office/powerpoint/2010/main" val="1141692383"/>
-      </p:ext>
-    </p:extLst>
-  </p:cSld>
-  <p:clrMapOvr>
-    <a:masterClrMapping/>
-  </p:clrMapOvr>
-</p:notes>
-</file>
-
-<file path=ppt/notesSlides/notesSlide24.xml><?xml version="1.0" encoding="utf-8"?>
-<p:notes xmlns:a="http://schemas.openxmlformats.org/drawingml/2006/main" xmlns:r="http://schemas.openxmlformats.org/officeDocument/2006/relationships" xmlns:p="http://schemas.openxmlformats.org/presentationml/2006/main">
-  <p:cSld>
-    <p:spTree>
-      <p:nvGrpSpPr>
-        <p:cNvPr id="1" name=""/>
-        <p:cNvGrpSpPr/>
-        <p:nvPr/>
-      </p:nvGrpSpPr>
-      <p:grpSpPr>
-        <a:xfrm>
-          <a:off x="0" y="0"/>
-          <a:ext cx="0" cy="0"/>
-          <a:chOff x="0" y="0"/>
-          <a:chExt cx="0" cy="0"/>
-        </a:xfrm>
-      </p:grpSpPr>
-      <p:sp>
-        <p:nvSpPr>
-          <p:cNvPr id="2" name="Slide Image Placeholder 1"/>
-          <p:cNvSpPr>
-            <a:spLocks noGrp="1" noRot="1" noChangeAspect="1"/>
-          </p:cNvSpPr>
-          <p:nvPr>
-            <p:ph type="sldImg"/>
-          </p:nvPr>
-        </p:nvSpPr>
-        <p:spPr/>
-      </p:sp>
-      <p:sp>
-        <p:nvSpPr>
-          <p:cNvPr id="3" name="Notes Placeholder 2"/>
-          <p:cNvSpPr>
-            <a:spLocks noGrp="1"/>
-          </p:cNvSpPr>
-          <p:nvPr>
-            <p:ph type="body" idx="1"/>
-          </p:nvPr>
-        </p:nvSpPr>
-        <p:spPr/>
-        <p:txBody>
-          <a:bodyPr/>
-          <a:lstStyle/>
-          <a:p>
-            <a:pPr marL="171450" indent="-171450">
-              <a:buFont typeface="Arial" charset="0"/>
-              <a:buChar char="•"/>
-            </a:pPr>
-            <a:endParaRPr lang="en-US" dirty="0"/>
-          </a:p>
-        </p:txBody>
-      </p:sp>
-      <p:sp>
-        <p:nvSpPr>
-          <p:cNvPr id="4" name="Slide Number Placeholder 3"/>
-          <p:cNvSpPr>
-            <a:spLocks noGrp="1"/>
-          </p:cNvSpPr>
-          <p:nvPr>
-            <p:ph type="sldNum" sz="quarter" idx="10"/>
-          </p:nvPr>
-        </p:nvSpPr>
-        <p:spPr/>
-        <p:txBody>
-          <a:bodyPr/>
-          <a:lstStyle/>
-          <a:p>
-            <a:fld id="{5FA57C19-9E0E-4142-AAC1-12A23B691F36}" type="slidenum">
-              <a:rPr lang="en-US" smtClean="0"/>
-              <a:t>25</a:t>
-            </a:fld>
-            <a:endParaRPr lang="en-US"/>
-          </a:p>
-        </p:txBody>
-      </p:sp>
-    </p:spTree>
-    <p:extLst>
-      <p:ext uri="{BB962C8B-B14F-4D97-AF65-F5344CB8AC3E}">
-        <p14:creationId xmlns:p14="http://schemas.microsoft.com/office/powerpoint/2010/main" val="1717386937"/>
-      </p:ext>
-    </p:extLst>
-  </p:cSld>
-  <p:clrMapOvr>
-    <a:masterClrMapping/>
-  </p:clrMapOvr>
-</p:notes>
-</file>
-
-<file path=ppt/notesSlides/notesSlide25.xml><?xml version="1.0" encoding="utf-8"?>
-<p:notes xmlns:a="http://schemas.openxmlformats.org/drawingml/2006/main" xmlns:r="http://schemas.openxmlformats.org/officeDocument/2006/relationships" xmlns:p="http://schemas.openxmlformats.org/presentationml/2006/main">
-  <p:cSld>
-    <p:spTree>
-      <p:nvGrpSpPr>
-        <p:cNvPr id="1" name=""/>
-        <p:cNvGrpSpPr/>
-        <p:nvPr/>
-      </p:nvGrpSpPr>
-      <p:grpSpPr>
-        <a:xfrm>
-          <a:off x="0" y="0"/>
-          <a:ext cx="0" cy="0"/>
-          <a:chOff x="0" y="0"/>
-          <a:chExt cx="0" cy="0"/>
-        </a:xfrm>
-      </p:grpSpPr>
-      <p:sp>
-        <p:nvSpPr>
-          <p:cNvPr id="2" name="Slide Image Placeholder 1"/>
-          <p:cNvSpPr>
-            <a:spLocks noGrp="1" noRot="1" noChangeAspect="1"/>
-          </p:cNvSpPr>
-          <p:nvPr>
-            <p:ph type="sldImg"/>
-          </p:nvPr>
-        </p:nvSpPr>
-        <p:spPr/>
-      </p:sp>
-      <p:sp>
-        <p:nvSpPr>
-          <p:cNvPr id="3" name="Notes Placeholder 2"/>
-          <p:cNvSpPr>
-            <a:spLocks noGrp="1"/>
-          </p:cNvSpPr>
-          <p:nvPr>
-            <p:ph type="body" idx="1"/>
-          </p:nvPr>
-        </p:nvSpPr>
-        <p:spPr/>
-        <p:txBody>
-          <a:bodyPr/>
-          <a:lstStyle/>
-          <a:p>
-            <a:pPr marL="171450" indent="-171450">
-              <a:buFont typeface="Arial" charset="0"/>
-              <a:buChar char="•"/>
-            </a:pPr>
-            <a:endParaRPr lang="en-US" dirty="0"/>
-          </a:p>
-        </p:txBody>
-      </p:sp>
-      <p:sp>
-        <p:nvSpPr>
-          <p:cNvPr id="4" name="Slide Number Placeholder 3"/>
-          <p:cNvSpPr>
-            <a:spLocks noGrp="1"/>
-          </p:cNvSpPr>
-          <p:nvPr>
-            <p:ph type="sldNum" sz="quarter" idx="10"/>
-          </p:nvPr>
-        </p:nvSpPr>
-        <p:spPr/>
-        <p:txBody>
-          <a:bodyPr/>
-          <a:lstStyle/>
-          <a:p>
-            <a:fld id="{5FA57C19-9E0E-4142-AAC1-12A23B691F36}" type="slidenum">
-              <a:rPr lang="en-US" smtClean="0"/>
-              <a:t>26</a:t>
-            </a:fld>
-            <a:endParaRPr lang="en-US"/>
-          </a:p>
-        </p:txBody>
-      </p:sp>
-    </p:spTree>
-    <p:extLst>
-      <p:ext uri="{BB962C8B-B14F-4D97-AF65-F5344CB8AC3E}">
-        <p14:creationId xmlns:p14="http://schemas.microsoft.com/office/powerpoint/2010/main" val="169537800"/>
+        <p14:creationId xmlns:p14="http://schemas.microsoft.com/office/powerpoint/2010/main" val="752438484"/>
       </p:ext>
     </p:extLst>
   </p:cSld>
@@ -2133,6 +2161,31 @@
               <a:buFont typeface="Arial" charset="0"/>
               <a:buChar char="•"/>
             </a:pPr>
+            <a:r>
+              <a:rPr lang="en-US" dirty="0" smtClean="0"/>
+              <a:t>To update</a:t>
+            </a:r>
+            <a:r>
+              <a:rPr lang="en-US" baseline="0" dirty="0" smtClean="0"/>
+              <a:t> the state of the ball when it hits the paddle – reverse the direction of the ball</a:t>
+            </a:r>
+          </a:p>
+          <a:p>
+            <a:pPr marL="171450" indent="-171450">
+              <a:buFont typeface="Arial" charset="0"/>
+              <a:buChar char="•"/>
+            </a:pPr>
+            <a:endParaRPr lang="en-US" baseline="0" dirty="0" smtClean="0"/>
+          </a:p>
+          <a:p>
+            <a:pPr marL="171450" indent="-171450">
+              <a:buFont typeface="Arial" charset="0"/>
+              <a:buChar char="•"/>
+            </a:pPr>
+            <a:r>
+              <a:rPr lang="en-US" baseline="0" dirty="0" smtClean="0"/>
+              <a:t>To update the state of the ball when it hits a brick – remove brick and redraw undestroyed bricks</a:t>
+            </a:r>
             <a:endParaRPr lang="en-US" dirty="0"/>
           </a:p>
         </p:txBody>
@@ -2221,6 +2274,14 @@
               <a:buFont typeface="Arial" charset="0"/>
               <a:buChar char="•"/>
             </a:pPr>
+            <a:r>
+              <a:rPr lang="en-US" dirty="0" smtClean="0"/>
+              <a:t>Image source:</a:t>
+            </a:r>
+            <a:r>
+              <a:rPr lang="en-US" baseline="0" dirty="0" smtClean="0"/>
+              <a:t> https://bit.ly/2SSL0oO</a:t>
+            </a:r>
             <a:endParaRPr lang="en-US" dirty="0"/>
           </a:p>
         </p:txBody>
@@ -2309,6 +2370,14 @@
               <a:buFont typeface="Arial" charset="0"/>
               <a:buChar char="•"/>
             </a:pPr>
+            <a:r>
+              <a:rPr lang="en-US" dirty="0" smtClean="0"/>
+              <a:t>For simplicity,</a:t>
+            </a:r>
+            <a:r>
+              <a:rPr lang="en-US" baseline="0" dirty="0" smtClean="0"/>
+              <a:t> assume that all the moles are there all the time, we toggle their visibility</a:t>
+            </a:r>
             <a:endParaRPr lang="en-US" dirty="0"/>
           </a:p>
         </p:txBody>
@@ -2397,6 +2466,14 @@
               <a:buFont typeface="Arial" charset="0"/>
               <a:buChar char="•"/>
             </a:pPr>
+            <a:r>
+              <a:rPr lang="en-US" dirty="0" smtClean="0"/>
+              <a:t>Even complex games like WOW and RuneScape follow the general</a:t>
+            </a:r>
+            <a:r>
+              <a:rPr lang="en-US" baseline="0" dirty="0" smtClean="0"/>
+              <a:t> game cycle</a:t>
+            </a:r>
             <a:endParaRPr lang="en-US" dirty="0"/>
           </a:p>
         </p:txBody>
@@ -2485,6 +2562,10 @@
               <a:buFont typeface="Arial" charset="0"/>
               <a:buChar char="•"/>
             </a:pPr>
+            <a:r>
+              <a:rPr lang="en-US" dirty="0" smtClean="0"/>
+              <a:t>We will look at states later in the course</a:t>
+            </a:r>
             <a:endParaRPr lang="en-US" dirty="0"/>
           </a:p>
         </p:txBody>
@@ -2882,7 +2963,7 @@
           <a:p>
             <a:fld id="{F8166F1F-CE9B-4651-A6AA-CD717754106B}" type="datetimeFigureOut">
               <a:rPr lang="en-US" smtClean="0"/>
-              <a:t>7/31/19</a:t>
+              <a:t>8/1/2019</a:t>
             </a:fld>
             <a:endParaRPr lang="en-US"/>
           </a:p>
@@ -3047,7 +3128,7 @@
           <a:p>
             <a:fld id="{A76116CE-C4A3-4A05-B2D7-7C2E9A889C0F}" type="datetimeFigureOut">
               <a:rPr lang="en-US" smtClean="0"/>
-              <a:t>7/31/19</a:t>
+              <a:t>8/1/2019</a:t>
             </a:fld>
             <a:endParaRPr lang="en-US"/>
           </a:p>
@@ -3222,7 +3303,7 @@
           <a:p>
             <a:fld id="{A76116CE-C4A3-4A05-B2D7-7C2E9A889C0F}" type="datetimeFigureOut">
               <a:rPr lang="en-US" smtClean="0"/>
-              <a:t>7/31/19</a:t>
+              <a:t>8/1/2019</a:t>
             </a:fld>
             <a:endParaRPr lang="en-US"/>
           </a:p>
@@ -3389,7 +3470,7 @@
           <a:p>
             <a:fld id="{A76116CE-C4A3-4A05-B2D7-7C2E9A889C0F}" type="datetimeFigureOut">
               <a:rPr lang="en-US" smtClean="0"/>
-              <a:t>7/31/19</a:t>
+              <a:t>8/1/2019</a:t>
             </a:fld>
             <a:endParaRPr lang="en-US"/>
           </a:p>
@@ -3630,7 +3711,7 @@
           <a:p>
             <a:fld id="{A76116CE-C4A3-4A05-B2D7-7C2E9A889C0F}" type="datetimeFigureOut">
               <a:rPr lang="en-US" smtClean="0"/>
-              <a:t>7/31/19</a:t>
+              <a:t>8/1/2019</a:t>
             </a:fld>
             <a:endParaRPr lang="en-US"/>
           </a:p>
@@ -3913,7 +3994,7 @@
           <a:p>
             <a:fld id="{A76116CE-C4A3-4A05-B2D7-7C2E9A889C0F}" type="datetimeFigureOut">
               <a:rPr lang="en-US" smtClean="0"/>
-              <a:t>7/31/19</a:t>
+              <a:t>8/1/2019</a:t>
             </a:fld>
             <a:endParaRPr lang="en-US"/>
           </a:p>
@@ -4330,7 +4411,7 @@
           <a:p>
             <a:fld id="{A76116CE-C4A3-4A05-B2D7-7C2E9A889C0F}" type="datetimeFigureOut">
               <a:rPr lang="en-US" smtClean="0"/>
-              <a:t>7/31/19</a:t>
+              <a:t>8/1/2019</a:t>
             </a:fld>
             <a:endParaRPr lang="en-US"/>
           </a:p>
@@ -4443,7 +4524,7 @@
           <a:p>
             <a:fld id="{A76116CE-C4A3-4A05-B2D7-7C2E9A889C0F}" type="datetimeFigureOut">
               <a:rPr lang="en-US" smtClean="0"/>
-              <a:t>7/31/19</a:t>
+              <a:t>8/1/2019</a:t>
             </a:fld>
             <a:endParaRPr lang="en-US"/>
           </a:p>
@@ -4533,7 +4614,7 @@
           <a:p>
             <a:fld id="{A76116CE-C4A3-4A05-B2D7-7C2E9A889C0F}" type="datetimeFigureOut">
               <a:rPr lang="en-US" smtClean="0"/>
-              <a:t>7/31/19</a:t>
+              <a:t>8/1/2019</a:t>
             </a:fld>
             <a:endParaRPr lang="en-US"/>
           </a:p>
@@ -4805,7 +4886,7 @@
           <a:p>
             <a:fld id="{A76116CE-C4A3-4A05-B2D7-7C2E9A889C0F}" type="datetimeFigureOut">
               <a:rPr lang="en-US" smtClean="0"/>
-              <a:t>7/31/19</a:t>
+              <a:t>8/1/2019</a:t>
             </a:fld>
             <a:endParaRPr lang="en-US"/>
           </a:p>
@@ -5053,7 +5134,7 @@
           <a:p>
             <a:fld id="{A76116CE-C4A3-4A05-B2D7-7C2E9A889C0F}" type="datetimeFigureOut">
               <a:rPr lang="en-US" smtClean="0"/>
-              <a:t>7/31/19</a:t>
+              <a:t>8/1/2019</a:t>
             </a:fld>
             <a:endParaRPr lang="en-US"/>
           </a:p>
@@ -5261,7 +5342,7 @@
           <a:p>
             <a:fld id="{F8166F1F-CE9B-4651-A6AA-CD717754106B}" type="datetimeFigureOut">
               <a:rPr lang="en-US" smtClean="0"/>
-              <a:t>7/31/19</a:t>
+              <a:t>8/1/2019</a:t>
             </a:fld>
             <a:endParaRPr lang="en-US"/>
           </a:p>
@@ -5681,7 +5762,6 @@
               <a:rPr lang="en-US" sz="4000" b="1" dirty="0" smtClean="0"/>
               <a:t>02.2 Event Loop</a:t>
             </a:r>
-            <a:endParaRPr lang="en-US" sz="4000" b="1" dirty="0" smtClean="0"/>
           </a:p>
           <a:p>
             <a:pPr algn="ctr"/>
@@ -5761,7 +5841,7 @@
         <p:spPr>
           <a:xfrm>
             <a:off x="6096" y="6096"/>
-            <a:ext cx="9144000" cy="3916457"/>
+            <a:ext cx="9144000" cy="4301177"/>
           </a:xfrm>
           <a:prstGeom prst="rect">
             <a:avLst/>
@@ -5781,8 +5861,9 @@
             <a:pPr lvl="1"/>
             <a:r>
               <a:rPr lang="en-US" sz="3500" b="1" dirty="0" smtClean="0"/>
-              <a:t>Architecture</a:t>
-            </a:r>
+              <a:t>Whack-a-gnome</a:t>
+            </a:r>
+            <a:endParaRPr lang="en-US" sz="3500" b="1" dirty="0" smtClean="0"/>
           </a:p>
           <a:p>
             <a:pPr lvl="1"/>
@@ -5795,21 +5876,7 @@
             </a:pPr>
             <a:r>
               <a:rPr lang="en-US" sz="2500" dirty="0" smtClean="0"/>
-              <a:t>In C++, we need to separate the definition </a:t>
-            </a:r>
-          </a:p>
-          <a:p>
-            <a:pPr lvl="2"/>
-            <a:r>
-              <a:rPr lang="en-US" sz="2500" dirty="0" smtClean="0"/>
-              <a:t>	of our classes from the implementation of </a:t>
-            </a:r>
-          </a:p>
-          <a:p>
-            <a:pPr lvl="2"/>
-            <a:r>
-              <a:rPr lang="en-US" sz="2500" dirty="0" smtClean="0"/>
-              <a:t>	our classes.</a:t>
+              <a:t>Gnomes appear randomly on the screen</a:t>
             </a:r>
           </a:p>
           <a:p>
@@ -5819,7 +5886,7 @@
             </a:pPr>
             <a:r>
               <a:rPr lang="en-US" sz="2500" dirty="0" smtClean="0"/>
-              <a:t>Definitions go in .h</a:t>
+              <a:t>One gnome at a time</a:t>
             </a:r>
           </a:p>
           <a:p>
@@ -5829,7 +5896,7 @@
             </a:pPr>
             <a:r>
               <a:rPr lang="en-US" sz="2500" dirty="0" smtClean="0"/>
-              <a:t>Implementations go in .cpp</a:t>
+              <a:t>Gnomes remain briefly on the screen, then disappear</a:t>
             </a:r>
           </a:p>
           <a:p>
@@ -5839,8 +5906,39 @@
             </a:pPr>
             <a:r>
               <a:rPr lang="en-US" sz="2500" dirty="0" smtClean="0"/>
-              <a:t>For each class, we have a .h and .cpp file</a:t>
-            </a:r>
+              <a:t>If the user clicks on the gnome, it turns into a hamster</a:t>
+            </a:r>
+          </a:p>
+          <a:p>
+            <a:pPr marL="1657350" lvl="2" indent="-742950">
+              <a:buFont typeface="Arial" panose="020B0604020202020204" pitchFamily="34" charset="0"/>
+              <a:buChar char="•"/>
+            </a:pPr>
+            <a:r>
+              <a:rPr lang="en-US" sz="2500" dirty="0" smtClean="0"/>
+              <a:t>Hamster remain on the screen</a:t>
+            </a:r>
+          </a:p>
+          <a:p>
+            <a:pPr marL="1657350" lvl="2" indent="-742950">
+              <a:buFont typeface="Arial" panose="020B0604020202020204" pitchFamily="34" charset="0"/>
+              <a:buChar char="•"/>
+            </a:pPr>
+            <a:r>
+              <a:rPr lang="en-US" sz="2500" dirty="0" smtClean="0"/>
+              <a:t>Count of whacked gnomes is maintained</a:t>
+            </a:r>
+          </a:p>
+          <a:p>
+            <a:pPr marL="1657350" lvl="2" indent="-742950">
+              <a:buFont typeface="Arial" panose="020B0604020202020204" pitchFamily="34" charset="0"/>
+              <a:buChar char="•"/>
+            </a:pPr>
+            <a:r>
+              <a:rPr lang="en-US" sz="2500" dirty="0" smtClean="0"/>
+              <a:t>Game ends when all gnomes have been squashed</a:t>
+            </a:r>
+            <a:endParaRPr lang="en-US" sz="2500" dirty="0" smtClean="0"/>
           </a:p>
         </p:txBody>
       </p:sp>
@@ -5901,7 +5999,7 @@
         <p:spPr>
           <a:xfrm>
             <a:off x="6096" y="6096"/>
-            <a:ext cx="9144000" cy="3916457"/>
+            <a:ext cx="9144000" cy="3531736"/>
           </a:xfrm>
           <a:prstGeom prst="rect">
             <a:avLst/>
@@ -5921,7 +6019,7 @@
             <a:pPr lvl="1"/>
             <a:r>
               <a:rPr lang="en-US" sz="3500" b="1" dirty="0" smtClean="0"/>
-              <a:t>Gnome class</a:t>
+              <a:t>Architecture</a:t>
             </a:r>
           </a:p>
           <a:p>
@@ -5935,59 +6033,56 @@
             </a:pPr>
             <a:r>
               <a:rPr lang="en-US" sz="2500" dirty="0" smtClean="0"/>
-              <a:t>In C++, we need to separate the definition </a:t>
-            </a:r>
-          </a:p>
-          <a:p>
-            <a:pPr lvl="2"/>
+              <a:t>Classes:</a:t>
+            </a:r>
+          </a:p>
+          <a:p>
+            <a:pPr marL="2114550" lvl="3" indent="-742950">
+              <a:buFont typeface="Arial" panose="020B0604020202020204" pitchFamily="34" charset="0"/>
+              <a:buChar char="•"/>
+            </a:pPr>
             <a:r>
               <a:rPr lang="en-US" sz="2500" dirty="0" smtClean="0"/>
-              <a:t>	of our classes from the implementation of </a:t>
-            </a:r>
-          </a:p>
-          <a:p>
-            <a:pPr lvl="2"/>
+              <a:t>Something to represent an individual gnome</a:t>
+            </a:r>
+          </a:p>
+          <a:p>
+            <a:pPr marL="2114550" lvl="3" indent="-742950">
+              <a:buFont typeface="Arial" panose="020B0604020202020204" pitchFamily="34" charset="0"/>
+              <a:buChar char="•"/>
+            </a:pPr>
             <a:r>
               <a:rPr lang="en-US" sz="2500" dirty="0" smtClean="0"/>
-              <a:t>	our classes.</a:t>
-            </a:r>
-          </a:p>
-          <a:p>
-            <a:pPr marL="1657350" lvl="2" indent="-742950">
+              <a:t>Something to manage a collection of gnomes</a:t>
+            </a:r>
+          </a:p>
+          <a:p>
+            <a:pPr marL="2114550" lvl="3" indent="-742950">
               <a:buFont typeface="Arial" panose="020B0604020202020204" pitchFamily="34" charset="0"/>
               <a:buChar char="•"/>
             </a:pPr>
             <a:r>
               <a:rPr lang="en-US" sz="2500" dirty="0" smtClean="0"/>
-              <a:t>Definitions go in .h</a:t>
-            </a:r>
-          </a:p>
-          <a:p>
-            <a:pPr marL="1657350" lvl="2" indent="-742950">
+              <a:t>What about handling display and user input?</a:t>
+            </a:r>
+          </a:p>
+          <a:p>
+            <a:pPr marL="2114550" lvl="3" indent="-742950">
               <a:buFont typeface="Arial" panose="020B0604020202020204" pitchFamily="34" charset="0"/>
               <a:buChar char="•"/>
             </a:pPr>
             <a:r>
               <a:rPr lang="en-US" sz="2500" dirty="0" smtClean="0"/>
-              <a:t>Implementations go in .cpp</a:t>
-            </a:r>
-          </a:p>
-          <a:p>
-            <a:pPr marL="1657350" lvl="2" indent="-742950">
-              <a:buFont typeface="Arial" panose="020B0604020202020204" pitchFamily="34" charset="0"/>
-              <a:buChar char="•"/>
-            </a:pPr>
-            <a:r>
-              <a:rPr lang="en-US" sz="2500" dirty="0" smtClean="0"/>
-              <a:t>For each class, we have a .h and .cpp file</a:t>
-            </a:r>
+              <a:t>What about running the game cycle?</a:t>
+            </a:r>
+            <a:endParaRPr lang="en-US" sz="2500" dirty="0" smtClean="0"/>
           </a:p>
         </p:txBody>
       </p:sp>
     </p:spTree>
     <p:extLst>
       <p:ext uri="{BB962C8B-B14F-4D97-AF65-F5344CB8AC3E}">
-        <p14:creationId xmlns:p14="http://schemas.microsoft.com/office/powerpoint/2010/main" val="1914031136"/>
+        <p14:creationId xmlns:p14="http://schemas.microsoft.com/office/powerpoint/2010/main" val="2411539582"/>
       </p:ext>
     </p:extLst>
   </p:cSld>
@@ -6041,7 +6136,7 @@
         <p:spPr>
           <a:xfrm>
             <a:off x="6096" y="6096"/>
-            <a:ext cx="9144000" cy="3916457"/>
+            <a:ext cx="9144000" cy="5532284"/>
           </a:xfrm>
           <a:prstGeom prst="rect">
             <a:avLst/>
@@ -6060,10 +6155,9 @@
           <a:p>
             <a:pPr lvl="1"/>
             <a:r>
-              <a:rPr lang="en-US" sz="3500" b="1" dirty="0" err="1" smtClean="0"/>
-              <a:t>Gnome.h</a:t>
-            </a:r>
-            <a:endParaRPr lang="en-US" sz="3500" b="1" dirty="0" smtClean="0"/>
+              <a:rPr lang="en-US" sz="3500" b="1" dirty="0" smtClean="0"/>
+              <a:t>Gnome class</a:t>
+            </a:r>
           </a:p>
           <a:p>
             <a:pPr lvl="1"/>
@@ -6076,21 +6170,55 @@
             </a:pPr>
             <a:r>
               <a:rPr lang="en-US" sz="2500" dirty="0" smtClean="0"/>
-              <a:t>In C++, we need to separate the definition </a:t>
-            </a:r>
-          </a:p>
-          <a:p>
-            <a:pPr lvl="2"/>
+              <a:t>A </a:t>
+            </a:r>
+            <a:r>
+              <a:rPr lang="en-US" sz="2500" b="1" i="1" dirty="0" smtClean="0"/>
+              <a:t>Gnome</a:t>
+            </a:r>
             <a:r>
               <a:rPr lang="en-US" sz="2500" dirty="0" smtClean="0"/>
-              <a:t>	of our classes from the implementation of </a:t>
-            </a:r>
-          </a:p>
-          <a:p>
-            <a:pPr lvl="2"/>
-            <a:r>
-              <a:rPr lang="en-US" sz="2500" dirty="0" smtClean="0"/>
-              <a:t>	our classes.</a:t>
+              <a:t> needs to know/have:</a:t>
+            </a:r>
+          </a:p>
+          <a:p>
+            <a:pPr marL="2114550" lvl="3" indent="-742950">
+              <a:buFont typeface="Arial" panose="020B0604020202020204" pitchFamily="34" charset="0"/>
+              <a:buChar char="•"/>
+            </a:pPr>
+            <a:r>
+              <a:rPr lang="en-US" sz="2000" dirty="0" smtClean="0"/>
+              <a:t>A canvas to draw itself</a:t>
+            </a:r>
+          </a:p>
+          <a:p>
+            <a:pPr marL="2114550" lvl="3" indent="-742950">
+              <a:buFont typeface="Arial" panose="020B0604020202020204" pitchFamily="34" charset="0"/>
+              <a:buChar char="•"/>
+            </a:pPr>
+            <a:r>
+              <a:rPr lang="en-US" sz="2000" dirty="0" smtClean="0"/>
+              <a:t>What image to draw</a:t>
+            </a:r>
+          </a:p>
+          <a:p>
+            <a:pPr marL="2114550" lvl="3" indent="-742950">
+              <a:buFont typeface="Arial" panose="020B0604020202020204" pitchFamily="34" charset="0"/>
+              <a:buChar char="•"/>
+            </a:pPr>
+            <a:r>
+              <a:rPr lang="en-US" sz="2000" dirty="0" smtClean="0"/>
+              <a:t>Its X and Y location</a:t>
+            </a:r>
+          </a:p>
+          <a:p>
+            <a:pPr marL="2114550" lvl="3" indent="-742950">
+              <a:buFont typeface="Arial" panose="020B0604020202020204" pitchFamily="34" charset="0"/>
+              <a:buChar char="•"/>
+            </a:pPr>
+            <a:r>
+              <a:rPr lang="en-US" sz="2000" dirty="0" smtClean="0"/>
+              <a:t>Whether it is a hamster</a:t>
             </a:r>
           </a:p>
           <a:p>
@@ -6098,10 +6226,7 @@
               <a:buFont typeface="Arial" panose="020B0604020202020204" pitchFamily="34" charset="0"/>
               <a:buChar char="•"/>
             </a:pPr>
-            <a:r>
-              <a:rPr lang="en-US" sz="2500" dirty="0" smtClean="0"/>
-              <a:t>Definitions go in .h</a:t>
-            </a:r>
+            <a:endParaRPr lang="en-US" sz="2500" dirty="0"/>
           </a:p>
           <a:p>
             <a:pPr marL="1657350" lvl="2" indent="-742950">
@@ -6110,25 +6235,74 @@
             </a:pPr>
             <a:r>
               <a:rPr lang="en-US" sz="2500" dirty="0" smtClean="0"/>
-              <a:t>Implementations go in .cpp</a:t>
-            </a:r>
-          </a:p>
-          <a:p>
-            <a:pPr marL="1657350" lvl="2" indent="-742950">
+              <a:t>A </a:t>
+            </a:r>
+            <a:r>
+              <a:rPr lang="en-US" sz="2500" b="1" i="1" dirty="0" smtClean="0"/>
+              <a:t>Gnome</a:t>
+            </a:r>
+            <a:r>
+              <a:rPr lang="en-US" sz="2500" dirty="0" smtClean="0"/>
+              <a:t> needs to be able to:</a:t>
+            </a:r>
+          </a:p>
+          <a:p>
+            <a:pPr marL="2114550" lvl="3" indent="-742950">
               <a:buFont typeface="Arial" panose="020B0604020202020204" pitchFamily="34" charset="0"/>
               <a:buChar char="•"/>
             </a:pPr>
             <a:r>
-              <a:rPr lang="en-US" sz="2500" dirty="0" smtClean="0"/>
-              <a:t>For each class, we have a .h and .cpp file</a:t>
-            </a:r>
+              <a:rPr lang="en-US" sz="2000" dirty="0" smtClean="0"/>
+              <a:t>Be created</a:t>
+            </a:r>
+          </a:p>
+          <a:p>
+            <a:pPr marL="2114550" lvl="3" indent="-742950">
+              <a:buFont typeface="Arial" panose="020B0604020202020204" pitchFamily="34" charset="0"/>
+              <a:buChar char="•"/>
+            </a:pPr>
+            <a:r>
+              <a:rPr lang="en-US" sz="2000" dirty="0" smtClean="0"/>
+              <a:t>Draw itself</a:t>
+            </a:r>
+          </a:p>
+          <a:p>
+            <a:pPr marL="2114550" lvl="3" indent="-742950">
+              <a:buFont typeface="Arial" panose="020B0604020202020204" pitchFamily="34" charset="0"/>
+              <a:buChar char="•"/>
+            </a:pPr>
+            <a:r>
+              <a:rPr lang="en-US" sz="2000" dirty="0" smtClean="0"/>
+              <a:t>Erase itself</a:t>
+            </a:r>
+          </a:p>
+          <a:p>
+            <a:pPr marL="2114550" lvl="3" indent="-742950">
+              <a:buFont typeface="Arial" panose="020B0604020202020204" pitchFamily="34" charset="0"/>
+              <a:buChar char="•"/>
+            </a:pPr>
+            <a:r>
+              <a:rPr lang="en-US" sz="2000" dirty="0" smtClean="0"/>
+              <a:t>Change its image</a:t>
+            </a:r>
+          </a:p>
+          <a:p>
+            <a:pPr marL="2114550" lvl="3" indent="-742950">
+              <a:buFont typeface="Arial" panose="020B0604020202020204" pitchFamily="34" charset="0"/>
+              <a:buChar char="•"/>
+            </a:pPr>
+            <a:r>
+              <a:rPr lang="en-US" sz="2000" dirty="0" smtClean="0"/>
+              <a:t>Determine if the mouse pointer is within its bounds</a:t>
+            </a:r>
+            <a:endParaRPr lang="en-US" sz="2000" dirty="0" smtClean="0"/>
           </a:p>
         </p:txBody>
       </p:sp>
     </p:spTree>
     <p:extLst>
       <p:ext uri="{BB962C8B-B14F-4D97-AF65-F5344CB8AC3E}">
-        <p14:creationId xmlns:p14="http://schemas.microsoft.com/office/powerpoint/2010/main" val="850584297"/>
+        <p14:creationId xmlns:p14="http://schemas.microsoft.com/office/powerpoint/2010/main" val="1914031136"/>
       </p:ext>
     </p:extLst>
   </p:cSld>
@@ -6182,7 +6356,7 @@
         <p:spPr>
           <a:xfrm>
             <a:off x="6096" y="6096"/>
-            <a:ext cx="9144000" cy="3916457"/>
+            <a:ext cx="9144000" cy="1223412"/>
           </a:xfrm>
           <a:prstGeom prst="rect">
             <a:avLst/>
@@ -6201,74 +6375,47 @@
           <a:p>
             <a:pPr lvl="1"/>
             <a:r>
-              <a:rPr lang="en-US" sz="3500" b="1" dirty="0" smtClean="0"/>
-              <a:t>Gnome constructor</a:t>
-            </a:r>
-          </a:p>
-          <a:p>
-            <a:pPr lvl="1"/>
-            <a:endParaRPr lang="en-US" sz="2500" dirty="0" smtClean="0"/>
-          </a:p>
-          <a:p>
-            <a:pPr marL="1657350" lvl="2" indent="-742950">
-              <a:buFont typeface="Arial" panose="020B0604020202020204" pitchFamily="34" charset="0"/>
-              <a:buChar char="•"/>
-            </a:pPr>
-            <a:r>
-              <a:rPr lang="en-US" sz="2500" dirty="0" smtClean="0"/>
-              <a:t>In C++, we need to separate the definition </a:t>
-            </a:r>
-          </a:p>
-          <a:p>
-            <a:pPr lvl="2"/>
-            <a:r>
-              <a:rPr lang="en-US" sz="2500" dirty="0" smtClean="0"/>
-              <a:t>	of our classes from the implementation of </a:t>
-            </a:r>
-          </a:p>
-          <a:p>
-            <a:pPr lvl="2"/>
-            <a:r>
-              <a:rPr lang="en-US" sz="2500" dirty="0" smtClean="0"/>
-              <a:t>	our classes.</a:t>
-            </a:r>
-          </a:p>
-          <a:p>
-            <a:pPr marL="1657350" lvl="2" indent="-742950">
-              <a:buFont typeface="Arial" panose="020B0604020202020204" pitchFamily="34" charset="0"/>
-              <a:buChar char="•"/>
-            </a:pPr>
-            <a:r>
-              <a:rPr lang="en-US" sz="2500" dirty="0" smtClean="0"/>
-              <a:t>Definitions go in .h</a:t>
-            </a:r>
-          </a:p>
-          <a:p>
-            <a:pPr marL="1657350" lvl="2" indent="-742950">
-              <a:buFont typeface="Arial" panose="020B0604020202020204" pitchFamily="34" charset="0"/>
-              <a:buChar char="•"/>
-            </a:pPr>
-            <a:r>
-              <a:rPr lang="en-US" sz="2500" dirty="0" smtClean="0"/>
-              <a:t>Implementations go in .cpp</a:t>
-            </a:r>
-          </a:p>
-          <a:p>
-            <a:pPr marL="1657350" lvl="2" indent="-742950">
-              <a:buFont typeface="Arial" panose="020B0604020202020204" pitchFamily="34" charset="0"/>
-              <a:buChar char="•"/>
-            </a:pPr>
-            <a:r>
-              <a:rPr lang="en-US" sz="2500" dirty="0" smtClean="0"/>
-              <a:t>For each class, we have a .h and .cpp file</a:t>
-            </a:r>
-          </a:p>
-        </p:txBody>
-      </p:sp>
+              <a:rPr lang="en-US" sz="3500" b="1" dirty="0" err="1" smtClean="0"/>
+              <a:t>Gnome.h</a:t>
+            </a:r>
+            <a:endParaRPr lang="en-US" sz="3500" b="1" dirty="0" smtClean="0"/>
+          </a:p>
+        </p:txBody>
+      </p:sp>
+      <p:pic>
+        <p:nvPicPr>
+          <p:cNvPr id="2" name="Picture 1"/>
+          <p:cNvPicPr>
+            <a:picLocks noChangeAspect="1"/>
+          </p:cNvPicPr>
+          <p:nvPr/>
+        </p:nvPicPr>
+        <p:blipFill>
+          <a:blip r:embed="rId3">
+            <a:extLst>
+              <a:ext uri="{28A0092B-C50C-407E-A947-70E740481C1C}">
+                <a14:useLocalDpi xmlns:a14="http://schemas.microsoft.com/office/drawing/2010/main" val="0"/>
+              </a:ext>
+            </a:extLst>
+          </a:blip>
+          <a:stretch>
+            <a:fillRect/>
+          </a:stretch>
+        </p:blipFill>
+        <p:spPr>
+          <a:xfrm>
+            <a:off x="2182224" y="1524000"/>
+            <a:ext cx="4791744" cy="4877481"/>
+          </a:xfrm>
+          <a:prstGeom prst="rect">
+            <a:avLst/>
+          </a:prstGeom>
+        </p:spPr>
+      </p:pic>
     </p:spTree>
     <p:extLst>
       <p:ext uri="{BB962C8B-B14F-4D97-AF65-F5344CB8AC3E}">
-        <p14:creationId xmlns:p14="http://schemas.microsoft.com/office/powerpoint/2010/main" val="2052013217"/>
+        <p14:creationId xmlns:p14="http://schemas.microsoft.com/office/powerpoint/2010/main" val="850584297"/>
       </p:ext>
     </p:extLst>
   </p:cSld>
@@ -6322,7 +6469,7 @@
         <p:spPr>
           <a:xfrm>
             <a:off x="6096" y="6096"/>
-            <a:ext cx="9144000" cy="3916457"/>
+            <a:ext cx="9144000" cy="1223412"/>
           </a:xfrm>
           <a:prstGeom prst="rect">
             <a:avLst/>
@@ -6341,75 +6488,51 @@
           <a:p>
             <a:pPr lvl="1"/>
             <a:r>
-              <a:rPr lang="en-US" sz="3500" b="1" dirty="0" err="1" smtClean="0"/>
-              <a:t>GnomeFamily</a:t>
+              <a:rPr lang="en-US" sz="3500" b="1" dirty="0" smtClean="0"/>
+              <a:t>Gnome </a:t>
+            </a:r>
+            <a:r>
+              <a:rPr lang="en-US" sz="3500" b="1" dirty="0" smtClean="0"/>
+              <a:t>constructor</a:t>
             </a:r>
             <a:endParaRPr lang="en-US" sz="3500" b="1" dirty="0" smtClean="0"/>
           </a:p>
-          <a:p>
-            <a:pPr lvl="1"/>
-            <a:endParaRPr lang="en-US" sz="2500" dirty="0" smtClean="0"/>
-          </a:p>
-          <a:p>
-            <a:pPr marL="1657350" lvl="2" indent="-742950">
-              <a:buFont typeface="Arial" panose="020B0604020202020204" pitchFamily="34" charset="0"/>
-              <a:buChar char="•"/>
-            </a:pPr>
-            <a:r>
-              <a:rPr lang="en-US" sz="2500" dirty="0" smtClean="0"/>
-              <a:t>In C++, we need to separate the definition </a:t>
-            </a:r>
-          </a:p>
-          <a:p>
-            <a:pPr lvl="2"/>
-            <a:r>
-              <a:rPr lang="en-US" sz="2500" dirty="0" smtClean="0"/>
-              <a:t>	of our classes from the implementation of </a:t>
-            </a:r>
-          </a:p>
-          <a:p>
-            <a:pPr lvl="2"/>
-            <a:r>
-              <a:rPr lang="en-US" sz="2500" dirty="0" smtClean="0"/>
-              <a:t>	our classes.</a:t>
-            </a:r>
-          </a:p>
-          <a:p>
-            <a:pPr marL="1657350" lvl="2" indent="-742950">
-              <a:buFont typeface="Arial" panose="020B0604020202020204" pitchFamily="34" charset="0"/>
-              <a:buChar char="•"/>
-            </a:pPr>
-            <a:r>
-              <a:rPr lang="en-US" sz="2500" dirty="0" smtClean="0"/>
-              <a:t>Definitions go in .h</a:t>
-            </a:r>
-          </a:p>
-          <a:p>
-            <a:pPr marL="1657350" lvl="2" indent="-742950">
-              <a:buFont typeface="Arial" panose="020B0604020202020204" pitchFamily="34" charset="0"/>
-              <a:buChar char="•"/>
-            </a:pPr>
-            <a:r>
-              <a:rPr lang="en-US" sz="2500" dirty="0" smtClean="0"/>
-              <a:t>Implementations go in .cpp</a:t>
-            </a:r>
-          </a:p>
-          <a:p>
-            <a:pPr marL="1657350" lvl="2" indent="-742950">
-              <a:buFont typeface="Arial" panose="020B0604020202020204" pitchFamily="34" charset="0"/>
-              <a:buChar char="•"/>
-            </a:pPr>
-            <a:r>
-              <a:rPr lang="en-US" sz="2500" dirty="0" smtClean="0"/>
-              <a:t>For each class, we have a .h and .cpp file</a:t>
-            </a:r>
-          </a:p>
-        </p:txBody>
-      </p:sp>
+        </p:txBody>
+      </p:sp>
+      <p:pic>
+        <p:nvPicPr>
+          <p:cNvPr id="2" name="Picture 1"/>
+          <p:cNvPicPr>
+            <a:picLocks noChangeAspect="1"/>
+          </p:cNvPicPr>
+          <p:nvPr/>
+        </p:nvPicPr>
+        <p:blipFill>
+          <a:blip r:embed="rId3">
+            <a:extLst>
+              <a:ext uri="{28A0092B-C50C-407E-A947-70E740481C1C}">
+                <a14:useLocalDpi xmlns:a14="http://schemas.microsoft.com/office/drawing/2010/main" val="0"/>
+              </a:ext>
+            </a:extLst>
+          </a:blip>
+          <a:stretch>
+            <a:fillRect/>
+          </a:stretch>
+        </p:blipFill>
+        <p:spPr>
+          <a:xfrm>
+            <a:off x="868605" y="1981200"/>
+            <a:ext cx="7418982" cy="2286000"/>
+          </a:xfrm>
+          <a:prstGeom prst="rect">
+            <a:avLst/>
+          </a:prstGeom>
+        </p:spPr>
+      </p:pic>
     </p:spTree>
     <p:extLst>
       <p:ext uri="{BB962C8B-B14F-4D97-AF65-F5344CB8AC3E}">
-        <p14:creationId xmlns:p14="http://schemas.microsoft.com/office/powerpoint/2010/main" val="1830089180"/>
+        <p14:creationId xmlns:p14="http://schemas.microsoft.com/office/powerpoint/2010/main" val="2052013217"/>
       </p:ext>
     </p:extLst>
   </p:cSld>
@@ -6463,7 +6586,7 @@
         <p:spPr>
           <a:xfrm>
             <a:off x="6096" y="6096"/>
-            <a:ext cx="9144000" cy="3916457"/>
+            <a:ext cx="9144000" cy="5840060"/>
           </a:xfrm>
           <a:prstGeom prst="rect">
             <a:avLst/>
@@ -6482,10 +6605,9 @@
           <a:p>
             <a:pPr lvl="1"/>
             <a:r>
-              <a:rPr lang="en-US" sz="3500" b="1" dirty="0" err="1" smtClean="0"/>
+              <a:rPr lang="en-US" sz="3500" b="1" dirty="0" smtClean="0"/>
               <a:t>GnomeFamily</a:t>
             </a:r>
-            <a:endParaRPr lang="en-US" sz="3500" b="1" smtClean="0"/>
           </a:p>
           <a:p>
             <a:pPr lvl="1"/>
@@ -6497,23 +6619,85 @@
               <a:buChar char="•"/>
             </a:pPr>
             <a:r>
+              <a:rPr lang="en-US" sz="2500" dirty="0"/>
+              <a:t>A </a:t>
+            </a:r>
+            <a:r>
+              <a:rPr lang="en-US" sz="2500" b="1" i="1" dirty="0" smtClean="0"/>
+              <a:t>GnomeFamily</a:t>
+            </a:r>
+            <a:r>
               <a:rPr lang="en-US" sz="2500" dirty="0" smtClean="0"/>
-              <a:t>In C++, we need to separate the definition </a:t>
+              <a:t> </a:t>
+            </a:r>
+            <a:r>
+              <a:rPr lang="en-US" sz="2500" dirty="0"/>
+              <a:t>needs to know/have:</a:t>
+            </a:r>
+          </a:p>
+          <a:p>
+            <a:pPr marL="2114550" lvl="3" indent="-742950">
+              <a:buFont typeface="Arial" panose="020B0604020202020204" pitchFamily="34" charset="0"/>
+              <a:buChar char="•"/>
+            </a:pPr>
+            <a:r>
+              <a:rPr lang="en-US" sz="2000" dirty="0" smtClean="0"/>
+              <a:t>How many </a:t>
+            </a:r>
+            <a:r>
+              <a:rPr lang="en-US" sz="2000" b="1" i="1" dirty="0" smtClean="0"/>
+              <a:t>Gnomes</a:t>
+            </a:r>
+            <a:r>
+              <a:rPr lang="en-US" sz="2000" dirty="0" smtClean="0"/>
+              <a:t> it holds</a:t>
+            </a:r>
+          </a:p>
+          <a:p>
+            <a:pPr marL="2114550" lvl="3" indent="-742950">
+              <a:buFont typeface="Arial" panose="020B0604020202020204" pitchFamily="34" charset="0"/>
+              <a:buChar char="•"/>
+            </a:pPr>
+            <a:r>
+              <a:rPr lang="en-US" sz="2000" dirty="0" smtClean="0"/>
+              <a:t>A data structure to hold its collection of </a:t>
+            </a:r>
+            <a:r>
+              <a:rPr lang="en-US" sz="2000" b="1" i="1" dirty="0" smtClean="0"/>
+              <a:t>Gnomes</a:t>
+            </a:r>
+          </a:p>
+          <a:p>
+            <a:pPr marL="2114550" lvl="3" indent="-742950">
+              <a:buFont typeface="Arial" panose="020B0604020202020204" pitchFamily="34" charset="0"/>
+              <a:buChar char="•"/>
+            </a:pPr>
+            <a:r>
+              <a:rPr lang="en-US" sz="2000" dirty="0" smtClean="0"/>
+              <a:t>A random number generator</a:t>
+            </a:r>
+          </a:p>
+          <a:p>
+            <a:pPr marL="2114550" lvl="3" indent="-742950">
+              <a:buFont typeface="Arial" panose="020B0604020202020204" pitchFamily="34" charset="0"/>
+              <a:buChar char="•"/>
+            </a:pPr>
+            <a:r>
+              <a:rPr lang="en-US" sz="2000" dirty="0" smtClean="0"/>
+              <a:t>A canvas to give it </a:t>
+            </a:r>
+            <a:r>
+              <a:rPr lang="en-US" sz="2000" b="1" i="1" dirty="0" smtClean="0"/>
+              <a:t>Gnomes</a:t>
+            </a:r>
+            <a:r>
+              <a:rPr lang="en-US" sz="2000" dirty="0" smtClean="0"/>
+              <a:t> at creation</a:t>
             </a:r>
           </a:p>
           <a:p>
             <a:pPr lvl="2"/>
-            <a:r>
-              <a:rPr lang="en-US" sz="2500" dirty="0" smtClean="0"/>
-              <a:t>	of our classes from the implementation of </a:t>
-            </a:r>
-          </a:p>
-          <a:p>
-            <a:pPr lvl="2"/>
-            <a:r>
-              <a:rPr lang="en-US" sz="2500" dirty="0" smtClean="0"/>
-              <a:t>	our classes.</a:t>
-            </a:r>
+            <a:endParaRPr lang="en-US" sz="2500" dirty="0" smtClean="0"/>
           </a:p>
           <a:p>
             <a:pPr marL="1657350" lvl="2" indent="-742950">
@@ -6522,35 +6706,123 @@
             </a:pPr>
             <a:r>
               <a:rPr lang="en-US" sz="2500" dirty="0" smtClean="0"/>
-              <a:t>Definitions go in .h</a:t>
-            </a:r>
-          </a:p>
-          <a:p>
-            <a:pPr marL="1657350" lvl="2" indent="-742950">
+              <a:t>A </a:t>
+            </a:r>
+            <a:r>
+              <a:rPr lang="en-US" sz="2500" b="1" i="1" dirty="0" smtClean="0"/>
+              <a:t>GnomeFamily</a:t>
+            </a:r>
+            <a:r>
+              <a:rPr lang="en-US" sz="2500" dirty="0" smtClean="0"/>
+              <a:t> </a:t>
+            </a:r>
+            <a:r>
+              <a:rPr lang="en-US" sz="2500" dirty="0"/>
+              <a:t>needs to be able to:</a:t>
+            </a:r>
+          </a:p>
+          <a:p>
+            <a:pPr marL="2114550" lvl="3" indent="-742950">
               <a:buFont typeface="Arial" panose="020B0604020202020204" pitchFamily="34" charset="0"/>
               <a:buChar char="•"/>
             </a:pPr>
             <a:r>
-              <a:rPr lang="en-US" sz="2500" dirty="0" smtClean="0"/>
-              <a:t>Implementations go in .cpp</a:t>
-            </a:r>
-          </a:p>
-          <a:p>
-            <a:pPr marL="1657350" lvl="2" indent="-742950">
+              <a:rPr lang="en-US" sz="2000" dirty="0"/>
+              <a:t>Be created</a:t>
+            </a:r>
+          </a:p>
+          <a:p>
+            <a:pPr marL="2114550" lvl="3" indent="-742950">
               <a:buFont typeface="Arial" panose="020B0604020202020204" pitchFamily="34" charset="0"/>
               <a:buChar char="•"/>
             </a:pPr>
             <a:r>
-              <a:rPr lang="en-US" sz="2500" dirty="0" smtClean="0"/>
-              <a:t>For each class, we have a .h and .cpp file</a:t>
-            </a:r>
+              <a:rPr lang="en-US" sz="2000" dirty="0" smtClean="0"/>
+              <a:t>Create its </a:t>
+            </a:r>
+            <a:r>
+              <a:rPr lang="en-US" sz="2000" b="1" i="1" dirty="0" smtClean="0"/>
+              <a:t>Gnomes</a:t>
+            </a:r>
+            <a:endParaRPr lang="en-US" sz="2000" b="1" i="1" dirty="0"/>
+          </a:p>
+          <a:p>
+            <a:pPr marL="2114550" lvl="3" indent="-742950">
+              <a:buFont typeface="Arial" panose="020B0604020202020204" pitchFamily="34" charset="0"/>
+              <a:buChar char="•"/>
+            </a:pPr>
+            <a:r>
+              <a:rPr lang="en-US" sz="2000" dirty="0" smtClean="0"/>
+              <a:t>Draw and erase it </a:t>
+            </a:r>
+            <a:r>
+              <a:rPr lang="en-US" sz="2000" b="1" i="1" dirty="0" smtClean="0"/>
+              <a:t>Gnomes</a:t>
+            </a:r>
+            <a:endParaRPr lang="en-US" sz="2000" b="1" i="1" dirty="0"/>
+          </a:p>
+          <a:p>
+            <a:pPr marL="2114550" lvl="3" indent="-742950">
+              <a:buFont typeface="Arial" panose="020B0604020202020204" pitchFamily="34" charset="0"/>
+              <a:buChar char="•"/>
+            </a:pPr>
+            <a:r>
+              <a:rPr lang="en-US" sz="2000" dirty="0" smtClean="0"/>
+              <a:t>Check if a </a:t>
+            </a:r>
+            <a:r>
+              <a:rPr lang="en-US" sz="2000" b="1" i="1" dirty="0"/>
+              <a:t>Gnomes</a:t>
+            </a:r>
+            <a:r>
+              <a:rPr lang="en-US" sz="2000" dirty="0" smtClean="0"/>
+              <a:t> has been clicked on</a:t>
+            </a:r>
+            <a:endParaRPr lang="en-US" sz="2000" dirty="0"/>
+          </a:p>
+          <a:p>
+            <a:pPr marL="2114550" lvl="3" indent="-742950">
+              <a:buFont typeface="Arial" panose="020B0604020202020204" pitchFamily="34" charset="0"/>
+              <a:buChar char="•"/>
+            </a:pPr>
+            <a:r>
+              <a:rPr lang="en-US" sz="2000" dirty="0" smtClean="0"/>
+              <a:t>Change its </a:t>
+            </a:r>
+            <a:r>
+              <a:rPr lang="en-US" sz="2000" b="1" i="1" dirty="0"/>
+              <a:t>Gnomes</a:t>
+            </a:r>
+            <a:r>
+              <a:rPr lang="en-US" sz="2000" dirty="0" smtClean="0"/>
+              <a:t> image</a:t>
+            </a:r>
+          </a:p>
+          <a:p>
+            <a:pPr marL="2114550" lvl="3" indent="-742950">
+              <a:buFont typeface="Arial" panose="020B0604020202020204" pitchFamily="34" charset="0"/>
+              <a:buChar char="•"/>
+            </a:pPr>
+            <a:r>
+              <a:rPr lang="en-US" sz="2000" dirty="0" smtClean="0"/>
+              <a:t>Change its </a:t>
+            </a:r>
+            <a:r>
+              <a:rPr lang="en-US" sz="2000" b="1" i="1" dirty="0"/>
+              <a:t>Gnomes</a:t>
+            </a:r>
+            <a:r>
+              <a:rPr lang="en-US" sz="2000" dirty="0" smtClean="0"/>
+              <a:t> hamster states</a:t>
+            </a:r>
+            <a:endParaRPr lang="en-US" sz="2000" dirty="0"/>
           </a:p>
         </p:txBody>
       </p:sp>
     </p:spTree>
     <p:extLst>
       <p:ext uri="{BB962C8B-B14F-4D97-AF65-F5344CB8AC3E}">
-        <p14:creationId xmlns:p14="http://schemas.microsoft.com/office/powerpoint/2010/main" val="1804088987"/>
+        <p14:creationId xmlns:p14="http://schemas.microsoft.com/office/powerpoint/2010/main" val="1830089180"/>
       </p:ext>
     </p:extLst>
   </p:cSld>
@@ -6604,7 +6876,7 @@
         <p:spPr>
           <a:xfrm>
             <a:off x="6096" y="6096"/>
-            <a:ext cx="9144000" cy="3916457"/>
+            <a:ext cx="9144000" cy="1223412"/>
           </a:xfrm>
           <a:prstGeom prst="rect">
             <a:avLst/>
@@ -6624,73 +6896,46 @@
             <a:pPr lvl="1"/>
             <a:r>
               <a:rPr lang="en-US" sz="3500" b="1" dirty="0" smtClean="0"/>
-              <a:t>Managed arrays</a:t>
-            </a:r>
-          </a:p>
-          <a:p>
-            <a:pPr lvl="1"/>
-            <a:endParaRPr lang="en-US" sz="2500" dirty="0" smtClean="0"/>
-          </a:p>
-          <a:p>
-            <a:pPr marL="1657350" lvl="2" indent="-742950">
-              <a:buFont typeface="Arial" panose="020B0604020202020204" pitchFamily="34" charset="0"/>
-              <a:buChar char="•"/>
-            </a:pPr>
-            <a:r>
-              <a:rPr lang="en-US" sz="2500" dirty="0" smtClean="0"/>
-              <a:t>In C++, we need to separate the definition </a:t>
-            </a:r>
-          </a:p>
-          <a:p>
-            <a:pPr lvl="2"/>
-            <a:r>
-              <a:rPr lang="en-US" sz="2500" dirty="0" smtClean="0"/>
-              <a:t>	of our classes from the implementation of </a:t>
-            </a:r>
-          </a:p>
-          <a:p>
-            <a:pPr lvl="2"/>
-            <a:r>
-              <a:rPr lang="en-US" sz="2500" dirty="0" smtClean="0"/>
-              <a:t>	our classes.</a:t>
-            </a:r>
-          </a:p>
-          <a:p>
-            <a:pPr marL="1657350" lvl="2" indent="-742950">
-              <a:buFont typeface="Arial" panose="020B0604020202020204" pitchFamily="34" charset="0"/>
-              <a:buChar char="•"/>
-            </a:pPr>
-            <a:r>
-              <a:rPr lang="en-US" sz="2500" dirty="0" smtClean="0"/>
-              <a:t>Definitions go in .h</a:t>
-            </a:r>
-          </a:p>
-          <a:p>
-            <a:pPr marL="1657350" lvl="2" indent="-742950">
-              <a:buFont typeface="Arial" panose="020B0604020202020204" pitchFamily="34" charset="0"/>
-              <a:buChar char="•"/>
-            </a:pPr>
-            <a:r>
-              <a:rPr lang="en-US" sz="2500" dirty="0" smtClean="0"/>
-              <a:t>Implementations go in .cpp</a:t>
-            </a:r>
-          </a:p>
-          <a:p>
-            <a:pPr marL="1657350" lvl="2" indent="-742950">
-              <a:buFont typeface="Arial" panose="020B0604020202020204" pitchFamily="34" charset="0"/>
-              <a:buChar char="•"/>
-            </a:pPr>
-            <a:r>
-              <a:rPr lang="en-US" sz="2500" dirty="0" smtClean="0"/>
-              <a:t>For each class, we have a .h and .cpp file</a:t>
-            </a:r>
-          </a:p>
-        </p:txBody>
-      </p:sp>
+              <a:t>GnomeFamily</a:t>
+            </a:r>
+            <a:endParaRPr lang="en-US" sz="3500" b="1" dirty="0" smtClean="0"/>
+          </a:p>
+        </p:txBody>
+      </p:sp>
+      <p:pic>
+        <p:nvPicPr>
+          <p:cNvPr id="2" name="Picture 1"/>
+          <p:cNvPicPr>
+            <a:picLocks noChangeAspect="1"/>
+          </p:cNvPicPr>
+          <p:nvPr/>
+        </p:nvPicPr>
+        <p:blipFill>
+          <a:blip r:embed="rId3">
+            <a:extLst>
+              <a:ext uri="{28A0092B-C50C-407E-A947-70E740481C1C}">
+                <a14:useLocalDpi xmlns:a14="http://schemas.microsoft.com/office/drawing/2010/main" val="0"/>
+              </a:ext>
+            </a:extLst>
+          </a:blip>
+          <a:stretch>
+            <a:fillRect/>
+          </a:stretch>
+        </p:blipFill>
+        <p:spPr>
+          <a:xfrm>
+            <a:off x="1501554" y="1524000"/>
+            <a:ext cx="6153084" cy="4922467"/>
+          </a:xfrm>
+          <a:prstGeom prst="rect">
+            <a:avLst/>
+          </a:prstGeom>
+        </p:spPr>
+      </p:pic>
     </p:spTree>
     <p:extLst>
       <p:ext uri="{BB962C8B-B14F-4D97-AF65-F5344CB8AC3E}">
-        <p14:creationId xmlns:p14="http://schemas.microsoft.com/office/powerpoint/2010/main" val="624157771"/>
+        <p14:creationId xmlns:p14="http://schemas.microsoft.com/office/powerpoint/2010/main" val="2089073812"/>
       </p:ext>
     </p:extLst>
   </p:cSld>
@@ -6744,7 +6989,7 @@
         <p:spPr>
           <a:xfrm>
             <a:off x="6096" y="6096"/>
-            <a:ext cx="9144000" cy="3916457"/>
+            <a:ext cx="9144000" cy="1223412"/>
           </a:xfrm>
           <a:prstGeom prst="rect">
             <a:avLst/>
@@ -6763,78 +7008,51 @@
           <a:p>
             <a:pPr lvl="1"/>
             <a:r>
-              <a:rPr lang="en-US" sz="3500" b="1" dirty="0"/>
-              <a:t>Managed </a:t>
-            </a:r>
-            <a:r>
               <a:rPr lang="en-US" sz="3500" b="1" dirty="0" smtClean="0"/>
-              <a:t>arrays</a:t>
-            </a:r>
-          </a:p>
-          <a:p>
-            <a:pPr lvl="1"/>
-            <a:endParaRPr lang="en-US" sz="2500" dirty="0" smtClean="0"/>
-          </a:p>
-          <a:p>
-            <a:pPr marL="1657350" lvl="2" indent="-742950">
-              <a:buFont typeface="Arial" panose="020B0604020202020204" pitchFamily="34" charset="0"/>
-              <a:buChar char="•"/>
-            </a:pPr>
-            <a:r>
-              <a:rPr lang="en-US" sz="2500" dirty="0" smtClean="0"/>
-              <a:t>In C++, we need to separate the definition </a:t>
-            </a:r>
-          </a:p>
-          <a:p>
-            <a:pPr lvl="2"/>
-            <a:r>
-              <a:rPr lang="en-US" sz="2500" dirty="0" smtClean="0"/>
-              <a:t>	of our classes from the implementation of </a:t>
-            </a:r>
-          </a:p>
-          <a:p>
-            <a:pPr lvl="2"/>
-            <a:r>
-              <a:rPr lang="en-US" sz="2500" dirty="0" smtClean="0"/>
-              <a:t>	our classes.</a:t>
-            </a:r>
-          </a:p>
-          <a:p>
-            <a:pPr marL="1657350" lvl="2" indent="-742950">
-              <a:buFont typeface="Arial" panose="020B0604020202020204" pitchFamily="34" charset="0"/>
-              <a:buChar char="•"/>
-            </a:pPr>
-            <a:r>
-              <a:rPr lang="en-US" sz="2500" dirty="0" smtClean="0"/>
-              <a:t>Definitions go in .h</a:t>
-            </a:r>
-          </a:p>
-          <a:p>
-            <a:pPr marL="1657350" lvl="2" indent="-742950">
-              <a:buFont typeface="Arial" panose="020B0604020202020204" pitchFamily="34" charset="0"/>
-              <a:buChar char="•"/>
-            </a:pPr>
-            <a:r>
-              <a:rPr lang="en-US" sz="2500" dirty="0" smtClean="0"/>
-              <a:t>Implementations go in .cpp</a:t>
-            </a:r>
-          </a:p>
-          <a:p>
-            <a:pPr marL="1657350" lvl="2" indent="-742950">
-              <a:buFont typeface="Arial" panose="020B0604020202020204" pitchFamily="34" charset="0"/>
-              <a:buChar char="•"/>
-            </a:pPr>
-            <a:r>
-              <a:rPr lang="en-US" sz="2500" dirty="0" smtClean="0"/>
-              <a:t>For each class, we have a .h and .cpp file</a:t>
-            </a:r>
-          </a:p>
-        </p:txBody>
-      </p:sp>
+              <a:t>GnomeFamily </a:t>
+            </a:r>
+            <a:r>
+              <a:rPr lang="en-US" sz="3500" b="1" dirty="0" smtClean="0"/>
+              <a:t>constructor</a:t>
+            </a:r>
+            <a:endParaRPr lang="en-US" sz="3500" b="1" dirty="0" smtClean="0"/>
+          </a:p>
+        </p:txBody>
+      </p:sp>
+      <p:pic>
+        <p:nvPicPr>
+          <p:cNvPr id="2" name="Picture 1"/>
+          <p:cNvPicPr>
+            <a:picLocks noChangeAspect="1"/>
+          </p:cNvPicPr>
+          <p:nvPr/>
+        </p:nvPicPr>
+        <p:blipFill>
+          <a:blip r:embed="rId3">
+            <a:extLst>
+              <a:ext uri="{28A0092B-C50C-407E-A947-70E740481C1C}">
+                <a14:useLocalDpi xmlns:a14="http://schemas.microsoft.com/office/drawing/2010/main" val="0"/>
+              </a:ext>
+            </a:extLst>
+          </a:blip>
+          <a:stretch>
+            <a:fillRect/>
+          </a:stretch>
+        </p:blipFill>
+        <p:spPr>
+          <a:xfrm>
+            <a:off x="744250" y="1905000"/>
+            <a:ext cx="7667692" cy="2976733"/>
+          </a:xfrm>
+          <a:prstGeom prst="rect">
+            <a:avLst/>
+          </a:prstGeom>
+        </p:spPr>
+      </p:pic>
     </p:spTree>
     <p:extLst>
       <p:ext uri="{BB962C8B-B14F-4D97-AF65-F5344CB8AC3E}">
-        <p14:creationId xmlns:p14="http://schemas.microsoft.com/office/powerpoint/2010/main" val="2083798136"/>
+        <p14:creationId xmlns:p14="http://schemas.microsoft.com/office/powerpoint/2010/main" val="1414991660"/>
       </p:ext>
     </p:extLst>
   </p:cSld>
@@ -6888,7 +7106,7 @@
         <p:spPr>
           <a:xfrm>
             <a:off x="6096" y="6096"/>
-            <a:ext cx="9144000" cy="3916457"/>
+            <a:ext cx="9144000" cy="3531736"/>
           </a:xfrm>
           <a:prstGeom prst="rect">
             <a:avLst/>
@@ -6907,12 +7125,8 @@
           <a:p>
             <a:pPr lvl="1"/>
             <a:r>
-              <a:rPr lang="en-US" sz="3500" b="1" dirty="0"/>
-              <a:t>Managed </a:t>
-            </a:r>
-            <a:r>
               <a:rPr lang="en-US" sz="3500" b="1" dirty="0" smtClean="0"/>
-              <a:t>arrays</a:t>
+              <a:t>Managed arrays</a:t>
             </a:r>
           </a:p>
           <a:p>
@@ -6926,21 +7140,7 @@
             </a:pPr>
             <a:r>
               <a:rPr lang="en-US" sz="2500" dirty="0" smtClean="0"/>
-              <a:t>In C++, we need to separate the definition </a:t>
-            </a:r>
-          </a:p>
-          <a:p>
-            <a:pPr lvl="2"/>
-            <a:r>
-              <a:rPr lang="en-US" sz="2500" dirty="0" smtClean="0"/>
-              <a:t>	of our classes from the implementation of </a:t>
-            </a:r>
-          </a:p>
-          <a:p>
-            <a:pPr lvl="2"/>
-            <a:r>
-              <a:rPr lang="en-US" sz="2500" dirty="0" smtClean="0"/>
-              <a:t>	our classes.</a:t>
+              <a:t>Managed arrays are class instances</a:t>
             </a:r>
           </a:p>
           <a:p>
@@ -6950,7 +7150,7 @@
             </a:pPr>
             <a:r>
               <a:rPr lang="en-US" sz="2500" dirty="0" smtClean="0"/>
-              <a:t>Definitions go in .h</a:t>
+              <a:t>You can create a pointer/handler to an array</a:t>
             </a:r>
           </a:p>
           <a:p>
@@ -6960,7 +7160,7 @@
             </a:pPr>
             <a:r>
               <a:rPr lang="en-US" sz="2500" dirty="0" smtClean="0"/>
-              <a:t>Implementations go in .cpp</a:t>
+              <a:t>You allocate space for the array elements</a:t>
             </a:r>
           </a:p>
           <a:p>
@@ -6968,17 +7168,53 @@
               <a:buFont typeface="Arial" panose="020B0604020202020204" pitchFamily="34" charset="0"/>
               <a:buChar char="•"/>
             </a:pPr>
-            <a:r>
-              <a:rPr lang="en-US" sz="2500" dirty="0" smtClean="0"/>
-              <a:t>For each class, we have a .h and .cpp file</a:t>
-            </a:r>
-          </a:p>
-        </p:txBody>
-      </p:sp>
+            <a:endParaRPr lang="en-US" sz="2500" dirty="0" smtClean="0"/>
+          </a:p>
+          <a:p>
+            <a:pPr marL="1657350" lvl="2" indent="-742950">
+              <a:buFont typeface="Arial" panose="020B0604020202020204" pitchFamily="34" charset="0"/>
+              <a:buChar char="•"/>
+            </a:pPr>
+            <a:endParaRPr lang="en-US" sz="2500" dirty="0"/>
+          </a:p>
+        </p:txBody>
+      </p:sp>
+      <p:pic>
+        <p:nvPicPr>
+          <p:cNvPr id="3" name="Picture 2"/>
+          <p:cNvPicPr>
+            <a:picLocks noChangeAspect="1" noChangeArrowheads="1"/>
+          </p:cNvPicPr>
+          <p:nvPr/>
+        </p:nvPicPr>
+        <p:blipFill>
+          <a:blip r:embed="rId3" cstate="print"/>
+          <a:srcRect/>
+          <a:stretch>
+            <a:fillRect/>
+          </a:stretch>
+        </p:blipFill>
+        <p:spPr bwMode="auto">
+          <a:xfrm>
+            <a:off x="1472327" y="3352800"/>
+            <a:ext cx="6211537" cy="2759257"/>
+          </a:xfrm>
+          <a:prstGeom prst="rect">
+            <a:avLst/>
+          </a:prstGeom>
+          <a:noFill/>
+          <a:ln w="9525">
+            <a:noFill/>
+            <a:miter lim="800000"/>
+            <a:headEnd/>
+            <a:tailEnd/>
+          </a:ln>
+        </p:spPr>
+      </p:pic>
     </p:spTree>
     <p:extLst>
       <p:ext uri="{BB962C8B-B14F-4D97-AF65-F5344CB8AC3E}">
-        <p14:creationId xmlns:p14="http://schemas.microsoft.com/office/powerpoint/2010/main" val="1602651405"/>
+        <p14:creationId xmlns:p14="http://schemas.microsoft.com/office/powerpoint/2010/main" val="624157771"/>
       </p:ext>
     </p:extLst>
   </p:cSld>
@@ -7032,7 +7268,7 @@
         <p:spPr>
           <a:xfrm>
             <a:off x="6096" y="6096"/>
-            <a:ext cx="9144000" cy="3916457"/>
+            <a:ext cx="9144000" cy="3531736"/>
           </a:xfrm>
           <a:prstGeom prst="rect">
             <a:avLst/>
@@ -7070,21 +7306,7 @@
             </a:pPr>
             <a:r>
               <a:rPr lang="en-US" sz="2500" dirty="0" smtClean="0"/>
-              <a:t>In C++, we need to separate the definition </a:t>
-            </a:r>
-          </a:p>
-          <a:p>
-            <a:pPr lvl="2"/>
-            <a:r>
-              <a:rPr lang="en-US" sz="2500" dirty="0" smtClean="0"/>
-              <a:t>	of our classes from the implementation of </a:t>
-            </a:r>
-          </a:p>
-          <a:p>
-            <a:pPr lvl="2"/>
-            <a:r>
-              <a:rPr lang="en-US" sz="2500" dirty="0" smtClean="0"/>
-              <a:t>	our classes.</a:t>
+              <a:t>What if you want an array of complex objects?</a:t>
             </a:r>
           </a:p>
           <a:p>
@@ -7094,7 +7316,7 @@
             </a:pPr>
             <a:r>
               <a:rPr lang="en-US" sz="2500" dirty="0" smtClean="0"/>
-              <a:t>Definitions go in .h</a:t>
+              <a:t>Complex objects are worked</a:t>
             </a:r>
           </a:p>
           <a:p>
@@ -7104,25 +7326,55 @@
             </a:pPr>
             <a:r>
               <a:rPr lang="en-US" sz="2500" dirty="0" smtClean="0"/>
-              <a:t>Implementations go in .cpp</a:t>
-            </a:r>
-          </a:p>
-          <a:p>
-            <a:pPr marL="1657350" lvl="2" indent="-742950">
-              <a:buFont typeface="Arial" panose="020B0604020202020204" pitchFamily="34" charset="0"/>
-              <a:buChar char="•"/>
-            </a:pPr>
-            <a:r>
-              <a:rPr lang="en-US" sz="2500" dirty="0" smtClean="0"/>
-              <a:t>For each class, we have a .h and .cpp file</a:t>
-            </a:r>
-          </a:p>
-        </p:txBody>
-      </p:sp>
+              <a:t>You need an array of pointers</a:t>
+            </a:r>
+          </a:p>
+          <a:p>
+            <a:pPr lvl="2"/>
+            <a:endParaRPr lang="en-US" sz="2500" dirty="0" smtClean="0"/>
+          </a:p>
+          <a:p>
+            <a:pPr lvl="2"/>
+            <a:endParaRPr lang="en-US" sz="2500" dirty="0"/>
+          </a:p>
+        </p:txBody>
+      </p:sp>
+      <p:pic>
+        <p:nvPicPr>
+          <p:cNvPr id="3" name="Picture 2"/>
+          <p:cNvPicPr>
+            <a:picLocks noChangeAspect="1" noChangeArrowheads="1"/>
+          </p:cNvPicPr>
+          <p:nvPr/>
+        </p:nvPicPr>
+        <p:blipFill>
+          <a:blip r:embed="rId3" cstate="print"/>
+          <a:srcRect/>
+          <a:stretch>
+            <a:fillRect/>
+          </a:stretch>
+        </p:blipFill>
+        <p:spPr bwMode="auto">
+          <a:xfrm>
+            <a:off x="2020098" y="3048000"/>
+            <a:ext cx="5115995" cy="3124454"/>
+          </a:xfrm>
+          <a:prstGeom prst="rect">
+            <a:avLst/>
+          </a:prstGeom>
+          <a:noFill/>
+          <a:ln w="9525">
+            <a:noFill/>
+            <a:miter lim="800000"/>
+            <a:headEnd/>
+            <a:tailEnd/>
+          </a:ln>
+        </p:spPr>
+      </p:pic>
     </p:spTree>
     <p:extLst>
       <p:ext uri="{BB962C8B-B14F-4D97-AF65-F5344CB8AC3E}">
-        <p14:creationId xmlns:p14="http://schemas.microsoft.com/office/powerpoint/2010/main" val="2100749505"/>
+        <p14:creationId xmlns:p14="http://schemas.microsoft.com/office/powerpoint/2010/main" val="2083798136"/>
       </p:ext>
     </p:extLst>
   </p:cSld>
@@ -7176,7 +7428,7 @@
         <p:spPr>
           <a:xfrm>
             <a:off x="6096" y="6096"/>
-            <a:ext cx="9144000" cy="3916457"/>
+            <a:ext cx="9144000" cy="1223412"/>
           </a:xfrm>
           <a:prstGeom prst="rect">
             <a:avLst/>
@@ -7196,69 +7448,529 @@
             <a:pPr lvl="1"/>
             <a:r>
               <a:rPr lang="en-US" sz="3500" b="1" dirty="0" smtClean="0"/>
-              <a:t>The game cycle</a:t>
-            </a:r>
-          </a:p>
-          <a:p>
-            <a:pPr lvl="1"/>
-            <a:endParaRPr lang="en-US" sz="2500" dirty="0" smtClean="0"/>
-          </a:p>
-          <a:p>
-            <a:pPr marL="1657350" lvl="2" indent="-742950">
-              <a:buFont typeface="Arial" panose="020B0604020202020204" pitchFamily="34" charset="0"/>
-              <a:buChar char="•"/>
-            </a:pPr>
-            <a:r>
-              <a:rPr lang="en-US" sz="2500" dirty="0" smtClean="0"/>
-              <a:t>In C++, we need to separate the definition </a:t>
-            </a:r>
-          </a:p>
-          <a:p>
-            <a:pPr lvl="2"/>
-            <a:r>
-              <a:rPr lang="en-US" sz="2500" dirty="0" smtClean="0"/>
-              <a:t>	of our classes from the implementation of </a:t>
-            </a:r>
-          </a:p>
-          <a:p>
-            <a:pPr lvl="2"/>
-            <a:r>
-              <a:rPr lang="en-US" sz="2500" dirty="0" smtClean="0"/>
-              <a:t>	our classes.</a:t>
-            </a:r>
-          </a:p>
-          <a:p>
-            <a:pPr marL="1657350" lvl="2" indent="-742950">
-              <a:buFont typeface="Arial" panose="020B0604020202020204" pitchFamily="34" charset="0"/>
-              <a:buChar char="•"/>
-            </a:pPr>
-            <a:r>
-              <a:rPr lang="en-US" sz="2500" dirty="0" smtClean="0"/>
-              <a:t>Definitions go in .h</a:t>
-            </a:r>
-          </a:p>
-          <a:p>
-            <a:pPr marL="1657350" lvl="2" indent="-742950">
-              <a:buFont typeface="Arial" panose="020B0604020202020204" pitchFamily="34" charset="0"/>
-              <a:buChar char="•"/>
-            </a:pPr>
-            <a:r>
-              <a:rPr lang="en-US" sz="2500" dirty="0" smtClean="0"/>
-              <a:t>Implementations go in .cpp</a:t>
-            </a:r>
-          </a:p>
-          <a:p>
-            <a:pPr marL="1657350" lvl="2" indent="-742950">
-              <a:buFont typeface="Arial" panose="020B0604020202020204" pitchFamily="34" charset="0"/>
-              <a:buChar char="•"/>
-            </a:pPr>
-            <a:r>
-              <a:rPr lang="en-US" sz="2500" dirty="0" smtClean="0"/>
-              <a:t>For each class, we have a .h and .cpp file</a:t>
-            </a:r>
-          </a:p>
-        </p:txBody>
-      </p:sp>
+              <a:t>The game </a:t>
+            </a:r>
+            <a:r>
+              <a:rPr lang="en-US" sz="3500" b="1" dirty="0" smtClean="0"/>
+              <a:t>cycle</a:t>
+            </a:r>
+            <a:endParaRPr lang="en-US" sz="3500" b="1" dirty="0" smtClean="0"/>
+          </a:p>
+        </p:txBody>
+      </p:sp>
+      <p:grpSp>
+        <p:nvGrpSpPr>
+          <p:cNvPr id="12" name="Group 11"/>
+          <p:cNvGrpSpPr/>
+          <p:nvPr/>
+        </p:nvGrpSpPr>
+        <p:grpSpPr>
+          <a:xfrm>
+            <a:off x="2192083" y="1752600"/>
+            <a:ext cx="4772025" cy="4157662"/>
+            <a:chOff x="1600200" y="1557338"/>
+            <a:chExt cx="4772025" cy="4157662"/>
+          </a:xfrm>
+        </p:grpSpPr>
+        <p:sp>
+          <p:nvSpPr>
+            <p:cNvPr id="3" name="Rectangle 3"/>
+            <p:cNvSpPr txBox="1">
+              <a:spLocks noChangeArrowheads="1"/>
+            </p:cNvSpPr>
+            <p:nvPr/>
+          </p:nvSpPr>
+          <p:spPr>
+            <a:xfrm>
+              <a:off x="2333625" y="2314575"/>
+              <a:ext cx="4038600" cy="2333625"/>
+            </a:xfrm>
+            <a:prstGeom prst="rect">
+              <a:avLst/>
+            </a:prstGeom>
+            <a:noFill/>
+            <a:ln>
+              <a:solidFill>
+                <a:schemeClr val="tx1"/>
+              </a:solidFill>
+            </a:ln>
+          </p:spPr>
+          <p:txBody>
+            <a:bodyPr/>
+            <a:lstStyle>
+              <a:lvl1pPr marL="342900" indent="-342900" algn="l" defTabSz="914400" rtl="0" eaLnBrk="1" latinLnBrk="0" hangingPunct="1">
+                <a:spcBef>
+                  <a:spcPct val="20000"/>
+                </a:spcBef>
+                <a:buFont typeface="Arial" pitchFamily="34" charset="0"/>
+                <a:buChar char="�"/>
+                <a:defRPr sz="3200" kern="1200">
+                  <a:solidFill>
+                    <a:schemeClr val="tx1"/>
+                  </a:solidFill>
+                  <a:latin typeface="+mn-lt"/>
+                  <a:ea typeface="+mn-ea"/>
+                  <a:cs typeface="+mn-cs"/>
+                </a:defRPr>
+              </a:lvl1pPr>
+              <a:lvl2pPr marL="742950" indent="-285750" algn="l" defTabSz="914400" rtl="0" eaLnBrk="1" latinLnBrk="0" hangingPunct="1">
+                <a:spcBef>
+                  <a:spcPct val="20000"/>
+                </a:spcBef>
+                <a:buFont typeface="Arial" pitchFamily="34" charset="0"/>
+                <a:buChar char="�"/>
+                <a:defRPr sz="2800" kern="1200">
+                  <a:solidFill>
+                    <a:schemeClr val="tx1"/>
+                  </a:solidFill>
+                  <a:latin typeface="+mn-lt"/>
+                  <a:ea typeface="+mn-ea"/>
+                  <a:cs typeface="+mn-cs"/>
+                </a:defRPr>
+              </a:lvl2pPr>
+              <a:lvl3pPr marL="1143000" indent="-228600" algn="l" defTabSz="914400" rtl="0" eaLnBrk="1" latinLnBrk="0" hangingPunct="1">
+                <a:spcBef>
+                  <a:spcPct val="20000"/>
+                </a:spcBef>
+                <a:buFont typeface="Arial" pitchFamily="34" charset="0"/>
+                <a:buChar char="�"/>
+                <a:defRPr sz="2400" kern="1200">
+                  <a:solidFill>
+                    <a:schemeClr val="tx1"/>
+                  </a:solidFill>
+                  <a:latin typeface="+mn-lt"/>
+                  <a:ea typeface="+mn-ea"/>
+                  <a:cs typeface="+mn-cs"/>
+                </a:defRPr>
+              </a:lvl3pPr>
+              <a:lvl4pPr marL="1600200" indent="-228600" algn="l" defTabSz="914400" rtl="0" eaLnBrk="1" latinLnBrk="0" hangingPunct="1">
+                <a:spcBef>
+                  <a:spcPct val="20000"/>
+                </a:spcBef>
+                <a:buFont typeface="Arial" pitchFamily="34" charset="0"/>
+                <a:buChar char="�"/>
+                <a:defRPr sz="2000" kern="1200">
+                  <a:solidFill>
+                    <a:schemeClr val="tx1"/>
+                  </a:solidFill>
+                  <a:latin typeface="+mn-lt"/>
+                  <a:ea typeface="+mn-ea"/>
+                  <a:cs typeface="+mn-cs"/>
+                </a:defRPr>
+              </a:lvl4pPr>
+              <a:lvl5pPr marL="2057400" indent="-228600" algn="l" defTabSz="914400" rtl="0" eaLnBrk="1" latinLnBrk="0" hangingPunct="1">
+                <a:spcBef>
+                  <a:spcPct val="20000"/>
+                </a:spcBef>
+                <a:buFont typeface="Arial" pitchFamily="34" charset="0"/>
+                <a:buChar char="�"/>
+                <a:defRPr sz="2000" kern="1200">
+                  <a:solidFill>
+                    <a:schemeClr val="tx1"/>
+                  </a:solidFill>
+                  <a:latin typeface="+mn-lt"/>
+                  <a:ea typeface="+mn-ea"/>
+                  <a:cs typeface="+mn-cs"/>
+                </a:defRPr>
+              </a:lvl5pPr>
+              <a:lvl6pPr marL="2514600" indent="-228600" algn="l" defTabSz="914400" rtl="0" eaLnBrk="1" latinLnBrk="0" hangingPunct="1">
+                <a:spcBef>
+                  <a:spcPct val="20000"/>
+                </a:spcBef>
+                <a:buFont typeface="Arial" pitchFamily="34" charset="0"/>
+                <a:buChar char="�"/>
+                <a:defRPr sz="2000" kern="1200">
+                  <a:solidFill>
+                    <a:schemeClr val="tx1"/>
+                  </a:solidFill>
+                  <a:latin typeface="+mn-lt"/>
+                  <a:ea typeface="+mn-ea"/>
+                  <a:cs typeface="+mn-cs"/>
+                </a:defRPr>
+              </a:lvl6pPr>
+              <a:lvl7pPr marL="2971800" indent="-228600" algn="l" defTabSz="914400" rtl="0" eaLnBrk="1" latinLnBrk="0" hangingPunct="1">
+                <a:spcBef>
+                  <a:spcPct val="20000"/>
+                </a:spcBef>
+                <a:buFont typeface="Arial" pitchFamily="34" charset="0"/>
+                <a:buChar char="�"/>
+                <a:defRPr sz="2000" kern="1200">
+                  <a:solidFill>
+                    <a:schemeClr val="tx1"/>
+                  </a:solidFill>
+                  <a:latin typeface="+mn-lt"/>
+                  <a:ea typeface="+mn-ea"/>
+                  <a:cs typeface="+mn-cs"/>
+                </a:defRPr>
+              </a:lvl7pPr>
+              <a:lvl8pPr marL="3429000" indent="-228600" algn="l" defTabSz="914400" rtl="0" eaLnBrk="1" latinLnBrk="0" hangingPunct="1">
+                <a:spcBef>
+                  <a:spcPct val="20000"/>
+                </a:spcBef>
+                <a:buFont typeface="Arial" pitchFamily="34" charset="0"/>
+                <a:buChar char="�"/>
+                <a:defRPr sz="2000" kern="1200">
+                  <a:solidFill>
+                    <a:schemeClr val="tx1"/>
+                  </a:solidFill>
+                  <a:latin typeface="+mn-lt"/>
+                  <a:ea typeface="+mn-ea"/>
+                  <a:cs typeface="+mn-cs"/>
+                </a:defRPr>
+              </a:lvl8pPr>
+              <a:lvl9pPr marL="3886200" indent="-228600" algn="l" defTabSz="914400" rtl="0" eaLnBrk="1" latinLnBrk="0" hangingPunct="1">
+                <a:spcBef>
+                  <a:spcPct val="20000"/>
+                </a:spcBef>
+                <a:buFont typeface="Arial" pitchFamily="34" charset="0"/>
+                <a:buChar char="�"/>
+                <a:defRPr sz="2000" kern="1200">
+                  <a:solidFill>
+                    <a:schemeClr val="tx1"/>
+                  </a:solidFill>
+                  <a:latin typeface="+mn-lt"/>
+                  <a:ea typeface="+mn-ea"/>
+                  <a:cs typeface="+mn-cs"/>
+                </a:defRPr>
+              </a:lvl9pPr>
+            </a:lstStyle>
+            <a:p>
+              <a:pPr>
+                <a:buFont typeface="Wingdings" pitchFamily="2" charset="2"/>
+                <a:buNone/>
+              </a:pPr>
+              <a:r>
+                <a:rPr lang="en-NZ" sz="2000" dirty="0" smtClean="0"/>
+                <a:t>While the game isn’t over</a:t>
+              </a:r>
+            </a:p>
+            <a:p>
+              <a:pPr>
+                <a:buFont typeface="Wingdings" pitchFamily="2" charset="2"/>
+                <a:buNone/>
+              </a:pPr>
+              <a:r>
+                <a:rPr lang="en-NZ" sz="2000" dirty="0" smtClean="0"/>
+                <a:t>Begin</a:t>
+              </a:r>
+            </a:p>
+            <a:p>
+              <a:pPr lvl="1">
+                <a:buFontTx/>
+                <a:buNone/>
+              </a:pPr>
+              <a:r>
+                <a:rPr lang="en-NZ" sz="2000" dirty="0" smtClean="0"/>
+                <a:t>Check for input</a:t>
+              </a:r>
+            </a:p>
+            <a:p>
+              <a:pPr lvl="1">
+                <a:buFontTx/>
+                <a:buNone/>
+              </a:pPr>
+              <a:r>
+                <a:rPr lang="en-NZ" sz="2000" dirty="0" smtClean="0"/>
+                <a:t>Update game state</a:t>
+              </a:r>
+            </a:p>
+            <a:p>
+              <a:pPr lvl="1">
+                <a:buFontTx/>
+                <a:buNone/>
+              </a:pPr>
+              <a:r>
+                <a:rPr lang="en-NZ" sz="2000" dirty="0" smtClean="0"/>
+                <a:t>Display game state</a:t>
+              </a:r>
+            </a:p>
+            <a:p>
+              <a:pPr>
+                <a:buFont typeface="Wingdings" pitchFamily="2" charset="2"/>
+                <a:buNone/>
+              </a:pPr>
+              <a:r>
+                <a:rPr lang="en-NZ" sz="2000" dirty="0" smtClean="0"/>
+                <a:t>End</a:t>
+              </a:r>
+              <a:endParaRPr lang="en-NZ" sz="2000" dirty="0"/>
+            </a:p>
+          </p:txBody>
+        </p:sp>
+        <p:sp>
+          <p:nvSpPr>
+            <p:cNvPr id="4" name="Text Box 4"/>
+            <p:cNvSpPr txBox="1">
+              <a:spLocks noChangeArrowheads="1"/>
+            </p:cNvSpPr>
+            <p:nvPr/>
+          </p:nvSpPr>
+          <p:spPr bwMode="auto">
+            <a:xfrm>
+              <a:off x="3063980" y="1557338"/>
+              <a:ext cx="2165145" cy="461665"/>
+            </a:xfrm>
+            <a:prstGeom prst="rect">
+              <a:avLst/>
+            </a:prstGeom>
+            <a:noFill/>
+            <a:ln w="9525">
+              <a:solidFill>
+                <a:schemeClr val="tx1"/>
+              </a:solidFill>
+              <a:miter lim="800000"/>
+              <a:headEnd/>
+              <a:tailEnd/>
+            </a:ln>
+            <a:effectLst/>
+          </p:spPr>
+          <p:txBody>
+            <a:bodyPr wrap="none">
+              <a:spAutoFit/>
+            </a:bodyPr>
+            <a:lstStyle/>
+            <a:p>
+              <a:pPr algn="ctr"/>
+              <a:r>
+                <a:rPr lang="en-NZ" sz="2400" b="0" dirty="0" smtClean="0"/>
+                <a:t>Initialise system</a:t>
+              </a:r>
+              <a:endParaRPr lang="en-NZ" sz="2400" b="0" dirty="0"/>
+            </a:p>
+          </p:txBody>
+        </p:sp>
+        <p:sp>
+          <p:nvSpPr>
+            <p:cNvPr id="6" name="Text Box 8"/>
+            <p:cNvSpPr txBox="1">
+              <a:spLocks noChangeArrowheads="1"/>
+            </p:cNvSpPr>
+            <p:nvPr/>
+          </p:nvSpPr>
+          <p:spPr bwMode="auto">
+            <a:xfrm>
+              <a:off x="3716014" y="5253335"/>
+              <a:ext cx="854721" cy="461665"/>
+            </a:xfrm>
+            <a:prstGeom prst="rect">
+              <a:avLst/>
+            </a:prstGeom>
+            <a:noFill/>
+            <a:ln w="9525">
+              <a:solidFill>
+                <a:schemeClr val="tx1"/>
+              </a:solidFill>
+              <a:miter lim="800000"/>
+              <a:headEnd/>
+              <a:tailEnd/>
+            </a:ln>
+            <a:effectLst/>
+          </p:spPr>
+          <p:txBody>
+            <a:bodyPr wrap="none">
+              <a:spAutoFit/>
+            </a:bodyPr>
+            <a:lstStyle/>
+            <a:p>
+              <a:pPr algn="ctr"/>
+              <a:r>
+                <a:rPr lang="en-NZ" sz="2400" b="0" dirty="0"/>
+                <a:t>Close</a:t>
+              </a:r>
+            </a:p>
+          </p:txBody>
+        </p:sp>
+        <p:grpSp>
+          <p:nvGrpSpPr>
+            <p:cNvPr id="2" name="Group 1"/>
+            <p:cNvGrpSpPr/>
+            <p:nvPr/>
+          </p:nvGrpSpPr>
+          <p:grpSpPr>
+            <a:xfrm>
+              <a:off x="1600200" y="3573463"/>
+              <a:ext cx="720725" cy="863600"/>
+              <a:chOff x="1547813" y="3573463"/>
+              <a:chExt cx="720725" cy="863600"/>
+            </a:xfrm>
+          </p:grpSpPr>
+          <p:sp>
+            <p:nvSpPr>
+              <p:cNvPr id="7" name="Line 10"/>
+              <p:cNvSpPr>
+                <a:spLocks noChangeShapeType="1"/>
+              </p:cNvSpPr>
+              <p:nvPr/>
+            </p:nvSpPr>
+            <p:spPr bwMode="auto">
+              <a:xfrm flipH="1">
+                <a:off x="1547813" y="4437063"/>
+                <a:ext cx="720725" cy="0"/>
+              </a:xfrm>
+              <a:prstGeom prst="line">
+                <a:avLst/>
+              </a:prstGeom>
+              <a:noFill/>
+              <a:ln w="9525">
+                <a:solidFill>
+                  <a:schemeClr val="tx1"/>
+                </a:solidFill>
+                <a:round/>
+                <a:headEnd/>
+                <a:tailEnd/>
+              </a:ln>
+              <a:effectLst/>
+            </p:spPr>
+            <p:txBody>
+              <a:bodyPr/>
+              <a:lstStyle/>
+              <a:p>
+                <a:endParaRPr lang="en-NZ"/>
+              </a:p>
+            </p:txBody>
+          </p:sp>
+          <p:sp>
+            <p:nvSpPr>
+              <p:cNvPr id="8" name="Line 11"/>
+              <p:cNvSpPr>
+                <a:spLocks noChangeShapeType="1"/>
+              </p:cNvSpPr>
+              <p:nvPr/>
+            </p:nvSpPr>
+            <p:spPr bwMode="auto">
+              <a:xfrm flipV="1">
+                <a:off x="1547813" y="3573463"/>
+                <a:ext cx="0" cy="863600"/>
+              </a:xfrm>
+              <a:prstGeom prst="line">
+                <a:avLst/>
+              </a:prstGeom>
+              <a:noFill/>
+              <a:ln w="9525">
+                <a:solidFill>
+                  <a:schemeClr val="tx1"/>
+                </a:solidFill>
+                <a:round/>
+                <a:headEnd/>
+                <a:tailEnd/>
+              </a:ln>
+              <a:effectLst/>
+            </p:spPr>
+            <p:txBody>
+              <a:bodyPr/>
+              <a:lstStyle/>
+              <a:p>
+                <a:endParaRPr lang="en-NZ"/>
+              </a:p>
+            </p:txBody>
+          </p:sp>
+          <p:sp>
+            <p:nvSpPr>
+              <p:cNvPr id="9" name="Line 12"/>
+              <p:cNvSpPr>
+                <a:spLocks noChangeShapeType="1"/>
+              </p:cNvSpPr>
+              <p:nvPr/>
+            </p:nvSpPr>
+            <p:spPr bwMode="auto">
+              <a:xfrm>
+                <a:off x="1547813" y="3573463"/>
+                <a:ext cx="720725" cy="0"/>
+              </a:xfrm>
+              <a:prstGeom prst="line">
+                <a:avLst/>
+              </a:prstGeom>
+              <a:noFill/>
+              <a:ln w="9525">
+                <a:solidFill>
+                  <a:schemeClr val="tx1"/>
+                </a:solidFill>
+                <a:round/>
+                <a:headEnd/>
+                <a:tailEnd type="triangle" w="med" len="med"/>
+              </a:ln>
+              <a:effectLst/>
+            </p:spPr>
+            <p:txBody>
+              <a:bodyPr/>
+              <a:lstStyle/>
+              <a:p>
+                <a:endParaRPr lang="en-NZ"/>
+              </a:p>
+            </p:txBody>
+          </p:sp>
+        </p:grpSp>
+        <p:sp>
+          <p:nvSpPr>
+            <p:cNvPr id="10" name="Line 13"/>
+            <p:cNvSpPr>
+              <a:spLocks noChangeShapeType="1"/>
+            </p:cNvSpPr>
+            <p:nvPr/>
+          </p:nvSpPr>
+          <p:spPr bwMode="auto">
+            <a:xfrm>
+              <a:off x="4114800" y="2019003"/>
+              <a:ext cx="0" cy="288925"/>
+            </a:xfrm>
+            <a:prstGeom prst="line">
+              <a:avLst/>
+            </a:prstGeom>
+            <a:noFill/>
+            <a:ln w="9525">
+              <a:solidFill>
+                <a:schemeClr val="tx1"/>
+              </a:solidFill>
+              <a:round/>
+              <a:headEnd/>
+              <a:tailEnd type="triangle" w="med" len="med"/>
+            </a:ln>
+            <a:effectLst/>
+          </p:spPr>
+          <p:txBody>
+            <a:bodyPr/>
+            <a:lstStyle/>
+            <a:p>
+              <a:endParaRPr lang="en-NZ"/>
+            </a:p>
+          </p:txBody>
+        </p:sp>
+        <p:sp>
+          <p:nvSpPr>
+            <p:cNvPr id="11" name="Line 14"/>
+            <p:cNvSpPr>
+              <a:spLocks noChangeShapeType="1"/>
+            </p:cNvSpPr>
+            <p:nvPr/>
+          </p:nvSpPr>
+          <p:spPr bwMode="auto">
+            <a:xfrm>
+              <a:off x="4140200" y="4648200"/>
+              <a:ext cx="0" cy="576263"/>
+            </a:xfrm>
+            <a:prstGeom prst="line">
+              <a:avLst/>
+            </a:prstGeom>
+            <a:noFill/>
+            <a:ln w="9525">
+              <a:solidFill>
+                <a:schemeClr val="tx1"/>
+              </a:solidFill>
+              <a:round/>
+              <a:headEnd/>
+              <a:tailEnd type="triangle" w="med" len="med"/>
+            </a:ln>
+            <a:effectLst/>
+          </p:spPr>
+          <p:txBody>
+            <a:bodyPr/>
+            <a:lstStyle/>
+            <a:p>
+              <a:endParaRPr lang="en-NZ"/>
+            </a:p>
+          </p:txBody>
+        </p:sp>
+      </p:grpSp>
     </p:spTree>
     <p:extLst>
       <p:ext uri="{BB962C8B-B14F-4D97-AF65-F5344CB8AC3E}">
@@ -7316,7 +8028,7 @@
         <p:spPr>
           <a:xfrm>
             <a:off x="6096" y="6096"/>
-            <a:ext cx="9144000" cy="3916457"/>
+            <a:ext cx="9144000" cy="3531736"/>
           </a:xfrm>
           <a:prstGeom prst="rect">
             <a:avLst/>
@@ -7335,10 +8047,9 @@
           <a:p>
             <a:pPr lvl="1"/>
             <a:r>
-              <a:rPr lang="en-US" sz="3500" b="1" dirty="0" err="1" smtClean="0"/>
-              <a:t>GnomeFamily.h</a:t>
-            </a:r>
-            <a:endParaRPr lang="en-US" sz="3500" b="1" dirty="0" smtClean="0"/>
+              <a:rPr lang="en-US" sz="3500" b="1" dirty="0" smtClean="0"/>
+              <a:t>Form data members</a:t>
+            </a:r>
           </a:p>
           <a:p>
             <a:pPr lvl="1"/>
@@ -7350,23 +8061,14 @@
               <a:buChar char="•"/>
             </a:pPr>
             <a:r>
+              <a:rPr lang="en-US" sz="2500" dirty="0"/>
+              <a:t>Graphics^ mainCanvas</a:t>
+            </a:r>
+            <a:r>
               <a:rPr lang="en-US" sz="2500" dirty="0" smtClean="0"/>
-              <a:t>In C++, we need to separate the definition </a:t>
-            </a:r>
-          </a:p>
-          <a:p>
-            <a:pPr lvl="2"/>
-            <a:r>
-              <a:rPr lang="en-US" sz="2500" dirty="0" smtClean="0"/>
-              <a:t>	of our classes from the implementation of </a:t>
-            </a:r>
-          </a:p>
-          <a:p>
-            <a:pPr lvl="2"/>
-            <a:r>
-              <a:rPr lang="en-US" sz="2500" dirty="0" smtClean="0"/>
-              <a:t>	our classes.</a:t>
-            </a:r>
+              <a:t>;</a:t>
+            </a:r>
+            <a:endParaRPr lang="en-US" sz="2500" dirty="0" smtClean="0"/>
           </a:p>
           <a:p>
             <a:pPr marL="1657350" lvl="2" indent="-742950">
@@ -7375,7 +8077,7 @@
             </a:pPr>
             <a:r>
               <a:rPr lang="en-US" sz="2500" dirty="0" smtClean="0"/>
-              <a:t>Definitions go in .h</a:t>
+              <a:t>Random^ rGen;</a:t>
             </a:r>
           </a:p>
           <a:p>
@@ -7384,8 +8086,20 @@
               <a:buChar char="•"/>
             </a:pPr>
             <a:r>
-              <a:rPr lang="en-US" sz="2500" dirty="0" smtClean="0"/>
-              <a:t>Implementations go in .cpp</a:t>
+              <a:rPr lang="en-NZ" sz="2500" dirty="0" smtClean="0"/>
+              <a:t>GnomeFamily</a:t>
+            </a:r>
+            <a:r>
+              <a:rPr lang="en-NZ" sz="2500" dirty="0"/>
+              <a:t>^ </a:t>
+            </a:r>
+            <a:r>
+              <a:rPr lang="en-NZ" sz="2500" dirty="0" err="1"/>
+              <a:t>gnomeFamily</a:t>
+            </a:r>
+            <a:r>
+              <a:rPr lang="en-NZ" sz="2500" dirty="0"/>
+              <a:t>;</a:t>
             </a:r>
           </a:p>
           <a:p>
@@ -7394,16 +8108,51 @@
               <a:buChar char="•"/>
             </a:pPr>
             <a:r>
-              <a:rPr lang="en-US" sz="2500" dirty="0" smtClean="0"/>
-              <a:t>For each class, we have a .h and .cpp file</a:t>
-            </a:r>
+              <a:rPr lang="en-NZ" sz="2500" dirty="0" err="1" smtClean="0"/>
+              <a:t>int</a:t>
+            </a:r>
+            <a:r>
+              <a:rPr lang="en-NZ" sz="2500" dirty="0" smtClean="0"/>
+              <a:t> </a:t>
+            </a:r>
+            <a:r>
+              <a:rPr lang="en-NZ" sz="2500" dirty="0" err="1"/>
+              <a:t>gnomeIndex</a:t>
+            </a:r>
+            <a:r>
+              <a:rPr lang="en-NZ" sz="2500" dirty="0"/>
+              <a:t>;</a:t>
+            </a:r>
+          </a:p>
+          <a:p>
+            <a:pPr marL="1657350" lvl="2" indent="-742950">
+              <a:buFont typeface="Arial" panose="020B0604020202020204" pitchFamily="34" charset="0"/>
+              <a:buChar char="•"/>
+            </a:pPr>
+            <a:r>
+              <a:rPr lang="en-NZ" sz="2500" dirty="0" err="1" smtClean="0"/>
+              <a:t>int</a:t>
+            </a:r>
+            <a:r>
+              <a:rPr lang="en-NZ" sz="2500" dirty="0" smtClean="0"/>
+              <a:t> </a:t>
+            </a:r>
+            <a:r>
+              <a:rPr lang="en-NZ" sz="2500" dirty="0" err="1"/>
+              <a:t>hamsterCount</a:t>
+            </a:r>
+            <a:r>
+              <a:rPr lang="en-NZ" sz="2500" dirty="0" smtClean="0"/>
+              <a:t>;</a:t>
+            </a:r>
+            <a:endParaRPr lang="en-NZ" sz="2500" dirty="0"/>
           </a:p>
         </p:txBody>
       </p:sp>
     </p:spTree>
     <p:extLst>
       <p:ext uri="{BB962C8B-B14F-4D97-AF65-F5344CB8AC3E}">
-        <p14:creationId xmlns:p14="http://schemas.microsoft.com/office/powerpoint/2010/main" val="2034197569"/>
+        <p14:creationId xmlns:p14="http://schemas.microsoft.com/office/powerpoint/2010/main" val="1129090148"/>
       </p:ext>
     </p:extLst>
   </p:cSld>
@@ -7457,7 +8206,7 @@
         <p:spPr>
           <a:xfrm>
             <a:off x="6096" y="6096"/>
-            <a:ext cx="9144000" cy="3916457"/>
+            <a:ext cx="9144000" cy="4608954"/>
           </a:xfrm>
           <a:prstGeom prst="rect">
             <a:avLst/>
@@ -7476,12 +8225,8 @@
           <a:p>
             <a:pPr lvl="1"/>
             <a:r>
-              <a:rPr lang="en-US" sz="3500" b="1" dirty="0" err="1" smtClean="0"/>
-              <a:t>GnomeFamily</a:t>
-            </a:r>
-            <a:r>
               <a:rPr lang="en-US" sz="3500" b="1" dirty="0" smtClean="0"/>
-              <a:t> constructor</a:t>
+              <a:t>Form methods</a:t>
             </a:r>
           </a:p>
           <a:p>
@@ -7494,22 +8239,70 @@
               <a:buChar char="•"/>
             </a:pPr>
             <a:r>
-              <a:rPr lang="en-US" sz="2500" dirty="0" smtClean="0"/>
-              <a:t>In C++, we need to separate the definition </a:t>
-            </a:r>
-          </a:p>
-          <a:p>
-            <a:pPr lvl="2"/>
-            <a:r>
-              <a:rPr lang="en-US" sz="2500" dirty="0" smtClean="0"/>
-              <a:t>	of our classes from the implementation of </a:t>
-            </a:r>
-          </a:p>
-          <a:p>
-            <a:pPr lvl="2"/>
-            <a:r>
-              <a:rPr lang="en-US" sz="2500" dirty="0" smtClean="0"/>
-              <a:t>	our classes.</a:t>
+              <a:rPr lang="en-US" sz="2500" b="1" i="1" dirty="0" smtClean="0"/>
+              <a:t>Form load event</a:t>
+            </a:r>
+          </a:p>
+          <a:p>
+            <a:pPr marL="2114550" lvl="3" indent="-742950">
+              <a:buFont typeface="Arial" panose="020B0604020202020204" pitchFamily="34" charset="0"/>
+              <a:buChar char="•"/>
+            </a:pPr>
+            <a:r>
+              <a:rPr lang="en-US" sz="2000" dirty="0" smtClean="0"/>
+              <a:t>Position the form on the screen</a:t>
+            </a:r>
+          </a:p>
+          <a:p>
+            <a:pPr marL="2114550" lvl="3" indent="-742950">
+              <a:buFont typeface="Arial" panose="020B0604020202020204" pitchFamily="34" charset="0"/>
+              <a:buChar char="•"/>
+            </a:pPr>
+            <a:r>
+              <a:rPr lang="en-US" sz="2000" dirty="0" smtClean="0"/>
+              <a:t>Initialise </a:t>
+            </a:r>
+            <a:r>
+              <a:rPr lang="en-US" sz="2000" b="1" i="1" dirty="0" smtClean="0"/>
+              <a:t>hamsterCount</a:t>
+            </a:r>
+            <a:r>
+              <a:rPr lang="en-US" sz="2000" dirty="0" smtClean="0"/>
+              <a:t> and </a:t>
+            </a:r>
+            <a:r>
+              <a:rPr lang="en-US" sz="2000" b="1" i="1" dirty="0" smtClean="0"/>
+              <a:t>gnomeIndex</a:t>
+            </a:r>
+          </a:p>
+          <a:p>
+            <a:pPr marL="2114550" lvl="3" indent="-742950">
+              <a:buFont typeface="Arial" panose="020B0604020202020204" pitchFamily="34" charset="0"/>
+              <a:buChar char="•"/>
+            </a:pPr>
+            <a:r>
+              <a:rPr lang="en-US" sz="2000" dirty="0" smtClean="0"/>
+              <a:t>Create </a:t>
+            </a:r>
+            <a:r>
+              <a:rPr lang="en-US" sz="2000" b="1" i="1" dirty="0" smtClean="0"/>
+              <a:t>mainCanvas</a:t>
+            </a:r>
+            <a:r>
+              <a:rPr lang="en-US" sz="2000" dirty="0" smtClean="0"/>
+              <a:t>, </a:t>
+            </a:r>
+            <a:r>
+              <a:rPr lang="en-US" sz="2000" b="1" i="1" dirty="0" smtClean="0"/>
+              <a:t>rGen</a:t>
+            </a:r>
+            <a:r>
+              <a:rPr lang="en-US" sz="2000" dirty="0" smtClean="0"/>
+              <a:t> and </a:t>
+            </a:r>
+            <a:r>
+              <a:rPr lang="en-US" sz="2000" b="1" i="1" dirty="0" smtClean="0"/>
+              <a:t>gnomeFamily</a:t>
             </a:r>
           </a:p>
           <a:p>
@@ -7517,10 +8310,7 @@
               <a:buFont typeface="Arial" panose="020B0604020202020204" pitchFamily="34" charset="0"/>
               <a:buChar char="•"/>
             </a:pPr>
-            <a:r>
-              <a:rPr lang="en-US" sz="2500" dirty="0" smtClean="0"/>
-              <a:t>Definitions go in .h</a:t>
-            </a:r>
+            <a:endParaRPr lang="en-US" sz="2500" b="1" i="1" dirty="0"/>
           </a:p>
           <a:p>
             <a:pPr marL="1657350" lvl="2" indent="-742950">
@@ -7528,26 +8318,51 @@
               <a:buChar char="•"/>
             </a:pPr>
             <a:r>
-              <a:rPr lang="en-US" sz="2500" dirty="0" smtClean="0"/>
-              <a:t>Implementations go in .cpp</a:t>
-            </a:r>
-          </a:p>
-          <a:p>
-            <a:pPr marL="1657350" lvl="2" indent="-742950">
+              <a:rPr lang="en-US" sz="2500" b="1" i="1" dirty="0" smtClean="0"/>
+              <a:t>Button click event</a:t>
+            </a:r>
+          </a:p>
+          <a:p>
+            <a:pPr marL="2114550" lvl="3" indent="-742950">
               <a:buFont typeface="Arial" panose="020B0604020202020204" pitchFamily="34" charset="0"/>
               <a:buChar char="•"/>
             </a:pPr>
             <a:r>
-              <a:rPr lang="en-US" sz="2500" dirty="0" smtClean="0"/>
-              <a:t>For each class, we have a .h and .cpp file</a:t>
-            </a:r>
+              <a:rPr lang="en-US" sz="2000" dirty="0" smtClean="0"/>
+              <a:t>Reset all </a:t>
+            </a:r>
+            <a:r>
+              <a:rPr lang="en-US" sz="2000" b="1" i="1" dirty="0" smtClean="0"/>
+              <a:t>Gnomes</a:t>
+            </a:r>
+          </a:p>
+          <a:p>
+            <a:pPr marL="2114550" lvl="3" indent="-742950">
+              <a:buFont typeface="Arial" panose="020B0604020202020204" pitchFamily="34" charset="0"/>
+              <a:buChar char="•"/>
+            </a:pPr>
+            <a:r>
+              <a:rPr lang="en-US" sz="2000" dirty="0" smtClean="0"/>
+              <a:t>Set the counter back to zero</a:t>
+            </a:r>
+          </a:p>
+          <a:p>
+            <a:pPr marL="2114550" lvl="3" indent="-742950">
+              <a:buFont typeface="Arial" panose="020B0604020202020204" pitchFamily="34" charset="0"/>
+              <a:buChar char="•"/>
+            </a:pPr>
+            <a:r>
+              <a:rPr lang="en-US" sz="2000" dirty="0" smtClean="0"/>
+              <a:t>Turn on the timer</a:t>
+            </a:r>
+            <a:endParaRPr lang="en-US" sz="2000" dirty="0" smtClean="0"/>
           </a:p>
         </p:txBody>
       </p:sp>
     </p:spTree>
     <p:extLst>
       <p:ext uri="{BB962C8B-B14F-4D97-AF65-F5344CB8AC3E}">
-        <p14:creationId xmlns:p14="http://schemas.microsoft.com/office/powerpoint/2010/main" val="1873606025"/>
+        <p14:creationId xmlns:p14="http://schemas.microsoft.com/office/powerpoint/2010/main" val="1839020369"/>
       </p:ext>
     </p:extLst>
   </p:cSld>
@@ -7601,7 +8416,7 @@
         <p:spPr>
           <a:xfrm>
             <a:off x="6096" y="6096"/>
-            <a:ext cx="9144000" cy="3916457"/>
+            <a:ext cx="9144000" cy="4455066"/>
           </a:xfrm>
           <a:prstGeom prst="rect">
             <a:avLst/>
@@ -7621,7 +8436,7 @@
             <a:pPr lvl="1"/>
             <a:r>
               <a:rPr lang="en-US" sz="3500" b="1" dirty="0" smtClean="0"/>
-              <a:t>Form data members</a:t>
+              <a:t>Form methods</a:t>
             </a:r>
           </a:p>
           <a:p>
@@ -7634,60 +8449,157 @@
               <a:buChar char="•"/>
             </a:pPr>
             <a:r>
-              <a:rPr lang="en-US" sz="2500" dirty="0" smtClean="0"/>
-              <a:t>In C++, we need to separate the definition </a:t>
-            </a:r>
-          </a:p>
-          <a:p>
-            <a:pPr lvl="2"/>
-            <a:r>
-              <a:rPr lang="en-US" sz="2500" dirty="0" smtClean="0"/>
-              <a:t>	of our classes from the implementation of </a:t>
-            </a:r>
-          </a:p>
-          <a:p>
-            <a:pPr lvl="2"/>
-            <a:r>
-              <a:rPr lang="en-US" sz="2500" dirty="0" smtClean="0"/>
-              <a:t>	our classes.</a:t>
-            </a:r>
-          </a:p>
-          <a:p>
-            <a:pPr marL="1657350" lvl="2" indent="-742950">
+              <a:rPr lang="en-US" sz="2500" b="1" i="1" dirty="0" smtClean="0"/>
+              <a:t>Mouse down event</a:t>
+            </a:r>
+            <a:endParaRPr lang="en-US" sz="2500" b="1" i="1" dirty="0"/>
+          </a:p>
+          <a:p>
+            <a:pPr marL="2114550" lvl="3" indent="-742950">
               <a:buFont typeface="Arial" panose="020B0604020202020204" pitchFamily="34" charset="0"/>
               <a:buChar char="•"/>
             </a:pPr>
             <a:r>
-              <a:rPr lang="en-US" sz="2500" dirty="0" smtClean="0"/>
-              <a:t>Definitions go in .h</a:t>
-            </a:r>
-          </a:p>
-          <a:p>
-            <a:pPr marL="1657350" lvl="2" indent="-742950">
+              <a:rPr lang="en-US" sz="2000" dirty="0" smtClean="0"/>
+              <a:t>Ask the </a:t>
+            </a:r>
+            <a:r>
+              <a:rPr lang="en-US" sz="2000" b="1" i="1" dirty="0" smtClean="0"/>
+              <a:t>gnomeFamily </a:t>
+            </a:r>
+            <a:r>
+              <a:rPr lang="en-US" sz="2000" dirty="0" smtClean="0"/>
+              <a:t>if the mouse position is contained </a:t>
+            </a:r>
+          </a:p>
+          <a:p>
+            <a:pPr marL="2114550" lvl="3" indent="-742950">
               <a:buFont typeface="Arial" panose="020B0604020202020204" pitchFamily="34" charset="0"/>
               <a:buChar char="•"/>
             </a:pPr>
             <a:r>
-              <a:rPr lang="en-US" sz="2500" dirty="0" smtClean="0"/>
-              <a:t>Implementations go in .cpp</a:t>
-            </a:r>
-          </a:p>
-          <a:p>
-            <a:pPr marL="1657350" lvl="2" indent="-742950">
+              <a:rPr lang="en-US" sz="2000" dirty="0" smtClean="0"/>
+              <a:t>within the current </a:t>
+            </a:r>
+            <a:r>
+              <a:rPr lang="en-US" sz="2000" b="1" i="1" dirty="0" smtClean="0"/>
+              <a:t>gnome</a:t>
+            </a:r>
+          </a:p>
+          <a:p>
+            <a:pPr marL="2114550" lvl="3" indent="-742950">
               <a:buFont typeface="Arial" panose="020B0604020202020204" pitchFamily="34" charset="0"/>
               <a:buChar char="•"/>
             </a:pPr>
             <a:r>
-              <a:rPr lang="en-US" sz="2500" dirty="0" smtClean="0"/>
-              <a:t>For each class, we have a .h and .cpp file</a:t>
-            </a:r>
+              <a:rPr lang="en-US" sz="2000" dirty="0" smtClean="0"/>
+              <a:t>If true:</a:t>
+            </a:r>
+            <a:endParaRPr lang="en-US" sz="2000" b="1" i="1" dirty="0" smtClean="0"/>
+          </a:p>
+          <a:p>
+            <a:pPr marL="2571750" lvl="4" indent="-742950">
+              <a:buFont typeface="Arial" panose="020B0604020202020204" pitchFamily="34" charset="0"/>
+              <a:buChar char="•"/>
+            </a:pPr>
+            <a:r>
+              <a:rPr lang="en-US" sz="2000" dirty="0" smtClean="0"/>
+              <a:t>Tell the </a:t>
+            </a:r>
+            <a:r>
+              <a:rPr lang="en-US" sz="2000" b="1" i="1" dirty="0" smtClean="0"/>
+              <a:t>gnomeFamily</a:t>
+            </a:r>
+            <a:r>
+              <a:rPr lang="en-US" sz="2000" dirty="0" smtClean="0"/>
+              <a:t> to change the current </a:t>
+            </a:r>
+            <a:r>
+              <a:rPr lang="en-US" sz="2000" b="1" i="1" dirty="0" smtClean="0"/>
+              <a:t>gnomes</a:t>
+            </a:r>
+            <a:r>
+              <a:rPr lang="en-US" sz="2000" dirty="0" smtClean="0"/>
+              <a:t> </a:t>
+            </a:r>
+          </a:p>
+          <a:p>
+            <a:pPr lvl="4"/>
+            <a:r>
+              <a:rPr lang="en-US" sz="2000" dirty="0" smtClean="0"/>
+              <a:t>	image to a </a:t>
+            </a:r>
+            <a:r>
+              <a:rPr lang="en-US" sz="2000" b="1" i="1" dirty="0" smtClean="0"/>
+              <a:t>hamster</a:t>
+            </a:r>
+          </a:p>
+          <a:p>
+            <a:pPr marL="2571750" lvl="4" indent="-742950">
+              <a:buFont typeface="Arial" panose="020B0604020202020204" pitchFamily="34" charset="0"/>
+              <a:buChar char="•"/>
+            </a:pPr>
+            <a:r>
+              <a:rPr lang="en-US" sz="2000" dirty="0" smtClean="0"/>
+              <a:t>Tell the </a:t>
+            </a:r>
+            <a:r>
+              <a:rPr lang="en-US" sz="2000" b="1" i="1" dirty="0" smtClean="0"/>
+              <a:t>gnomeFamily</a:t>
+            </a:r>
+            <a:r>
+              <a:rPr lang="en-US" sz="2000" dirty="0" smtClean="0"/>
+              <a:t> to change the current </a:t>
+            </a:r>
+            <a:r>
+              <a:rPr lang="en-US" sz="2000" b="1" i="1" dirty="0" smtClean="0"/>
+              <a:t>gnomes</a:t>
+            </a:r>
+            <a:r>
+              <a:rPr lang="en-US" sz="2000" dirty="0" smtClean="0"/>
+              <a:t> </a:t>
+            </a:r>
+          </a:p>
+          <a:p>
+            <a:pPr lvl="4"/>
+            <a:r>
+              <a:rPr lang="en-US" sz="2000" dirty="0" smtClean="0"/>
+              <a:t>	</a:t>
+            </a:r>
+            <a:r>
+              <a:rPr lang="en-US" sz="2000" b="1" i="1" dirty="0" smtClean="0"/>
+              <a:t>hamster</a:t>
+            </a:r>
+            <a:r>
+              <a:rPr lang="en-US" sz="2000" dirty="0" smtClean="0"/>
+              <a:t> state</a:t>
+            </a:r>
+          </a:p>
+          <a:p>
+            <a:pPr marL="2571750" lvl="4" indent="-742950">
+              <a:buFont typeface="Arial" panose="020B0604020202020204" pitchFamily="34" charset="0"/>
+              <a:buChar char="•"/>
+            </a:pPr>
+            <a:r>
+              <a:rPr lang="en-US" sz="2000" dirty="0" smtClean="0"/>
+              <a:t>Increment the </a:t>
+            </a:r>
+            <a:r>
+              <a:rPr lang="en-US" sz="2000" b="1" i="1" dirty="0" smtClean="0"/>
+              <a:t>hamster</a:t>
+            </a:r>
+            <a:r>
+              <a:rPr lang="en-US" sz="2000" dirty="0" smtClean="0"/>
+              <a:t> count</a:t>
+            </a:r>
+            <a:endParaRPr lang="en-US" sz="2000" dirty="0"/>
           </a:p>
         </p:txBody>
       </p:sp>
     </p:spTree>
     <p:extLst>
       <p:ext uri="{BB962C8B-B14F-4D97-AF65-F5344CB8AC3E}">
-        <p14:creationId xmlns:p14="http://schemas.microsoft.com/office/powerpoint/2010/main" val="1129090148"/>
+        <p14:creationId xmlns:p14="http://schemas.microsoft.com/office/powerpoint/2010/main" val="529687714"/>
       </p:ext>
     </p:extLst>
   </p:cSld>
@@ -7741,7 +8653,7 @@
         <p:spPr>
           <a:xfrm>
             <a:off x="6096" y="6096"/>
-            <a:ext cx="9144000" cy="3916457"/>
+            <a:ext cx="9144000" cy="3839513"/>
           </a:xfrm>
           <a:prstGeom prst="rect">
             <a:avLst/>
@@ -7774,52 +8686,93 @@
               <a:buChar char="•"/>
             </a:pPr>
             <a:r>
-              <a:rPr lang="en-US" sz="2500" dirty="0" smtClean="0"/>
-              <a:t>In C++, we need to separate the definition </a:t>
-            </a:r>
-          </a:p>
-          <a:p>
-            <a:pPr lvl="2"/>
-            <a:r>
-              <a:rPr lang="en-US" sz="2500" dirty="0" smtClean="0"/>
-              <a:t>	of our classes from the implementation of </a:t>
-            </a:r>
-          </a:p>
-          <a:p>
-            <a:pPr lvl="2"/>
-            <a:r>
-              <a:rPr lang="en-US" sz="2500" dirty="0" smtClean="0"/>
-              <a:t>	our classes.</a:t>
-            </a:r>
-          </a:p>
-          <a:p>
-            <a:pPr marL="1657350" lvl="2" indent="-742950">
+              <a:rPr lang="en-US" sz="2500" b="1" i="1" dirty="0" smtClean="0"/>
+              <a:t>Timer event</a:t>
+            </a:r>
+            <a:endParaRPr lang="en-US" sz="2500" b="1" i="1" dirty="0"/>
+          </a:p>
+          <a:p>
+            <a:pPr marL="2114550" lvl="3" indent="-742950">
               <a:buFont typeface="Arial" panose="020B0604020202020204" pitchFamily="34" charset="0"/>
               <a:buChar char="•"/>
             </a:pPr>
             <a:r>
-              <a:rPr lang="en-US" sz="2500" dirty="0" smtClean="0"/>
-              <a:t>Definitions go in .h</a:t>
-            </a:r>
-          </a:p>
-          <a:p>
-            <a:pPr marL="1657350" lvl="2" indent="-742950">
+              <a:rPr lang="en-US" sz="2000" dirty="0" smtClean="0"/>
+              <a:t>Erase the current </a:t>
+            </a:r>
+            <a:r>
+              <a:rPr lang="en-US" sz="2000" b="1" i="1" dirty="0" smtClean="0"/>
+              <a:t>gnome</a:t>
+            </a:r>
+          </a:p>
+          <a:p>
+            <a:pPr marL="2114550" lvl="3" indent="-742950">
               <a:buFont typeface="Arial" panose="020B0604020202020204" pitchFamily="34" charset="0"/>
               <a:buChar char="•"/>
             </a:pPr>
             <a:r>
-              <a:rPr lang="en-US" sz="2500" dirty="0" smtClean="0"/>
-              <a:t>Implementations go in .cpp</a:t>
-            </a:r>
-          </a:p>
-          <a:p>
-            <a:pPr marL="1657350" lvl="2" indent="-742950">
+              <a:rPr lang="en-US" sz="2000" dirty="0" smtClean="0"/>
+              <a:t>Display all hamstered </a:t>
+            </a:r>
+            <a:r>
+              <a:rPr lang="en-US" sz="2000" b="1" i="1" dirty="0" smtClean="0"/>
+              <a:t>gnomes</a:t>
+            </a:r>
+          </a:p>
+          <a:p>
+            <a:pPr marL="2114550" lvl="3" indent="-742950">
               <a:buFont typeface="Arial" panose="020B0604020202020204" pitchFamily="34" charset="0"/>
               <a:buChar char="•"/>
             </a:pPr>
             <a:r>
-              <a:rPr lang="en-US" sz="2500" dirty="0" smtClean="0"/>
-              <a:t>For each class, we have a .h and .cpp file</a:t>
+              <a:rPr lang="en-US" sz="2000" dirty="0" smtClean="0"/>
+              <a:t>Select a new </a:t>
+            </a:r>
+            <a:r>
+              <a:rPr lang="en-US" sz="2000" b="1" i="1" dirty="0" smtClean="0"/>
+              <a:t>gnome</a:t>
+            </a:r>
+            <a:r>
+              <a:rPr lang="en-US" sz="2000" dirty="0" smtClean="0"/>
+              <a:t> and display</a:t>
+            </a:r>
+          </a:p>
+          <a:p>
+            <a:pPr marL="2114550" lvl="3" indent="-742950">
+              <a:buFont typeface="Arial" panose="020B0604020202020204" pitchFamily="34" charset="0"/>
+              <a:buChar char="•"/>
+            </a:pPr>
+            <a:r>
+              <a:rPr lang="en-US" sz="2000" dirty="0" smtClean="0"/>
+              <a:t>If all the </a:t>
+            </a:r>
+            <a:r>
+              <a:rPr lang="en-US" sz="2000" b="1" i="1" dirty="0" smtClean="0"/>
+              <a:t>gnomes</a:t>
+            </a:r>
+            <a:r>
+              <a:rPr lang="en-US" sz="2000" dirty="0" smtClean="0"/>
+              <a:t> have been hamstered:</a:t>
+            </a:r>
+          </a:p>
+          <a:p>
+            <a:pPr marL="2571750" lvl="4" indent="-742950">
+              <a:buFont typeface="Arial" panose="020B0604020202020204" pitchFamily="34" charset="0"/>
+              <a:buChar char="•"/>
+            </a:pPr>
+            <a:r>
+              <a:rPr lang="en-US" sz="2000" dirty="0" smtClean="0"/>
+              <a:t>Turn off the timer</a:t>
+            </a:r>
+          </a:p>
+          <a:p>
+            <a:pPr marL="2571750" lvl="4" indent="-742950">
+              <a:buFont typeface="Arial" panose="020B0604020202020204" pitchFamily="34" charset="0"/>
+              <a:buChar char="•"/>
+            </a:pPr>
+            <a:r>
+              <a:rPr lang="en-US" sz="2000" dirty="0" smtClean="0"/>
+              <a:t>Show a message</a:t>
             </a:r>
           </a:p>
         </p:txBody>
@@ -7827,430 +8780,7 @@
     </p:spTree>
     <p:extLst>
       <p:ext uri="{BB962C8B-B14F-4D97-AF65-F5344CB8AC3E}">
-        <p14:creationId xmlns:p14="http://schemas.microsoft.com/office/powerpoint/2010/main" val="1839020369"/>
-      </p:ext>
-    </p:extLst>
-  </p:cSld>
-  <p:clrMapOvr>
-    <a:masterClrMapping/>
-  </p:clrMapOvr>
-  <p:timing>
-    <p:tnLst>
-      <p:par>
-        <p:cTn id="1" dur="indefinite" restart="never" nodeType="tmRoot"/>
-      </p:par>
-    </p:tnLst>
-  </p:timing>
-</p:sld>
-</file>
-
-<file path=ppt/slides/slide24.xml><?xml version="1.0" encoding="utf-8"?>
-<p:sld xmlns:a="http://schemas.openxmlformats.org/drawingml/2006/main" xmlns:r="http://schemas.openxmlformats.org/officeDocument/2006/relationships" xmlns:p="http://schemas.openxmlformats.org/presentationml/2006/main">
-  <p:cSld>
-    <p:bg>
-      <p:bgPr>
-        <a:solidFill>
-          <a:schemeClr val="accent5">
-            <a:lumMod val="60000"/>
-            <a:lumOff val="40000"/>
-          </a:schemeClr>
-        </a:solidFill>
-        <a:effectLst/>
-      </p:bgPr>
-    </p:bg>
-    <p:spTree>
-      <p:nvGrpSpPr>
-        <p:cNvPr id="1" name=""/>
-        <p:cNvGrpSpPr/>
-        <p:nvPr/>
-      </p:nvGrpSpPr>
-      <p:grpSpPr>
-        <a:xfrm>
-          <a:off x="0" y="0"/>
-          <a:ext cx="0" cy="0"/>
-          <a:chOff x="0" y="0"/>
-          <a:chExt cx="0" cy="0"/>
-        </a:xfrm>
-      </p:grpSpPr>
-      <p:sp>
-        <p:nvSpPr>
-          <p:cNvPr id="5" name="Rectangle 4"/>
-          <p:cNvSpPr/>
-          <p:nvPr/>
-        </p:nvSpPr>
-        <p:spPr>
-          <a:xfrm>
-            <a:off x="6096" y="6096"/>
-            <a:ext cx="9144000" cy="3916457"/>
-          </a:xfrm>
-          <a:prstGeom prst="rect">
-            <a:avLst/>
-          </a:prstGeom>
-          <a:noFill/>
-        </p:spPr>
-        <p:txBody>
-          <a:bodyPr wrap="square" lIns="68580" tIns="34290" rIns="68580" bIns="34290">
-            <a:spAutoFit/>
-          </a:bodyPr>
-          <a:lstStyle/>
-          <a:p>
-            <a:pPr algn="ctr"/>
-            <a:endParaRPr lang="en-US" sz="4000" b="1" dirty="0" smtClean="0"/>
-          </a:p>
-          <a:p>
-            <a:pPr lvl="1"/>
-            <a:r>
-              <a:rPr lang="en-US" sz="3500" b="1" smtClean="0"/>
-              <a:t>Form methods</a:t>
-            </a:r>
-            <a:endParaRPr lang="en-US" sz="3500" b="1" dirty="0" smtClean="0"/>
-          </a:p>
-          <a:p>
-            <a:pPr lvl="1"/>
-            <a:endParaRPr lang="en-US" sz="2500" dirty="0" smtClean="0"/>
-          </a:p>
-          <a:p>
-            <a:pPr marL="1657350" lvl="2" indent="-742950">
-              <a:buFont typeface="Arial" panose="020B0604020202020204" pitchFamily="34" charset="0"/>
-              <a:buChar char="•"/>
-            </a:pPr>
-            <a:r>
-              <a:rPr lang="en-US" sz="2500" dirty="0" smtClean="0"/>
-              <a:t>In C++, we need to separate the definition </a:t>
-            </a:r>
-          </a:p>
-          <a:p>
-            <a:pPr lvl="2"/>
-            <a:r>
-              <a:rPr lang="en-US" sz="2500" dirty="0" smtClean="0"/>
-              <a:t>	of our classes from the implementation of </a:t>
-            </a:r>
-          </a:p>
-          <a:p>
-            <a:pPr lvl="2"/>
-            <a:r>
-              <a:rPr lang="en-US" sz="2500" dirty="0" smtClean="0"/>
-              <a:t>	our classes.</a:t>
-            </a:r>
-          </a:p>
-          <a:p>
-            <a:pPr marL="1657350" lvl="2" indent="-742950">
-              <a:buFont typeface="Arial" panose="020B0604020202020204" pitchFamily="34" charset="0"/>
-              <a:buChar char="•"/>
-            </a:pPr>
-            <a:r>
-              <a:rPr lang="en-US" sz="2500" dirty="0" smtClean="0"/>
-              <a:t>Definitions go in .h</a:t>
-            </a:r>
-          </a:p>
-          <a:p>
-            <a:pPr marL="1657350" lvl="2" indent="-742950">
-              <a:buFont typeface="Arial" panose="020B0604020202020204" pitchFamily="34" charset="0"/>
-              <a:buChar char="•"/>
-            </a:pPr>
-            <a:r>
-              <a:rPr lang="en-US" sz="2500" dirty="0" smtClean="0"/>
-              <a:t>Implementations go in .cpp</a:t>
-            </a:r>
-          </a:p>
-          <a:p>
-            <a:pPr marL="1657350" lvl="2" indent="-742950">
-              <a:buFont typeface="Arial" panose="020B0604020202020204" pitchFamily="34" charset="0"/>
-              <a:buChar char="•"/>
-            </a:pPr>
-            <a:r>
-              <a:rPr lang="en-US" sz="2500" dirty="0" smtClean="0"/>
-              <a:t>For each class, we have a .h and .cpp file</a:t>
-            </a:r>
-          </a:p>
-        </p:txBody>
-      </p:sp>
-    </p:spTree>
-    <p:extLst>
-      <p:ext uri="{BB962C8B-B14F-4D97-AF65-F5344CB8AC3E}">
-        <p14:creationId xmlns:p14="http://schemas.microsoft.com/office/powerpoint/2010/main" val="529687714"/>
-      </p:ext>
-    </p:extLst>
-  </p:cSld>
-  <p:clrMapOvr>
-    <a:masterClrMapping/>
-  </p:clrMapOvr>
-  <p:timing>
-    <p:tnLst>
-      <p:par>
-        <p:cTn id="1" dur="indefinite" restart="never" nodeType="tmRoot"/>
-      </p:par>
-    </p:tnLst>
-  </p:timing>
-</p:sld>
-</file>
-
-<file path=ppt/slides/slide25.xml><?xml version="1.0" encoding="utf-8"?>
-<p:sld xmlns:a="http://schemas.openxmlformats.org/drawingml/2006/main" xmlns:r="http://schemas.openxmlformats.org/officeDocument/2006/relationships" xmlns:p="http://schemas.openxmlformats.org/presentationml/2006/main">
-  <p:cSld>
-    <p:bg>
-      <p:bgPr>
-        <a:solidFill>
-          <a:schemeClr val="accent5">
-            <a:lumMod val="60000"/>
-            <a:lumOff val="40000"/>
-          </a:schemeClr>
-        </a:solidFill>
-        <a:effectLst/>
-      </p:bgPr>
-    </p:bg>
-    <p:spTree>
-      <p:nvGrpSpPr>
-        <p:cNvPr id="1" name=""/>
-        <p:cNvGrpSpPr/>
-        <p:nvPr/>
-      </p:nvGrpSpPr>
-      <p:grpSpPr>
-        <a:xfrm>
-          <a:off x="0" y="0"/>
-          <a:ext cx="0" cy="0"/>
-          <a:chOff x="0" y="0"/>
-          <a:chExt cx="0" cy="0"/>
-        </a:xfrm>
-      </p:grpSpPr>
-      <p:sp>
-        <p:nvSpPr>
-          <p:cNvPr id="5" name="Rectangle 4"/>
-          <p:cNvSpPr/>
-          <p:nvPr/>
-        </p:nvSpPr>
-        <p:spPr>
-          <a:xfrm>
-            <a:off x="6096" y="6096"/>
-            <a:ext cx="9144000" cy="3916457"/>
-          </a:xfrm>
-          <a:prstGeom prst="rect">
-            <a:avLst/>
-          </a:prstGeom>
-          <a:noFill/>
-        </p:spPr>
-        <p:txBody>
-          <a:bodyPr wrap="square" lIns="68580" tIns="34290" rIns="68580" bIns="34290">
-            <a:spAutoFit/>
-          </a:bodyPr>
-          <a:lstStyle/>
-          <a:p>
-            <a:pPr algn="ctr"/>
-            <a:endParaRPr lang="en-US" sz="4000" b="1" dirty="0" smtClean="0"/>
-          </a:p>
-          <a:p>
-            <a:pPr lvl="1"/>
-            <a:r>
-              <a:rPr lang="en-US" sz="3500" b="1" smtClean="0"/>
-              <a:t>Form methods</a:t>
-            </a:r>
-            <a:endParaRPr lang="en-US" sz="3500" b="1" dirty="0" smtClean="0"/>
-          </a:p>
-          <a:p>
-            <a:pPr lvl="1"/>
-            <a:endParaRPr lang="en-US" sz="2500" dirty="0" smtClean="0"/>
-          </a:p>
-          <a:p>
-            <a:pPr marL="1657350" lvl="2" indent="-742950">
-              <a:buFont typeface="Arial" panose="020B0604020202020204" pitchFamily="34" charset="0"/>
-              <a:buChar char="•"/>
-            </a:pPr>
-            <a:r>
-              <a:rPr lang="en-US" sz="2500" dirty="0" smtClean="0"/>
-              <a:t>In C++, we need to separate the definition </a:t>
-            </a:r>
-          </a:p>
-          <a:p>
-            <a:pPr lvl="2"/>
-            <a:r>
-              <a:rPr lang="en-US" sz="2500" dirty="0" smtClean="0"/>
-              <a:t>	of our classes from the implementation of </a:t>
-            </a:r>
-          </a:p>
-          <a:p>
-            <a:pPr lvl="2"/>
-            <a:r>
-              <a:rPr lang="en-US" sz="2500" dirty="0" smtClean="0"/>
-              <a:t>	our classes.</a:t>
-            </a:r>
-          </a:p>
-          <a:p>
-            <a:pPr marL="1657350" lvl="2" indent="-742950">
-              <a:buFont typeface="Arial" panose="020B0604020202020204" pitchFamily="34" charset="0"/>
-              <a:buChar char="•"/>
-            </a:pPr>
-            <a:r>
-              <a:rPr lang="en-US" sz="2500" dirty="0" smtClean="0"/>
-              <a:t>Definitions go in .h</a:t>
-            </a:r>
-          </a:p>
-          <a:p>
-            <a:pPr marL="1657350" lvl="2" indent="-742950">
-              <a:buFont typeface="Arial" panose="020B0604020202020204" pitchFamily="34" charset="0"/>
-              <a:buChar char="•"/>
-            </a:pPr>
-            <a:r>
-              <a:rPr lang="en-US" sz="2500" dirty="0" smtClean="0"/>
-              <a:t>Implementations go in .cpp</a:t>
-            </a:r>
-          </a:p>
-          <a:p>
-            <a:pPr marL="1657350" lvl="2" indent="-742950">
-              <a:buFont typeface="Arial" panose="020B0604020202020204" pitchFamily="34" charset="0"/>
-              <a:buChar char="•"/>
-            </a:pPr>
-            <a:r>
-              <a:rPr lang="en-US" sz="2500" dirty="0" smtClean="0"/>
-              <a:t>For each class, we have a .h and .cpp file</a:t>
-            </a:r>
-          </a:p>
-        </p:txBody>
-      </p:sp>
-    </p:spTree>
-    <p:extLst>
-      <p:ext uri="{BB962C8B-B14F-4D97-AF65-F5344CB8AC3E}">
-        <p14:creationId xmlns:p14="http://schemas.microsoft.com/office/powerpoint/2010/main" val="657495136"/>
-      </p:ext>
-    </p:extLst>
-  </p:cSld>
-  <p:clrMapOvr>
-    <a:masterClrMapping/>
-  </p:clrMapOvr>
-  <p:timing>
-    <p:tnLst>
-      <p:par>
-        <p:cTn id="1" dur="indefinite" restart="never" nodeType="tmRoot"/>
-      </p:par>
-    </p:tnLst>
-  </p:timing>
-</p:sld>
-</file>
-
-<file path=ppt/slides/slide26.xml><?xml version="1.0" encoding="utf-8"?>
-<p:sld xmlns:a="http://schemas.openxmlformats.org/drawingml/2006/main" xmlns:r="http://schemas.openxmlformats.org/officeDocument/2006/relationships" xmlns:p="http://schemas.openxmlformats.org/presentationml/2006/main">
-  <p:cSld>
-    <p:bg>
-      <p:bgPr>
-        <a:solidFill>
-          <a:schemeClr val="accent5">
-            <a:lumMod val="60000"/>
-            <a:lumOff val="40000"/>
-          </a:schemeClr>
-        </a:solidFill>
-        <a:effectLst/>
-      </p:bgPr>
-    </p:bg>
-    <p:spTree>
-      <p:nvGrpSpPr>
-        <p:cNvPr id="1" name=""/>
-        <p:cNvGrpSpPr/>
-        <p:nvPr/>
-      </p:nvGrpSpPr>
-      <p:grpSpPr>
-        <a:xfrm>
-          <a:off x="0" y="0"/>
-          <a:ext cx="0" cy="0"/>
-          <a:chOff x="0" y="0"/>
-          <a:chExt cx="0" cy="0"/>
-        </a:xfrm>
-      </p:grpSpPr>
-      <p:sp>
-        <p:nvSpPr>
-          <p:cNvPr id="5" name="Rectangle 4"/>
-          <p:cNvSpPr/>
-          <p:nvPr/>
-        </p:nvSpPr>
-        <p:spPr>
-          <a:xfrm>
-            <a:off x="6096" y="6096"/>
-            <a:ext cx="9144000" cy="3916457"/>
-          </a:xfrm>
-          <a:prstGeom prst="rect">
-            <a:avLst/>
-          </a:prstGeom>
-          <a:noFill/>
-        </p:spPr>
-        <p:txBody>
-          <a:bodyPr wrap="square" lIns="68580" tIns="34290" rIns="68580" bIns="34290">
-            <a:spAutoFit/>
-          </a:bodyPr>
-          <a:lstStyle/>
-          <a:p>
-            <a:pPr algn="ctr"/>
-            <a:endParaRPr lang="en-US" sz="4000" b="1" dirty="0" smtClean="0"/>
-          </a:p>
-          <a:p>
-            <a:pPr lvl="1"/>
-            <a:r>
-              <a:rPr lang="en-US" sz="3500" b="1" smtClean="0"/>
-              <a:t>Form methods</a:t>
-            </a:r>
-            <a:endParaRPr lang="en-US" sz="3500" b="1" dirty="0" smtClean="0"/>
-          </a:p>
-          <a:p>
-            <a:pPr lvl="1"/>
-            <a:endParaRPr lang="en-US" sz="2500" dirty="0" smtClean="0"/>
-          </a:p>
-          <a:p>
-            <a:pPr marL="1657350" lvl="2" indent="-742950">
-              <a:buFont typeface="Arial" panose="020B0604020202020204" pitchFamily="34" charset="0"/>
-              <a:buChar char="•"/>
-            </a:pPr>
-            <a:r>
-              <a:rPr lang="en-US" sz="2500" dirty="0" smtClean="0"/>
-              <a:t>In C++, we need to separate the definition </a:t>
-            </a:r>
-          </a:p>
-          <a:p>
-            <a:pPr lvl="2"/>
-            <a:r>
-              <a:rPr lang="en-US" sz="2500" dirty="0" smtClean="0"/>
-              <a:t>	of our classes from the implementation of </a:t>
-            </a:r>
-          </a:p>
-          <a:p>
-            <a:pPr lvl="2"/>
-            <a:r>
-              <a:rPr lang="en-US" sz="2500" dirty="0" smtClean="0"/>
-              <a:t>	our classes.</a:t>
-            </a:r>
-          </a:p>
-          <a:p>
-            <a:pPr marL="1657350" lvl="2" indent="-742950">
-              <a:buFont typeface="Arial" panose="020B0604020202020204" pitchFamily="34" charset="0"/>
-              <a:buChar char="•"/>
-            </a:pPr>
-            <a:r>
-              <a:rPr lang="en-US" sz="2500" dirty="0" smtClean="0"/>
-              <a:t>Definitions go in .h</a:t>
-            </a:r>
-          </a:p>
-          <a:p>
-            <a:pPr marL="1657350" lvl="2" indent="-742950">
-              <a:buFont typeface="Arial" panose="020B0604020202020204" pitchFamily="34" charset="0"/>
-              <a:buChar char="•"/>
-            </a:pPr>
-            <a:r>
-              <a:rPr lang="en-US" sz="2500" dirty="0" smtClean="0"/>
-              <a:t>Implementations go in .cpp</a:t>
-            </a:r>
-          </a:p>
-          <a:p>
-            <a:pPr marL="1657350" lvl="2" indent="-742950">
-              <a:buFont typeface="Arial" panose="020B0604020202020204" pitchFamily="34" charset="0"/>
-              <a:buChar char="•"/>
-            </a:pPr>
-            <a:r>
-              <a:rPr lang="en-US" sz="2500" dirty="0" smtClean="0"/>
-              <a:t>For each class, we have a .h and .cpp file</a:t>
-            </a:r>
-          </a:p>
-        </p:txBody>
-      </p:sp>
-    </p:spTree>
-    <p:extLst>
-      <p:ext uri="{BB962C8B-B14F-4D97-AF65-F5344CB8AC3E}">
-        <p14:creationId xmlns:p14="http://schemas.microsoft.com/office/powerpoint/2010/main" val="1942034479"/>
+        <p14:creationId xmlns:p14="http://schemas.microsoft.com/office/powerpoint/2010/main" val="2696006537"/>
       </p:ext>
     </p:extLst>
   </p:cSld>
@@ -8304,7 +8834,7 @@
         <p:spPr>
           <a:xfrm>
             <a:off x="6096" y="6096"/>
-            <a:ext cx="9144000" cy="3916457"/>
+            <a:ext cx="9144000" cy="1223412"/>
           </a:xfrm>
           <a:prstGeom prst="rect">
             <a:avLst/>
@@ -8324,69 +8854,46 @@
             <a:pPr lvl="1"/>
             <a:r>
               <a:rPr lang="en-US" sz="3500" b="1" dirty="0" smtClean="0"/>
-              <a:t>Example: Breakout</a:t>
-            </a:r>
-          </a:p>
-          <a:p>
-            <a:pPr lvl="1"/>
-            <a:endParaRPr lang="en-US" sz="2500" dirty="0" smtClean="0"/>
-          </a:p>
-          <a:p>
-            <a:pPr marL="1657350" lvl="2" indent="-742950">
-              <a:buFont typeface="Arial" panose="020B0604020202020204" pitchFamily="34" charset="0"/>
-              <a:buChar char="•"/>
-            </a:pPr>
-            <a:r>
-              <a:rPr lang="en-US" sz="2500" dirty="0" smtClean="0"/>
-              <a:t>In C++, we need to separate the definition </a:t>
-            </a:r>
-          </a:p>
-          <a:p>
-            <a:pPr lvl="2"/>
-            <a:r>
-              <a:rPr lang="en-US" sz="2500" dirty="0" smtClean="0"/>
-              <a:t>	of our classes from the implementation of </a:t>
-            </a:r>
-          </a:p>
-          <a:p>
-            <a:pPr lvl="2"/>
-            <a:r>
-              <a:rPr lang="en-US" sz="2500" dirty="0" smtClean="0"/>
-              <a:t>	our classes.</a:t>
-            </a:r>
-          </a:p>
-          <a:p>
-            <a:pPr marL="1657350" lvl="2" indent="-742950">
-              <a:buFont typeface="Arial" panose="020B0604020202020204" pitchFamily="34" charset="0"/>
-              <a:buChar char="•"/>
-            </a:pPr>
-            <a:r>
-              <a:rPr lang="en-US" sz="2500" dirty="0" smtClean="0"/>
-              <a:t>Definitions go in .h</a:t>
-            </a:r>
-          </a:p>
-          <a:p>
-            <a:pPr marL="1657350" lvl="2" indent="-742950">
-              <a:buFont typeface="Arial" panose="020B0604020202020204" pitchFamily="34" charset="0"/>
-              <a:buChar char="•"/>
-            </a:pPr>
-            <a:r>
-              <a:rPr lang="en-US" sz="2500" dirty="0" smtClean="0"/>
-              <a:t>Implementations go in .cpp</a:t>
-            </a:r>
-          </a:p>
-          <a:p>
-            <a:pPr marL="1657350" lvl="2" indent="-742950">
-              <a:buFont typeface="Arial" panose="020B0604020202020204" pitchFamily="34" charset="0"/>
-              <a:buChar char="•"/>
-            </a:pPr>
-            <a:r>
-              <a:rPr lang="en-US" sz="2500" dirty="0" smtClean="0"/>
-              <a:t>For each class, we have a .h and .cpp file</a:t>
-            </a:r>
-          </a:p>
-        </p:txBody>
-      </p:sp>
+              <a:t>Example: </a:t>
+            </a:r>
+            <a:r>
+              <a:rPr lang="en-US" sz="3500" b="1" dirty="0" smtClean="0"/>
+              <a:t>Breakout</a:t>
+            </a:r>
+            <a:endParaRPr lang="en-US" sz="3500" b="1" dirty="0" smtClean="0"/>
+          </a:p>
+        </p:txBody>
+      </p:sp>
+      <p:pic>
+        <p:nvPicPr>
+          <p:cNvPr id="2" name="Picture 1"/>
+          <p:cNvPicPr>
+            <a:picLocks noChangeAspect="1"/>
+          </p:cNvPicPr>
+          <p:nvPr/>
+        </p:nvPicPr>
+        <p:blipFill>
+          <a:blip r:embed="rId3" cstate="print">
+            <a:extLst>
+              <a:ext uri="{28A0092B-C50C-407E-A947-70E740481C1C}">
+                <a14:useLocalDpi xmlns:a14="http://schemas.microsoft.com/office/drawing/2010/main" val="0"/>
+              </a:ext>
+            </a:extLst>
+          </a:blip>
+          <a:stretch>
+            <a:fillRect/>
+          </a:stretch>
+        </p:blipFill>
+        <p:spPr>
+          <a:xfrm>
+            <a:off x="1061466" y="1676400"/>
+            <a:ext cx="7033260" cy="4354960"/>
+          </a:xfrm>
+          <a:prstGeom prst="rect">
+            <a:avLst/>
+          </a:prstGeom>
+        </p:spPr>
+      </p:pic>
     </p:spTree>
     <p:extLst>
       <p:ext uri="{BB962C8B-B14F-4D97-AF65-F5344CB8AC3E}">
@@ -8444,7 +8951,7 @@
         <p:spPr>
           <a:xfrm>
             <a:off x="6096" y="6096"/>
-            <a:ext cx="9144000" cy="3916457"/>
+            <a:ext cx="9144000" cy="4685898"/>
           </a:xfrm>
           <a:prstGeom prst="rect">
             <a:avLst/>
@@ -8478,21 +8985,7 @@
             </a:pPr>
             <a:r>
               <a:rPr lang="en-US" sz="2500" dirty="0" smtClean="0"/>
-              <a:t>In C++, we need to separate the definition </a:t>
-            </a:r>
-          </a:p>
-          <a:p>
-            <a:pPr lvl="2"/>
-            <a:r>
-              <a:rPr lang="en-US" sz="2500" dirty="0" smtClean="0"/>
-              <a:t>	of our classes from the implementation of </a:t>
-            </a:r>
-          </a:p>
-          <a:p>
-            <a:pPr lvl="2"/>
-            <a:r>
-              <a:rPr lang="en-US" sz="2500" dirty="0" smtClean="0"/>
-              <a:t>	our classes.</a:t>
+              <a:t>Check for user input</a:t>
             </a:r>
           </a:p>
           <a:p>
@@ -8502,7 +8995,7 @@
             </a:pPr>
             <a:r>
               <a:rPr lang="en-US" sz="2500" dirty="0" smtClean="0"/>
-              <a:t>Definitions go in .h</a:t>
+              <a:t>Update position of the paddle – user input</a:t>
             </a:r>
           </a:p>
           <a:p>
@@ -8512,7 +9005,7 @@
             </a:pPr>
             <a:r>
               <a:rPr lang="en-US" sz="2500" dirty="0" smtClean="0"/>
-              <a:t>Implementations go in .cpp</a:t>
+              <a:t>Update position of the ball – continuous motion</a:t>
             </a:r>
           </a:p>
           <a:p>
@@ -8522,8 +9015,50 @@
             </a:pPr>
             <a:r>
               <a:rPr lang="en-US" sz="2500" dirty="0" smtClean="0"/>
-              <a:t>For each class, we have a .h and .cpp file</a:t>
-            </a:r>
+              <a:t>Check collision between paddle and ball</a:t>
+            </a:r>
+          </a:p>
+          <a:p>
+            <a:pPr marL="2114550" lvl="3" indent="-742950">
+              <a:buFont typeface="Arial" panose="020B0604020202020204" pitchFamily="34" charset="0"/>
+              <a:buChar char="•"/>
+            </a:pPr>
+            <a:r>
+              <a:rPr lang="en-US" sz="2000" dirty="0" smtClean="0"/>
+              <a:t>Update state as appropriate</a:t>
+            </a:r>
+            <a:endParaRPr lang="en-US" sz="2000" dirty="0" smtClean="0"/>
+          </a:p>
+          <a:p>
+            <a:pPr marL="1657350" lvl="2" indent="-742950">
+              <a:buFont typeface="Arial" panose="020B0604020202020204" pitchFamily="34" charset="0"/>
+              <a:buChar char="•"/>
+            </a:pPr>
+            <a:r>
+              <a:rPr lang="en-US" sz="2500" dirty="0" smtClean="0"/>
+              <a:t>Check collision between ball and brick</a:t>
+            </a:r>
+          </a:p>
+          <a:p>
+            <a:pPr marL="2114550" lvl="3" indent="-742950">
+              <a:buFont typeface="Arial" panose="020B0604020202020204" pitchFamily="34" charset="0"/>
+              <a:buChar char="•"/>
+            </a:pPr>
+            <a:r>
+              <a:rPr lang="en-US" sz="2000" dirty="0" smtClean="0"/>
+              <a:t>Update state as appropriate</a:t>
+            </a:r>
+          </a:p>
+          <a:p>
+            <a:pPr marL="1657350" lvl="2" indent="-742950">
+              <a:buFont typeface="Arial" panose="020B0604020202020204" pitchFamily="34" charset="0"/>
+              <a:buChar char="•"/>
+            </a:pPr>
+            <a:r>
+              <a:rPr lang="en-US" sz="2500" dirty="0" smtClean="0"/>
+              <a:t>Redraw screen</a:t>
+            </a:r>
+            <a:endParaRPr lang="en-US" sz="2500" dirty="0" smtClean="0"/>
           </a:p>
         </p:txBody>
       </p:sp>
@@ -8584,7 +9119,7 @@
         <p:spPr>
           <a:xfrm>
             <a:off x="6096" y="6096"/>
-            <a:ext cx="9144000" cy="3916457"/>
+            <a:ext cx="9144000" cy="1223412"/>
           </a:xfrm>
           <a:prstGeom prst="rect">
             <a:avLst/>
@@ -8604,69 +9139,46 @@
             <a:pPr lvl="1"/>
             <a:r>
               <a:rPr lang="en-US" sz="3500" b="1" dirty="0" smtClean="0"/>
-              <a:t>Example: Whack-a-mole</a:t>
-            </a:r>
-          </a:p>
-          <a:p>
-            <a:pPr lvl="1"/>
-            <a:endParaRPr lang="en-US" sz="2500" dirty="0" smtClean="0"/>
-          </a:p>
-          <a:p>
-            <a:pPr marL="1657350" lvl="2" indent="-742950">
-              <a:buFont typeface="Arial" panose="020B0604020202020204" pitchFamily="34" charset="0"/>
-              <a:buChar char="•"/>
-            </a:pPr>
-            <a:r>
-              <a:rPr lang="en-US" sz="2500" dirty="0" smtClean="0"/>
-              <a:t>In C++, we need to separate the definition </a:t>
-            </a:r>
-          </a:p>
-          <a:p>
-            <a:pPr lvl="2"/>
-            <a:r>
-              <a:rPr lang="en-US" sz="2500" dirty="0" smtClean="0"/>
-              <a:t>	of our classes from the implementation of </a:t>
-            </a:r>
-          </a:p>
-          <a:p>
-            <a:pPr lvl="2"/>
-            <a:r>
-              <a:rPr lang="en-US" sz="2500" dirty="0" smtClean="0"/>
-              <a:t>	our classes.</a:t>
-            </a:r>
-          </a:p>
-          <a:p>
-            <a:pPr marL="1657350" lvl="2" indent="-742950">
-              <a:buFont typeface="Arial" panose="020B0604020202020204" pitchFamily="34" charset="0"/>
-              <a:buChar char="•"/>
-            </a:pPr>
-            <a:r>
-              <a:rPr lang="en-US" sz="2500" dirty="0" smtClean="0"/>
-              <a:t>Definitions go in .h</a:t>
-            </a:r>
-          </a:p>
-          <a:p>
-            <a:pPr marL="1657350" lvl="2" indent="-742950">
-              <a:buFont typeface="Arial" panose="020B0604020202020204" pitchFamily="34" charset="0"/>
-              <a:buChar char="•"/>
-            </a:pPr>
-            <a:r>
-              <a:rPr lang="en-US" sz="2500" dirty="0" smtClean="0"/>
-              <a:t>Implementations go in .cpp</a:t>
-            </a:r>
-          </a:p>
-          <a:p>
-            <a:pPr marL="1657350" lvl="2" indent="-742950">
-              <a:buFont typeface="Arial" panose="020B0604020202020204" pitchFamily="34" charset="0"/>
-              <a:buChar char="•"/>
-            </a:pPr>
-            <a:r>
-              <a:rPr lang="en-US" sz="2500" dirty="0" smtClean="0"/>
-              <a:t>For each class, we have a .h and .cpp file</a:t>
-            </a:r>
-          </a:p>
-        </p:txBody>
-      </p:sp>
+              <a:t>Example: </a:t>
+            </a:r>
+            <a:r>
+              <a:rPr lang="en-US" sz="3500" b="1" dirty="0" smtClean="0"/>
+              <a:t>Whack-a-mole</a:t>
+            </a:r>
+            <a:endParaRPr lang="en-US" sz="3500" b="1" dirty="0" smtClean="0"/>
+          </a:p>
+        </p:txBody>
+      </p:sp>
+      <p:pic>
+        <p:nvPicPr>
+          <p:cNvPr id="2" name="Picture 1"/>
+          <p:cNvPicPr>
+            <a:picLocks noChangeAspect="1"/>
+          </p:cNvPicPr>
+          <p:nvPr/>
+        </p:nvPicPr>
+        <p:blipFill>
+          <a:blip r:embed="rId3">
+            <a:extLst>
+              <a:ext uri="{28A0092B-C50C-407E-A947-70E740481C1C}">
+                <a14:useLocalDpi xmlns:a14="http://schemas.microsoft.com/office/drawing/2010/main" val="0"/>
+              </a:ext>
+            </a:extLst>
+          </a:blip>
+          <a:stretch>
+            <a:fillRect/>
+          </a:stretch>
+        </p:blipFill>
+        <p:spPr>
+          <a:xfrm>
+            <a:off x="1601533" y="1752600"/>
+            <a:ext cx="5953125" cy="3718952"/>
+          </a:xfrm>
+          <a:prstGeom prst="rect">
+            <a:avLst/>
+          </a:prstGeom>
+        </p:spPr>
+      </p:pic>
     </p:spTree>
     <p:extLst>
       <p:ext uri="{BB962C8B-B14F-4D97-AF65-F5344CB8AC3E}">
@@ -8724,7 +9236,7 @@
         <p:spPr>
           <a:xfrm>
             <a:off x="6096" y="6096"/>
-            <a:ext cx="9144000" cy="3916457"/>
+            <a:ext cx="9144000" cy="3531736"/>
           </a:xfrm>
           <a:prstGeom prst="rect">
             <a:avLst/>
@@ -8758,21 +9270,7 @@
             </a:pPr>
             <a:r>
               <a:rPr lang="en-US" sz="2500" dirty="0" smtClean="0"/>
-              <a:t>In C++, we need to separate the definition </a:t>
-            </a:r>
-          </a:p>
-          <a:p>
-            <a:pPr lvl="2"/>
-            <a:r>
-              <a:rPr lang="en-US" sz="2500" dirty="0" smtClean="0"/>
-              <a:t>	of our classes from the implementation of </a:t>
-            </a:r>
-          </a:p>
-          <a:p>
-            <a:pPr lvl="2"/>
-            <a:r>
-              <a:rPr lang="en-US" sz="2500" dirty="0" smtClean="0"/>
-              <a:t>	our classes.</a:t>
+              <a:t>Check for user input</a:t>
             </a:r>
           </a:p>
           <a:p>
@@ -8782,7 +9280,7 @@
             </a:pPr>
             <a:r>
               <a:rPr lang="en-US" sz="2500" dirty="0" smtClean="0"/>
-              <a:t>Definitions go in .h</a:t>
+              <a:t>Check collision between the mouse and mole</a:t>
             </a:r>
           </a:p>
           <a:p>
@@ -8792,7 +9290,7 @@
             </a:pPr>
             <a:r>
               <a:rPr lang="en-US" sz="2500" dirty="0" smtClean="0"/>
-              <a:t>Implementations go in .cpp</a:t>
+              <a:t>Update mole hit count</a:t>
             </a:r>
           </a:p>
           <a:p>
@@ -8802,8 +9300,19 @@
             </a:pPr>
             <a:r>
               <a:rPr lang="en-US" sz="2500" dirty="0" smtClean="0"/>
-              <a:t>For each class, we have a .h and .cpp file</a:t>
-            </a:r>
+              <a:t>Select new random mole and modify its visibility</a:t>
+            </a:r>
+          </a:p>
+          <a:p>
+            <a:pPr marL="1657350" lvl="2" indent="-742950">
+              <a:buFont typeface="Arial" panose="020B0604020202020204" pitchFamily="34" charset="0"/>
+              <a:buChar char="•"/>
+            </a:pPr>
+            <a:r>
+              <a:rPr lang="en-US" sz="2500" dirty="0" smtClean="0"/>
+              <a:t>Update screen</a:t>
+            </a:r>
+            <a:endParaRPr lang="en-US" sz="2500" dirty="0" smtClean="0"/>
           </a:p>
         </p:txBody>
       </p:sp>
@@ -8864,7 +9373,7 @@
         <p:spPr>
           <a:xfrm>
             <a:off x="6096" y="6096"/>
-            <a:ext cx="9144000" cy="3916457"/>
+            <a:ext cx="9144000" cy="1223412"/>
           </a:xfrm>
           <a:prstGeom prst="rect">
             <a:avLst/>
@@ -8884,69 +9393,47 @@
             <a:pPr lvl="1"/>
             <a:r>
               <a:rPr lang="en-US" sz="3500" b="1" dirty="0" smtClean="0"/>
-              <a:t>Example: World of Warcraft</a:t>
-            </a:r>
-          </a:p>
-          <a:p>
-            <a:pPr lvl="1"/>
-            <a:endParaRPr lang="en-US" sz="2500" dirty="0" smtClean="0"/>
-          </a:p>
-          <a:p>
-            <a:pPr marL="1657350" lvl="2" indent="-742950">
-              <a:buFont typeface="Arial" panose="020B0604020202020204" pitchFamily="34" charset="0"/>
-              <a:buChar char="•"/>
-            </a:pPr>
-            <a:r>
-              <a:rPr lang="en-US" sz="2500" dirty="0" smtClean="0"/>
-              <a:t>In C++, we need to separate the definition </a:t>
-            </a:r>
-          </a:p>
-          <a:p>
-            <a:pPr lvl="2"/>
-            <a:r>
-              <a:rPr lang="en-US" sz="2500" dirty="0" smtClean="0"/>
-              <a:t>	of our classes from the implementation of </a:t>
-            </a:r>
-          </a:p>
-          <a:p>
-            <a:pPr lvl="2"/>
-            <a:r>
-              <a:rPr lang="en-US" sz="2500" dirty="0" smtClean="0"/>
-              <a:t>	our classes.</a:t>
-            </a:r>
-          </a:p>
-          <a:p>
-            <a:pPr marL="1657350" lvl="2" indent="-742950">
-              <a:buFont typeface="Arial" panose="020B0604020202020204" pitchFamily="34" charset="0"/>
-              <a:buChar char="•"/>
-            </a:pPr>
-            <a:r>
-              <a:rPr lang="en-US" sz="2500" dirty="0" smtClean="0"/>
-              <a:t>Definitions go in .h</a:t>
-            </a:r>
-          </a:p>
-          <a:p>
-            <a:pPr marL="1657350" lvl="2" indent="-742950">
-              <a:buFont typeface="Arial" panose="020B0604020202020204" pitchFamily="34" charset="0"/>
-              <a:buChar char="•"/>
-            </a:pPr>
-            <a:r>
-              <a:rPr lang="en-US" sz="2500" dirty="0" smtClean="0"/>
-              <a:t>Implementations go in .cpp</a:t>
-            </a:r>
-          </a:p>
-          <a:p>
-            <a:pPr marL="1657350" lvl="2" indent="-742950">
-              <a:buFont typeface="Arial" panose="020B0604020202020204" pitchFamily="34" charset="0"/>
-              <a:buChar char="•"/>
-            </a:pPr>
-            <a:r>
-              <a:rPr lang="en-US" sz="2500" dirty="0" smtClean="0"/>
-              <a:t>For each class, we have a .h and .cpp file</a:t>
-            </a:r>
-          </a:p>
-        </p:txBody>
-      </p:sp>
+              <a:t>Example: World of </a:t>
+            </a:r>
+            <a:r>
+              <a:rPr lang="en-US" sz="3500" b="1" dirty="0" smtClean="0"/>
+              <a:t>Warcraft</a:t>
+            </a:r>
+            <a:endParaRPr lang="en-US" sz="3500" b="1" dirty="0" smtClean="0"/>
+          </a:p>
+        </p:txBody>
+      </p:sp>
+      <p:pic>
+        <p:nvPicPr>
+          <p:cNvPr id="3" name="Picture 2" descr="https://mmoexaminer.com/wp-content/uploads/2016/11/screenshot2-1200x750.jpg"/>
+          <p:cNvPicPr>
+            <a:picLocks noChangeAspect="1" noChangeArrowheads="1"/>
+          </p:cNvPicPr>
+          <p:nvPr/>
+        </p:nvPicPr>
+        <p:blipFill>
+          <a:blip r:embed="rId3" cstate="print"/>
+          <a:srcRect/>
+          <a:stretch>
+            <a:fillRect/>
+          </a:stretch>
+        </p:blipFill>
+        <p:spPr bwMode="auto">
+          <a:xfrm>
+            <a:off x="881877" y="1676400"/>
+            <a:ext cx="7392438" cy="4616152"/>
+          </a:xfrm>
+          <a:prstGeom prst="rect">
+            <a:avLst/>
+          </a:prstGeom>
+          <a:noFill/>
+          <a:ln w="28575">
+            <a:solidFill>
+              <a:schemeClr val="tx1"/>
+            </a:solidFill>
+          </a:ln>
+        </p:spPr>
+      </p:pic>
     </p:spTree>
     <p:extLst>
       <p:ext uri="{BB962C8B-B14F-4D97-AF65-F5344CB8AC3E}">
@@ -9038,21 +9525,7 @@
             </a:pPr>
             <a:r>
               <a:rPr lang="en-US" sz="2500" dirty="0" smtClean="0"/>
-              <a:t>In C++, we need to separate the definition </a:t>
-            </a:r>
-          </a:p>
-          <a:p>
-            <a:pPr lvl="2"/>
-            <a:r>
-              <a:rPr lang="en-US" sz="2500" dirty="0" smtClean="0"/>
-              <a:t>	of our classes from the implementation of </a:t>
-            </a:r>
-          </a:p>
-          <a:p>
-            <a:pPr lvl="2"/>
-            <a:r>
-              <a:rPr lang="en-US" sz="2500" dirty="0" smtClean="0"/>
-              <a:t>	our classes.</a:t>
+              <a:t>Check for all user inputs</a:t>
             </a:r>
           </a:p>
           <a:p>
@@ -9062,7 +9535,7 @@
             </a:pPr>
             <a:r>
               <a:rPr lang="en-US" sz="2500" dirty="0" smtClean="0"/>
-              <a:t>Definitions go in .h</a:t>
+              <a:t>Trigger all events</a:t>
             </a:r>
           </a:p>
           <a:p>
@@ -9072,7 +9545,7 @@
             </a:pPr>
             <a:r>
               <a:rPr lang="en-US" sz="2500" dirty="0" smtClean="0"/>
-              <a:t>Implementations go in .cpp</a:t>
+              <a:t>Update entity states</a:t>
             </a:r>
           </a:p>
           <a:p>
@@ -9082,8 +9555,29 @@
             </a:pPr>
             <a:r>
               <a:rPr lang="en-US" sz="2500" dirty="0" smtClean="0"/>
-              <a:t>For each class, we have a .h and .cpp file</a:t>
-            </a:r>
+              <a:t>Update all entity locations</a:t>
+            </a:r>
+          </a:p>
+          <a:p>
+            <a:pPr marL="1657350" lvl="2" indent="-742950">
+              <a:buFont typeface="Arial" panose="020B0604020202020204" pitchFamily="34" charset="0"/>
+              <a:buChar char="•"/>
+            </a:pPr>
+            <a:r>
+              <a:rPr lang="en-US" sz="2500" dirty="0" smtClean="0"/>
+              <a:t>Update 3D geometry</a:t>
+            </a:r>
+          </a:p>
+          <a:p>
+            <a:pPr marL="1657350" lvl="2" indent="-742950">
+              <a:buFont typeface="Arial" panose="020B0604020202020204" pitchFamily="34" charset="0"/>
+              <a:buChar char="•"/>
+            </a:pPr>
+            <a:r>
+              <a:rPr lang="en-US" sz="2500" dirty="0" smtClean="0"/>
+              <a:t>Render display</a:t>
+            </a:r>
+            <a:endParaRPr lang="en-US" sz="2500" dirty="0" smtClean="0"/>
           </a:p>
         </p:txBody>
       </p:sp>
@@ -9144,7 +9638,7 @@
         <p:spPr>
           <a:xfrm>
             <a:off x="6096" y="6096"/>
-            <a:ext cx="9144000" cy="3916457"/>
+            <a:ext cx="9144000" cy="1223412"/>
           </a:xfrm>
           <a:prstGeom prst="rect">
             <a:avLst/>
@@ -9172,69 +9666,46 @@
             </a:r>
             <a:r>
               <a:rPr lang="en-US" sz="3500" b="1" dirty="0" smtClean="0"/>
-              <a:t> Whack-a-gnome</a:t>
-            </a:r>
-          </a:p>
-          <a:p>
-            <a:pPr lvl="1"/>
-            <a:endParaRPr lang="en-US" sz="2500" dirty="0" smtClean="0"/>
-          </a:p>
-          <a:p>
-            <a:pPr marL="1657350" lvl="2" indent="-742950">
-              <a:buFont typeface="Arial" panose="020B0604020202020204" pitchFamily="34" charset="0"/>
-              <a:buChar char="•"/>
-            </a:pPr>
-            <a:r>
-              <a:rPr lang="en-US" sz="2500" dirty="0" smtClean="0"/>
-              <a:t>In C++, we need to separate the definition </a:t>
-            </a:r>
-          </a:p>
-          <a:p>
-            <a:pPr lvl="2"/>
-            <a:r>
-              <a:rPr lang="en-US" sz="2500" dirty="0" smtClean="0"/>
-              <a:t>	of our classes from the implementation of </a:t>
-            </a:r>
-          </a:p>
-          <a:p>
-            <a:pPr lvl="2"/>
-            <a:r>
-              <a:rPr lang="en-US" sz="2500" dirty="0" smtClean="0"/>
-              <a:t>	our classes.</a:t>
-            </a:r>
-          </a:p>
-          <a:p>
-            <a:pPr marL="1657350" lvl="2" indent="-742950">
-              <a:buFont typeface="Arial" panose="020B0604020202020204" pitchFamily="34" charset="0"/>
-              <a:buChar char="•"/>
-            </a:pPr>
-            <a:r>
-              <a:rPr lang="en-US" sz="2500" dirty="0" smtClean="0"/>
-              <a:t>Definitions go in .h</a:t>
-            </a:r>
-          </a:p>
-          <a:p>
-            <a:pPr marL="1657350" lvl="2" indent="-742950">
-              <a:buFont typeface="Arial" panose="020B0604020202020204" pitchFamily="34" charset="0"/>
-              <a:buChar char="•"/>
-            </a:pPr>
-            <a:r>
-              <a:rPr lang="en-US" sz="2500" dirty="0" smtClean="0"/>
-              <a:t>Implementations go in .cpp</a:t>
-            </a:r>
-          </a:p>
-          <a:p>
-            <a:pPr marL="1657350" lvl="2" indent="-742950">
-              <a:buFont typeface="Arial" panose="020B0604020202020204" pitchFamily="34" charset="0"/>
-              <a:buChar char="•"/>
-            </a:pPr>
-            <a:r>
-              <a:rPr lang="en-US" sz="2500" dirty="0" smtClean="0"/>
-              <a:t>For each class, we have a .h and .cpp file</a:t>
-            </a:r>
-          </a:p>
-        </p:txBody>
-      </p:sp>
+              <a:t> </a:t>
+            </a:r>
+            <a:r>
+              <a:rPr lang="en-US" sz="3500" b="1" dirty="0" smtClean="0"/>
+              <a:t>Whack-a-gnome</a:t>
+            </a:r>
+            <a:endParaRPr lang="en-US" sz="3500" b="1" dirty="0" smtClean="0"/>
+          </a:p>
+        </p:txBody>
+      </p:sp>
+      <p:pic>
+        <p:nvPicPr>
+          <p:cNvPr id="3" name="Picture 3"/>
+          <p:cNvPicPr>
+            <a:picLocks noChangeAspect="1" noChangeArrowheads="1"/>
+          </p:cNvPicPr>
+          <p:nvPr/>
+        </p:nvPicPr>
+        <p:blipFill rotWithShape="1">
+          <a:blip r:embed="rId3" cstate="print"/>
+          <a:srcRect l="1557" t="5248" r="1766" b="2030"/>
+          <a:stretch/>
+        </p:blipFill>
+        <p:spPr bwMode="auto">
+          <a:xfrm>
+            <a:off x="1758696" y="1752600"/>
+            <a:ext cx="5638800" cy="4038601"/>
+          </a:xfrm>
+          <a:prstGeom prst="rect">
+            <a:avLst/>
+          </a:prstGeom>
+          <a:noFill/>
+          <a:ln w="9525">
+            <a:noFill/>
+            <a:miter lim="800000"/>
+            <a:headEnd/>
+            <a:tailEnd/>
+          </a:ln>
+        </p:spPr>
+      </p:pic>
     </p:spTree>
     <p:extLst>
       <p:ext uri="{BB962C8B-B14F-4D97-AF65-F5344CB8AC3E}">

</xml_diff>

<commit_message>
Update 2.2 Event Loop PP and remove Word Doc
</commit_message>
<xml_diff>
--- a/Programming 4/02.2 Event Loops/02.2 Event Loops.pptx
+++ b/Programming 4/02.2 Event Loops/02.2 Event Loops.pptx
@@ -5,7 +5,7 @@
     <p:sldMasterId id="2147483648" r:id="rId1"/>
   </p:sldMasterIdLst>
   <p:notesMasterIdLst>
-    <p:notesMasterId r:id="rId25"/>
+    <p:notesMasterId r:id="rId26"/>
   </p:notesMasterIdLst>
   <p:sldIdLst>
     <p:sldId id="257" r:id="rId2"/>
@@ -31,6 +31,7 @@
     <p:sldId id="279" r:id="rId22"/>
     <p:sldId id="280" r:id="rId23"/>
     <p:sldId id="286" r:id="rId24"/>
+    <p:sldId id="287" r:id="rId25"/>
   </p:sldIdLst>
   <p:sldSz cx="9144000" cy="6858000" type="screen4x3"/>
   <p:notesSz cx="6858000" cy="9144000"/>
@@ -2104,6 +2105,94 @@
     <p:extLst>
       <p:ext uri="{BB962C8B-B14F-4D97-AF65-F5344CB8AC3E}">
         <p14:creationId xmlns:p14="http://schemas.microsoft.com/office/powerpoint/2010/main" val="752438484"/>
+      </p:ext>
+    </p:extLst>
+  </p:cSld>
+  <p:clrMapOvr>
+    <a:masterClrMapping/>
+  </p:clrMapOvr>
+</p:notes>
+</file>
+
+<file path=ppt/notesSlides/notesSlide23.xml><?xml version="1.0" encoding="utf-8"?>
+<p:notes xmlns:a="http://schemas.openxmlformats.org/drawingml/2006/main" xmlns:r="http://schemas.openxmlformats.org/officeDocument/2006/relationships" xmlns:p="http://schemas.openxmlformats.org/presentationml/2006/main">
+  <p:cSld>
+    <p:spTree>
+      <p:nvGrpSpPr>
+        <p:cNvPr id="1" name=""/>
+        <p:cNvGrpSpPr/>
+        <p:nvPr/>
+      </p:nvGrpSpPr>
+      <p:grpSpPr>
+        <a:xfrm>
+          <a:off x="0" y="0"/>
+          <a:ext cx="0" cy="0"/>
+          <a:chOff x="0" y="0"/>
+          <a:chExt cx="0" cy="0"/>
+        </a:xfrm>
+      </p:grpSpPr>
+      <p:sp>
+        <p:nvSpPr>
+          <p:cNvPr id="2" name="Slide Image Placeholder 1"/>
+          <p:cNvSpPr>
+            <a:spLocks noGrp="1" noRot="1" noChangeAspect="1"/>
+          </p:cNvSpPr>
+          <p:nvPr>
+            <p:ph type="sldImg"/>
+          </p:nvPr>
+        </p:nvSpPr>
+        <p:spPr/>
+      </p:sp>
+      <p:sp>
+        <p:nvSpPr>
+          <p:cNvPr id="3" name="Notes Placeholder 2"/>
+          <p:cNvSpPr>
+            <a:spLocks noGrp="1"/>
+          </p:cNvSpPr>
+          <p:nvPr>
+            <p:ph type="body" idx="1"/>
+          </p:nvPr>
+        </p:nvSpPr>
+        <p:spPr/>
+        <p:txBody>
+          <a:bodyPr/>
+          <a:lstStyle/>
+          <a:p>
+            <a:pPr marL="171450" indent="-171450">
+              <a:buFont typeface="Arial" charset="0"/>
+              <a:buChar char="•"/>
+            </a:pPr>
+            <a:endParaRPr lang="en-US" dirty="0"/>
+          </a:p>
+        </p:txBody>
+      </p:sp>
+      <p:sp>
+        <p:nvSpPr>
+          <p:cNvPr id="4" name="Slide Number Placeholder 3"/>
+          <p:cNvSpPr>
+            <a:spLocks noGrp="1"/>
+          </p:cNvSpPr>
+          <p:nvPr>
+            <p:ph type="sldNum" sz="quarter" idx="10"/>
+          </p:nvPr>
+        </p:nvSpPr>
+        <p:spPr/>
+        <p:txBody>
+          <a:bodyPr/>
+          <a:lstStyle/>
+          <a:p>
+            <a:fld id="{5FA57C19-9E0E-4142-AAC1-12A23B691F36}" type="slidenum">
+              <a:rPr lang="en-US" smtClean="0"/>
+              <a:t>24</a:t>
+            </a:fld>
+            <a:endParaRPr lang="en-US"/>
+          </a:p>
+        </p:txBody>
+      </p:sp>
+    </p:spTree>
+    <p:extLst>
+      <p:ext uri="{BB962C8B-B14F-4D97-AF65-F5344CB8AC3E}">
+        <p14:creationId xmlns:p14="http://schemas.microsoft.com/office/powerpoint/2010/main" val="923130797"/>
       </p:ext>
     </p:extLst>
   </p:cSld>
@@ -5863,7 +5952,6 @@
               <a:rPr lang="en-US" sz="3500" b="1" dirty="0" smtClean="0"/>
               <a:t>Whack-a-gnome</a:t>
             </a:r>
-            <a:endParaRPr lang="en-US" sz="3500" b="1" dirty="0" smtClean="0"/>
           </a:p>
           <a:p>
             <a:pPr lvl="1"/>
@@ -5938,7 +6026,6 @@
               <a:rPr lang="en-US" sz="2500" dirty="0" smtClean="0"/>
               <a:t>Game ends when all gnomes have been squashed</a:t>
             </a:r>
-            <a:endParaRPr lang="en-US" sz="2500" dirty="0" smtClean="0"/>
           </a:p>
         </p:txBody>
       </p:sp>
@@ -6075,7 +6162,6 @@
               <a:rPr lang="en-US" sz="2500" dirty="0" smtClean="0"/>
               <a:t>What about running the game cycle?</a:t>
             </a:r>
-            <a:endParaRPr lang="en-US" sz="2500" dirty="0" smtClean="0"/>
           </a:p>
         </p:txBody>
       </p:sp>
@@ -6295,7 +6381,6 @@
               <a:rPr lang="en-US" sz="2000" dirty="0" smtClean="0"/>
               <a:t>Determine if the mouse pointer is within its bounds</a:t>
             </a:r>
-            <a:endParaRPr lang="en-US" sz="2000" dirty="0" smtClean="0"/>
           </a:p>
         </p:txBody>
       </p:sp>
@@ -6489,13 +6574,8 @@
             <a:pPr lvl="1"/>
             <a:r>
               <a:rPr lang="en-US" sz="3500" b="1" dirty="0" smtClean="0"/>
-              <a:t>Gnome </a:t>
-            </a:r>
-            <a:r>
-              <a:rPr lang="en-US" sz="3500" b="1" dirty="0" smtClean="0"/>
-              <a:t>constructor</a:t>
-            </a:r>
-            <a:endParaRPr lang="en-US" sz="3500" b="1" dirty="0" smtClean="0"/>
+              <a:t>Gnome constructor</a:t>
+            </a:r>
           </a:p>
         </p:txBody>
       </p:sp>
@@ -6898,7 +6978,6 @@
               <a:rPr lang="en-US" sz="3500" b="1" dirty="0" smtClean="0"/>
               <a:t>GnomeFamily</a:t>
             </a:r>
-            <a:endParaRPr lang="en-US" sz="3500" b="1" dirty="0" smtClean="0"/>
           </a:p>
         </p:txBody>
       </p:sp>
@@ -7009,13 +7088,8 @@
             <a:pPr lvl="1"/>
             <a:r>
               <a:rPr lang="en-US" sz="3500" b="1" dirty="0" smtClean="0"/>
-              <a:t>GnomeFamily </a:t>
-            </a:r>
-            <a:r>
-              <a:rPr lang="en-US" sz="3500" b="1" dirty="0" smtClean="0"/>
-              <a:t>constructor</a:t>
-            </a:r>
-            <a:endParaRPr lang="en-US" sz="3500" b="1" dirty="0" smtClean="0"/>
+              <a:t>GnomeFamily constructor</a:t>
+            </a:r>
           </a:p>
         </p:txBody>
       </p:sp>
@@ -7448,13 +7522,8 @@
             <a:pPr lvl="1"/>
             <a:r>
               <a:rPr lang="en-US" sz="3500" b="1" dirty="0" smtClean="0"/>
-              <a:t>The game </a:t>
-            </a:r>
-            <a:r>
-              <a:rPr lang="en-US" sz="3500" b="1" dirty="0" smtClean="0"/>
-              <a:t>cycle</a:t>
-            </a:r>
-            <a:endParaRPr lang="en-US" sz="3500" b="1" dirty="0" smtClean="0"/>
+              <a:t>The game cycle</a:t>
+            </a:r>
           </a:p>
         </p:txBody>
       </p:sp>
@@ -8068,7 +8137,6 @@
               <a:rPr lang="en-US" sz="2500" dirty="0" smtClean="0"/>
               <a:t>;</a:t>
             </a:r>
-            <a:endParaRPr lang="en-US" sz="2500" dirty="0" smtClean="0"/>
           </a:p>
           <a:p>
             <a:pPr marL="1657350" lvl="2" indent="-742950">
@@ -8355,7 +8423,6 @@
               <a:rPr lang="en-US" sz="2000" dirty="0" smtClean="0"/>
               <a:t>Turn on the timer</a:t>
             </a:r>
-            <a:endParaRPr lang="en-US" sz="2000" dirty="0" smtClean="0"/>
           </a:p>
         </p:txBody>
       </p:sp>
@@ -8797,6 +8864,161 @@
 </p:sld>
 </file>
 
+<file path=ppt/slides/slide24.xml><?xml version="1.0" encoding="utf-8"?>
+<p:sld xmlns:a="http://schemas.openxmlformats.org/drawingml/2006/main" xmlns:r="http://schemas.openxmlformats.org/officeDocument/2006/relationships" xmlns:p="http://schemas.openxmlformats.org/presentationml/2006/main">
+  <p:cSld>
+    <p:bg>
+      <p:bgPr>
+        <a:solidFill>
+          <a:schemeClr val="accent5">
+            <a:lumMod val="60000"/>
+            <a:lumOff val="40000"/>
+          </a:schemeClr>
+        </a:solidFill>
+        <a:effectLst/>
+      </p:bgPr>
+    </p:bg>
+    <p:spTree>
+      <p:nvGrpSpPr>
+        <p:cNvPr id="1" name=""/>
+        <p:cNvGrpSpPr/>
+        <p:nvPr/>
+      </p:nvGrpSpPr>
+      <p:grpSpPr>
+        <a:xfrm>
+          <a:off x="0" y="0"/>
+          <a:ext cx="0" cy="0"/>
+          <a:chOff x="0" y="0"/>
+          <a:chExt cx="0" cy="0"/>
+        </a:xfrm>
+      </p:grpSpPr>
+      <p:sp>
+        <p:nvSpPr>
+          <p:cNvPr id="5" name="Rectangle 4"/>
+          <p:cNvSpPr/>
+          <p:nvPr/>
+        </p:nvSpPr>
+        <p:spPr>
+          <a:xfrm>
+            <a:off x="6096" y="6096"/>
+            <a:ext cx="9144000" cy="4301177"/>
+          </a:xfrm>
+          <a:prstGeom prst="rect">
+            <a:avLst/>
+          </a:prstGeom>
+          <a:noFill/>
+        </p:spPr>
+        <p:txBody>
+          <a:bodyPr wrap="square" lIns="68580" tIns="34290" rIns="68580" bIns="34290">
+            <a:spAutoFit/>
+          </a:bodyPr>
+          <a:lstStyle/>
+          <a:p>
+            <a:pPr algn="ctr"/>
+            <a:endParaRPr lang="en-US" sz="4000" b="1" dirty="0" smtClean="0"/>
+          </a:p>
+          <a:p>
+            <a:pPr lvl="1"/>
+            <a:r>
+              <a:rPr lang="en-US" sz="3500" b="1" dirty="0" smtClean="0"/>
+              <a:t>Today’s practical</a:t>
+            </a:r>
+            <a:endParaRPr lang="en-US" sz="3500" b="1" dirty="0" smtClean="0"/>
+          </a:p>
+          <a:p>
+            <a:pPr lvl="1"/>
+            <a:endParaRPr lang="en-US" sz="2500" dirty="0" smtClean="0"/>
+          </a:p>
+          <a:p>
+            <a:pPr marL="1657350" lvl="2" indent="-742950">
+              <a:buFont typeface="Arial" panose="020B0604020202020204" pitchFamily="34" charset="0"/>
+              <a:buChar char="•"/>
+            </a:pPr>
+            <a:r>
+              <a:rPr lang="en-NZ" sz="2500" dirty="0" smtClean="0"/>
+              <a:t>Use the information provided in this PowerPoint </a:t>
+            </a:r>
+          </a:p>
+          <a:p>
+            <a:pPr lvl="2"/>
+            <a:r>
+              <a:rPr lang="en-NZ" sz="2500" dirty="0"/>
+              <a:t>	</a:t>
+            </a:r>
+            <a:r>
+              <a:rPr lang="en-NZ" sz="2500" dirty="0" smtClean="0"/>
+              <a:t>to create Whack-a-gnome</a:t>
+            </a:r>
+          </a:p>
+          <a:p>
+            <a:pPr marL="1657350" lvl="2" indent="-742950">
+              <a:buFont typeface="Arial" panose="020B0604020202020204" pitchFamily="34" charset="0"/>
+              <a:buChar char="•"/>
+            </a:pPr>
+            <a:r>
+              <a:rPr lang="en-NZ" sz="2500" dirty="0" smtClean="0"/>
+              <a:t>Images are provided or you can use your own</a:t>
+            </a:r>
+          </a:p>
+          <a:p>
+            <a:pPr marL="1657350" lvl="2" indent="-742950">
+              <a:buFont typeface="Arial" panose="020B0604020202020204" pitchFamily="34" charset="0"/>
+              <a:buChar char="•"/>
+            </a:pPr>
+            <a:endParaRPr lang="en-NZ" sz="2500" dirty="0"/>
+          </a:p>
+          <a:p>
+            <a:pPr marL="1657350" lvl="2" indent="-742950">
+              <a:buFont typeface="Arial" panose="020B0604020202020204" pitchFamily="34" charset="0"/>
+              <a:buChar char="•"/>
+            </a:pPr>
+            <a:r>
+              <a:rPr lang="en-NZ" sz="2500" dirty="0" smtClean="0"/>
+              <a:t>Remember:</a:t>
+            </a:r>
+          </a:p>
+          <a:p>
+            <a:pPr marL="2114550" lvl="3" indent="-742950">
+              <a:buFont typeface="Arial" panose="020B0604020202020204" pitchFamily="34" charset="0"/>
+              <a:buChar char="•"/>
+            </a:pPr>
+            <a:r>
+              <a:rPr lang="en-NZ" sz="2000" dirty="0" smtClean="0"/>
+              <a:t>Use GitHub for development</a:t>
+            </a:r>
+          </a:p>
+          <a:p>
+            <a:pPr marL="2114550" lvl="3" indent="-742950">
+              <a:buFont typeface="Arial" panose="020B0604020202020204" pitchFamily="34" charset="0"/>
+              <a:buChar char="•"/>
+            </a:pPr>
+            <a:r>
+              <a:rPr lang="en-NZ" sz="2000" dirty="0" smtClean="0"/>
+              <a:t>Commit and push often</a:t>
+            </a:r>
+          </a:p>
+        </p:txBody>
+      </p:sp>
+    </p:spTree>
+    <p:extLst>
+      <p:ext uri="{BB962C8B-B14F-4D97-AF65-F5344CB8AC3E}">
+        <p14:creationId xmlns:p14="http://schemas.microsoft.com/office/powerpoint/2010/main" val="1893461575"/>
+      </p:ext>
+    </p:extLst>
+  </p:cSld>
+  <p:clrMapOvr>
+    <a:masterClrMapping/>
+  </p:clrMapOvr>
+  <p:timing>
+    <p:tnLst>
+      <p:par>
+        <p:cTn id="1" dur="indefinite" restart="never" nodeType="tmRoot"/>
+      </p:par>
+    </p:tnLst>
+  </p:timing>
+</p:sld>
+</file>
+
 <file path=ppt/slides/slide3.xml><?xml version="1.0" encoding="utf-8"?>
 <p:sld xmlns:a="http://schemas.openxmlformats.org/drawingml/2006/main" xmlns:r="http://schemas.openxmlformats.org/officeDocument/2006/relationships" xmlns:p="http://schemas.openxmlformats.org/presentationml/2006/main">
   <p:cSld>
@@ -8854,13 +9076,8 @@
             <a:pPr lvl="1"/>
             <a:r>
               <a:rPr lang="en-US" sz="3500" b="1" dirty="0" smtClean="0"/>
-              <a:t>Example: </a:t>
-            </a:r>
-            <a:r>
-              <a:rPr lang="en-US" sz="3500" b="1" dirty="0" smtClean="0"/>
-              <a:t>Breakout</a:t>
-            </a:r>
-            <a:endParaRPr lang="en-US" sz="3500" b="1" dirty="0" smtClean="0"/>
+              <a:t>Example: Breakout</a:t>
+            </a:r>
           </a:p>
         </p:txBody>
       </p:sp>
@@ -9027,7 +9244,6 @@
               <a:rPr lang="en-US" sz="2000" dirty="0" smtClean="0"/>
               <a:t>Update state as appropriate</a:t>
             </a:r>
-            <a:endParaRPr lang="en-US" sz="2000" dirty="0" smtClean="0"/>
           </a:p>
           <a:p>
             <a:pPr marL="1657350" lvl="2" indent="-742950">
@@ -9058,7 +9274,6 @@
               <a:rPr lang="en-US" sz="2500" dirty="0" smtClean="0"/>
               <a:t>Redraw screen</a:t>
             </a:r>
-            <a:endParaRPr lang="en-US" sz="2500" dirty="0" smtClean="0"/>
           </a:p>
         </p:txBody>
       </p:sp>
@@ -9139,13 +9354,8 @@
             <a:pPr lvl="1"/>
             <a:r>
               <a:rPr lang="en-US" sz="3500" b="1" dirty="0" smtClean="0"/>
-              <a:t>Example: </a:t>
-            </a:r>
-            <a:r>
-              <a:rPr lang="en-US" sz="3500" b="1" dirty="0" smtClean="0"/>
-              <a:t>Whack-a-mole</a:t>
-            </a:r>
-            <a:endParaRPr lang="en-US" sz="3500" b="1" dirty="0" smtClean="0"/>
+              <a:t>Example: Whack-a-mole</a:t>
+            </a:r>
           </a:p>
         </p:txBody>
       </p:sp>
@@ -9312,7 +9522,6 @@
               <a:rPr lang="en-US" sz="2500" dirty="0" smtClean="0"/>
               <a:t>Update screen</a:t>
             </a:r>
-            <a:endParaRPr lang="en-US" sz="2500" dirty="0" smtClean="0"/>
           </a:p>
         </p:txBody>
       </p:sp>
@@ -9393,13 +9602,8 @@
             <a:pPr lvl="1"/>
             <a:r>
               <a:rPr lang="en-US" sz="3500" b="1" dirty="0" smtClean="0"/>
-              <a:t>Example: World of </a:t>
-            </a:r>
-            <a:r>
-              <a:rPr lang="en-US" sz="3500" b="1" dirty="0" smtClean="0"/>
-              <a:t>Warcraft</a:t>
-            </a:r>
-            <a:endParaRPr lang="en-US" sz="3500" b="1" dirty="0" smtClean="0"/>
+              <a:t>Example: World of Warcraft</a:t>
+            </a:r>
           </a:p>
         </p:txBody>
       </p:sp>
@@ -9577,7 +9781,6 @@
               <a:rPr lang="en-US" sz="2500" dirty="0" smtClean="0"/>
               <a:t>Render display</a:t>
             </a:r>
-            <a:endParaRPr lang="en-US" sz="2500" dirty="0" smtClean="0"/>
           </a:p>
         </p:txBody>
       </p:sp>
@@ -9666,13 +9869,8 @@
             </a:r>
             <a:r>
               <a:rPr lang="en-US" sz="3500" b="1" dirty="0" smtClean="0"/>
-              <a:t> </a:t>
-            </a:r>
-            <a:r>
-              <a:rPr lang="en-US" sz="3500" b="1" dirty="0" smtClean="0"/>
-              <a:t>Whack-a-gnome</a:t>
-            </a:r>
-            <a:endParaRPr lang="en-US" sz="3500" b="1" dirty="0" smtClean="0"/>
+              <a:t> Whack-a-gnome</a:t>
+            </a:r>
           </a:p>
         </p:txBody>
       </p:sp>

</xml_diff>

<commit_message>
Update A1 - Roguelike and remove files from 3.1 Linked Lists
</commit_message>
<xml_diff>
--- a/Programming 4/02.2 Event Loops/02.2 Event Loops.pptx
+++ b/Programming 4/02.2 Event Loops/02.2 Event Loops.pptx
@@ -6764,7 +6764,11 @@
             </a:pPr>
             <a:r>
               <a:rPr lang="en-US" sz="2000" dirty="0" smtClean="0"/>
-              <a:t>A canvas to give it </a:t>
+              <a:t>A canvas to give </a:t>
+            </a:r>
+            <a:r>
+              <a:rPr lang="en-US" sz="2000" dirty="0" smtClean="0"/>
+              <a:t>its </a:t>
             </a:r>
             <a:r>
               <a:rPr lang="en-US" sz="2000" b="1" i="1" dirty="0" smtClean="0"/>
@@ -8819,8 +8823,13 @@
             </a:r>
             <a:r>
               <a:rPr lang="en-US" sz="2000" dirty="0" smtClean="0"/>
-              <a:t> have been hamstered:</a:t>
-            </a:r>
+              <a:t> have been </a:t>
+            </a:r>
+            <a:r>
+              <a:rPr lang="en-US" sz="2000" dirty="0" smtClean="0"/>
+              <a:t>squashed:</a:t>
+            </a:r>
+            <a:endParaRPr lang="en-US" sz="2000" dirty="0" smtClean="0"/>
           </a:p>
           <a:p>
             <a:pPr marL="2571750" lvl="4" indent="-742950">
@@ -8923,7 +8932,6 @@
               <a:rPr lang="en-US" sz="3500" b="1" dirty="0" smtClean="0"/>
               <a:t>Today’s practical</a:t>
             </a:r>
-            <a:endParaRPr lang="en-US" sz="3500" b="1" dirty="0" smtClean="0"/>
           </a:p>
           <a:p>
             <a:pPr lvl="1"/>

</xml_diff>

<commit_message>
Update A2 - Language Exploration (not yet completed)
</commit_message>
<xml_diff>
--- a/Programming 4/02.2 Event Loops/02.2 Event Loops.pptx
+++ b/Programming 4/02.2 Event Loops/02.2 Event Loops.pptx
@@ -231,7 +231,7 @@
           <a:p>
             <a:fld id="{0C56B87A-A3BD-4348-9EBB-BDD19D6CE714}" type="datetimeFigureOut">
               <a:rPr lang="en-US" smtClean="0"/>
-              <a:t>8/1/2019</a:t>
+              <a:t>8/2/2019</a:t>
             </a:fld>
             <a:endParaRPr lang="en-US"/>
           </a:p>
@@ -911,7 +911,105 @@
               <a:buFont typeface="Arial" charset="0"/>
               <a:buChar char="•"/>
             </a:pPr>
-            <a:endParaRPr lang="en-US" dirty="0"/>
+            <a:r>
+              <a:rPr lang="en-US" dirty="0" smtClean="0"/>
+              <a:t>Why do we need to pass in the canvas?</a:t>
+            </a:r>
+            <a:r>
+              <a:rPr lang="en-US" baseline="0" dirty="0" smtClean="0"/>
+              <a:t> Not all objects can create a drawable surface, i.e. a </a:t>
+            </a:r>
+            <a:r>
+              <a:rPr lang="en-US" b="1" baseline="0" dirty="0" smtClean="0"/>
+              <a:t>Graphics</a:t>
+            </a:r>
+            <a:r>
+              <a:rPr lang="en-US" baseline="0" dirty="0" smtClean="0"/>
+              <a:t> class instance</a:t>
+            </a:r>
+          </a:p>
+          <a:p>
+            <a:pPr marL="171450" indent="-171450">
+              <a:buFont typeface="Arial" charset="0"/>
+              <a:buChar char="•"/>
+            </a:pPr>
+            <a:endParaRPr lang="en-US" baseline="0" dirty="0" smtClean="0"/>
+          </a:p>
+          <a:p>
+            <a:pPr marL="171450" indent="-171450">
+              <a:buFont typeface="Arial" charset="0"/>
+              <a:buChar char="•"/>
+            </a:pPr>
+            <a:r>
+              <a:rPr lang="en-US" baseline="0" dirty="0" smtClean="0"/>
+              <a:t>What will we do with the image object? Draw each gnome onto the canvas by calling its </a:t>
+            </a:r>
+            <a:r>
+              <a:rPr lang="en-US" b="1" baseline="0" dirty="0" smtClean="0"/>
+              <a:t>DrawImage</a:t>
+            </a:r>
+            <a:r>
+              <a:rPr lang="en-US" baseline="0" dirty="0" smtClean="0"/>
+              <a:t> method</a:t>
+            </a:r>
+          </a:p>
+          <a:p>
+            <a:pPr marL="171450" indent="-171450">
+              <a:buFont typeface="Arial" charset="0"/>
+              <a:buChar char="•"/>
+            </a:pPr>
+            <a:endParaRPr lang="en-US" baseline="0" dirty="0" smtClean="0"/>
+          </a:p>
+          <a:p>
+            <a:pPr marL="171450" indent="-171450">
+              <a:buFont typeface="Arial" charset="0"/>
+              <a:buChar char="•"/>
+            </a:pPr>
+            <a:r>
+              <a:rPr lang="en-US" baseline="0" dirty="0" smtClean="0"/>
+              <a:t>Why do </a:t>
+            </a:r>
+            <a:r>
+              <a:rPr lang="en-US" b="1" baseline="0" dirty="0" smtClean="0"/>
+              <a:t>Draw</a:t>
+            </a:r>
+            <a:r>
+              <a:rPr lang="en-US" baseline="0" dirty="0" smtClean="0"/>
+              <a:t> and </a:t>
+            </a:r>
+            <a:r>
+              <a:rPr lang="en-US" b="1" baseline="0" dirty="0" smtClean="0"/>
+              <a:t>Erase</a:t>
+            </a:r>
+            <a:r>
+              <a:rPr lang="en-US" baseline="0" dirty="0" smtClean="0"/>
+              <a:t> not having arguments? We will draw and erase each gnome at its own X and Y position</a:t>
+            </a:r>
+          </a:p>
+          <a:p>
+            <a:pPr marL="171450" indent="-171450">
+              <a:buFont typeface="Arial" charset="0"/>
+              <a:buChar char="•"/>
+            </a:pPr>
+            <a:endParaRPr lang="en-US" baseline="0" dirty="0" smtClean="0"/>
+          </a:p>
+          <a:p>
+            <a:pPr marL="171450" indent="-171450">
+              <a:buFont typeface="Arial" charset="0"/>
+              <a:buChar char="•"/>
+            </a:pPr>
+            <a:r>
+              <a:rPr lang="en-US" baseline="0" dirty="0" smtClean="0"/>
+              <a:t>How will we write the </a:t>
+            </a:r>
+            <a:r>
+              <a:rPr lang="en-US" b="1" baseline="0" dirty="0" smtClean="0"/>
+              <a:t>PointInGnome </a:t>
+            </a:r>
+            <a:r>
+              <a:rPr lang="en-US" b="0" baseline="0" dirty="0" smtClean="0"/>
+              <a:t>method? A simple rectangular collision detection computation</a:t>
+            </a:r>
           </a:p>
         </p:txBody>
       </p:sp>
@@ -999,6 +1097,22 @@
               <a:buFont typeface="Arial" charset="0"/>
               <a:buChar char="•"/>
             </a:pPr>
+            <a:r>
+              <a:rPr lang="en-US" dirty="0" smtClean="0"/>
+              <a:t>Where does the image</a:t>
+            </a:r>
+            <a:r>
+              <a:rPr lang="en-US" baseline="0" dirty="0" smtClean="0"/>
+              <a:t>s go? If you don</a:t>
+            </a:r>
+            <a:r>
+              <a:rPr lang="mr-IN" baseline="0" dirty="0" smtClean="0"/>
+              <a:t>’</a:t>
+            </a:r>
+            <a:r>
+              <a:rPr lang="en-US" baseline="0" dirty="0" smtClean="0"/>
+              <a:t>t want to give an absolute path, you must know what the system uses for its default path. This is different C# and C++. In Visual C++, the relative path during compilation is where the .h and .cpp file are, not where the executable file is generated</a:t>
+            </a:r>
             <a:endParaRPr lang="en-US" dirty="0"/>
           </a:p>
         </p:txBody>
@@ -1087,6 +1201,171 @@
               <a:buFont typeface="Arial" charset="0"/>
               <a:buChar char="•"/>
             </a:pPr>
+            <a:r>
+              <a:rPr lang="en-US" dirty="0" smtClean="0"/>
+              <a:t>What should</a:t>
+            </a:r>
+            <a:r>
+              <a:rPr lang="en-US" baseline="0" dirty="0" smtClean="0"/>
+              <a:t> we use to hold that collection?</a:t>
+            </a:r>
+          </a:p>
+          <a:p>
+            <a:pPr marL="171450" indent="-171450">
+              <a:buFont typeface="Arial" charset="0"/>
+              <a:buChar char="•"/>
+            </a:pPr>
+            <a:endParaRPr lang="en-US" baseline="0" dirty="0" smtClean="0"/>
+          </a:p>
+          <a:p>
+            <a:pPr marL="171450" indent="-171450">
+              <a:buFont typeface="Arial" charset="0"/>
+              <a:buChar char="•"/>
+            </a:pPr>
+            <a:r>
+              <a:rPr lang="en-US" dirty="0" smtClean="0"/>
+              <a:t>You will see that the GnomeFamily methods are really just methods being called in the elements of the collection</a:t>
+            </a:r>
+          </a:p>
+          <a:p>
+            <a:pPr marL="171450" indent="-171450">
+              <a:buFont typeface="Arial" charset="0"/>
+              <a:buChar char="•"/>
+            </a:pPr>
+            <a:endParaRPr lang="en-US" dirty="0" smtClean="0"/>
+          </a:p>
+          <a:p>
+            <a:pPr marL="171450" marR="0" indent="-171450" algn="l" defTabSz="914400" rtl="0" eaLnBrk="1" fontAlgn="auto" latinLnBrk="0" hangingPunct="1">
+              <a:lnSpc>
+                <a:spcPct val="100000"/>
+              </a:lnSpc>
+              <a:spcBef>
+                <a:spcPts val="0"/>
+              </a:spcBef>
+              <a:spcAft>
+                <a:spcPts val="0"/>
+              </a:spcAft>
+              <a:buClrTx/>
+              <a:buSzTx/>
+              <a:buFont typeface="Arial" charset="0"/>
+              <a:buChar char="•"/>
+              <a:tabLst/>
+              <a:defRPr/>
+            </a:pPr>
+            <a:r>
+              <a:rPr lang="en-US" dirty="0" smtClean="0"/>
+              <a:t>For example,</a:t>
+            </a:r>
+            <a:r>
+              <a:rPr lang="en-US" baseline="0" dirty="0" smtClean="0"/>
+              <a:t> to draw all gnomes, you loop through the collection </a:t>
+            </a:r>
+            <a:r>
+              <a:rPr lang="en-US" sz="1200" kern="1200" dirty="0" smtClean="0">
+                <a:solidFill>
+                  <a:schemeClr val="tx1"/>
+                </a:solidFill>
+                <a:effectLst/>
+                <a:latin typeface="+mn-lt"/>
+                <a:ea typeface="+mn-ea"/>
+                <a:cs typeface="+mn-cs"/>
+              </a:rPr>
+              <a:t>telling each Gnome to draw itself. To draw a single gnome, you index into the collection and tell that gnome to draw itself</a:t>
+            </a:r>
+          </a:p>
+          <a:p>
+            <a:pPr marL="171450" indent="-171450">
+              <a:buFont typeface="Arial" charset="0"/>
+              <a:buChar char="•"/>
+            </a:pPr>
+            <a:endParaRPr lang="en-US" dirty="0" smtClean="0"/>
+          </a:p>
+          <a:p>
+            <a:pPr marL="171450" marR="0" indent="-171450" algn="l" defTabSz="914400" rtl="0" eaLnBrk="1" fontAlgn="auto" latinLnBrk="0" hangingPunct="1">
+              <a:lnSpc>
+                <a:spcPct val="100000"/>
+              </a:lnSpc>
+              <a:spcBef>
+                <a:spcPts val="0"/>
+              </a:spcBef>
+              <a:spcAft>
+                <a:spcPts val="0"/>
+              </a:spcAft>
+              <a:buClrTx/>
+              <a:buSzTx/>
+              <a:buFont typeface="Arial" charset="0"/>
+              <a:buChar char="•"/>
+              <a:tabLst/>
+              <a:defRPr/>
+            </a:pPr>
+            <a:r>
+              <a:rPr lang="en-US" dirty="0" smtClean="0"/>
+              <a:t>This</a:t>
+            </a:r>
+            <a:r>
+              <a:rPr lang="en-US" baseline="0" dirty="0" smtClean="0"/>
+              <a:t> </a:t>
+            </a:r>
+            <a:r>
+              <a:rPr lang="en-US" sz="1200" kern="1200" dirty="0" smtClean="0">
+                <a:solidFill>
+                  <a:schemeClr val="tx1"/>
+                </a:solidFill>
+                <a:effectLst/>
+                <a:latin typeface="+mn-lt"/>
+                <a:ea typeface="+mn-ea"/>
+                <a:cs typeface="+mn-cs"/>
+              </a:rPr>
+              <a:t>is a very common architecture: A fairly complex class, and a manager class that holds a collection of the first class and exercises its methods</a:t>
+            </a:r>
+          </a:p>
+          <a:p>
+            <a:pPr marL="171450" indent="-171450">
+              <a:buFont typeface="Arial" charset="0"/>
+              <a:buChar char="•"/>
+            </a:pPr>
+            <a:endParaRPr lang="en-US" dirty="0" smtClean="0"/>
+          </a:p>
+          <a:p>
+            <a:pPr marL="171450" marR="0" indent="-171450" algn="l" defTabSz="914400" rtl="0" eaLnBrk="1" fontAlgn="auto" latinLnBrk="0" hangingPunct="1">
+              <a:lnSpc>
+                <a:spcPct val="100000"/>
+              </a:lnSpc>
+              <a:spcBef>
+                <a:spcPts val="0"/>
+              </a:spcBef>
+              <a:spcAft>
+                <a:spcPts val="0"/>
+              </a:spcAft>
+              <a:buClrTx/>
+              <a:buSzTx/>
+              <a:buFont typeface="Arial" charset="0"/>
+              <a:buChar char="•"/>
+              <a:tabLst/>
+              <a:defRPr/>
+            </a:pPr>
+            <a:r>
+              <a:rPr lang="en-US" dirty="0" smtClean="0"/>
+              <a:t>Note </a:t>
+            </a:r>
+            <a:r>
+              <a:rPr lang="en-US" sz="1200" kern="1200" dirty="0" smtClean="0">
+                <a:solidFill>
+                  <a:schemeClr val="tx1"/>
+                </a:solidFill>
+                <a:effectLst/>
+                <a:latin typeface="+mn-lt"/>
+                <a:ea typeface="+mn-ea"/>
+                <a:cs typeface="+mn-cs"/>
+              </a:rPr>
+              <a:t>these patterns. Much of OO programming is knowing the right pattern to use</a:t>
+            </a:r>
+          </a:p>
+          <a:p>
+            <a:pPr marL="171450" indent="-171450">
+              <a:buFont typeface="Arial" charset="0"/>
+              <a:buChar char="•"/>
+            </a:pPr>
             <a:endParaRPr lang="en-US" dirty="0"/>
           </a:p>
         </p:txBody>
@@ -1175,7 +1454,14 @@
               <a:buFont typeface="Arial" charset="0"/>
               <a:buChar char="•"/>
             </a:pPr>
-            <a:endParaRPr lang="en-US" dirty="0"/>
+            <a:r>
+              <a:rPr lang="en-US" dirty="0" smtClean="0"/>
+              <a:t>Note the #include underneath</a:t>
+            </a:r>
+            <a:r>
+              <a:rPr lang="en-US" baseline="0" dirty="0" smtClean="0"/>
+              <a:t> #pragma once</a:t>
+            </a:r>
           </a:p>
         </p:txBody>
       </p:sp>
@@ -1890,6 +2176,18 @@
               <a:buFont typeface="Arial" charset="0"/>
               <a:buChar char="•"/>
             </a:pPr>
+            <a:r>
+              <a:rPr lang="en-US" dirty="0" smtClean="0"/>
+              <a:t>Note we must create </a:t>
+            </a:r>
+            <a:r>
+              <a:rPr lang="en-US" dirty="0" err="1" smtClean="0"/>
+              <a:t>gnomeFamily</a:t>
+            </a:r>
+            <a:r>
+              <a:rPr lang="en-US" dirty="0" smtClean="0"/>
+              <a:t> after the other two. Do you know why?</a:t>
+            </a:r>
             <a:endParaRPr lang="en-US" dirty="0"/>
           </a:p>
         </p:txBody>
@@ -1978,7 +2276,43 @@
               <a:buFont typeface="Arial" charset="0"/>
               <a:buChar char="•"/>
             </a:pPr>
-            <a:endParaRPr lang="en-US" dirty="0"/>
+            <a:r>
+              <a:rPr lang="en-US" dirty="0" smtClean="0"/>
+              <a:t>Mouse location has an X and Y property</a:t>
+            </a:r>
+          </a:p>
+          <a:p>
+            <a:pPr marL="171450" indent="-171450">
+              <a:buFont typeface="Arial" charset="0"/>
+              <a:buChar char="•"/>
+            </a:pPr>
+            <a:endParaRPr lang="en-US" dirty="0" smtClean="0"/>
+          </a:p>
+          <a:p>
+            <a:pPr marL="171450" indent="-171450">
+              <a:buFont typeface="Arial" charset="0"/>
+              <a:buChar char="•"/>
+            </a:pPr>
+            <a:r>
+              <a:rPr lang="en-US" dirty="0" smtClean="0"/>
+              <a:t>Do you remember how to get the </a:t>
+            </a:r>
+            <a:r>
+              <a:rPr lang="en-US" b="1" dirty="0" err="1" smtClean="0"/>
+              <a:t>MouseDown</a:t>
+            </a:r>
+            <a:r>
+              <a:rPr lang="en-US" dirty="0" smtClean="0"/>
+              <a:t> event</a:t>
+            </a:r>
+            <a:r>
+              <a:rPr lang="en-US" baseline="0" dirty="0" smtClean="0"/>
+              <a:t> handler? See the lightning bolt in the </a:t>
+            </a:r>
+            <a:r>
+              <a:rPr lang="en-US" baseline="0" smtClean="0"/>
+              <a:t>properties window</a:t>
+            </a:r>
           </a:p>
         </p:txBody>
       </p:sp>
@@ -3052,7 +3386,7 @@
           <a:p>
             <a:fld id="{F8166F1F-CE9B-4651-A6AA-CD717754106B}" type="datetimeFigureOut">
               <a:rPr lang="en-US" smtClean="0"/>
-              <a:t>8/1/2019</a:t>
+              <a:t>8/2/2019</a:t>
             </a:fld>
             <a:endParaRPr lang="en-US"/>
           </a:p>
@@ -3217,7 +3551,7 @@
           <a:p>
             <a:fld id="{A76116CE-C4A3-4A05-B2D7-7C2E9A889C0F}" type="datetimeFigureOut">
               <a:rPr lang="en-US" smtClean="0"/>
-              <a:t>8/1/2019</a:t>
+              <a:t>8/2/2019</a:t>
             </a:fld>
             <a:endParaRPr lang="en-US"/>
           </a:p>
@@ -3392,7 +3726,7 @@
           <a:p>
             <a:fld id="{A76116CE-C4A3-4A05-B2D7-7C2E9A889C0F}" type="datetimeFigureOut">
               <a:rPr lang="en-US" smtClean="0"/>
-              <a:t>8/1/2019</a:t>
+              <a:t>8/2/2019</a:t>
             </a:fld>
             <a:endParaRPr lang="en-US"/>
           </a:p>
@@ -3559,7 +3893,7 @@
           <a:p>
             <a:fld id="{A76116CE-C4A3-4A05-B2D7-7C2E9A889C0F}" type="datetimeFigureOut">
               <a:rPr lang="en-US" smtClean="0"/>
-              <a:t>8/1/2019</a:t>
+              <a:t>8/2/2019</a:t>
             </a:fld>
             <a:endParaRPr lang="en-US"/>
           </a:p>
@@ -3800,7 +4134,7 @@
           <a:p>
             <a:fld id="{A76116CE-C4A3-4A05-B2D7-7C2E9A889C0F}" type="datetimeFigureOut">
               <a:rPr lang="en-US" smtClean="0"/>
-              <a:t>8/1/2019</a:t>
+              <a:t>8/2/2019</a:t>
             </a:fld>
             <a:endParaRPr lang="en-US"/>
           </a:p>
@@ -4083,7 +4417,7 @@
           <a:p>
             <a:fld id="{A76116CE-C4A3-4A05-B2D7-7C2E9A889C0F}" type="datetimeFigureOut">
               <a:rPr lang="en-US" smtClean="0"/>
-              <a:t>8/1/2019</a:t>
+              <a:t>8/2/2019</a:t>
             </a:fld>
             <a:endParaRPr lang="en-US"/>
           </a:p>
@@ -4500,7 +4834,7 @@
           <a:p>
             <a:fld id="{A76116CE-C4A3-4A05-B2D7-7C2E9A889C0F}" type="datetimeFigureOut">
               <a:rPr lang="en-US" smtClean="0"/>
-              <a:t>8/1/2019</a:t>
+              <a:t>8/2/2019</a:t>
             </a:fld>
             <a:endParaRPr lang="en-US"/>
           </a:p>
@@ -4613,7 +4947,7 @@
           <a:p>
             <a:fld id="{A76116CE-C4A3-4A05-B2D7-7C2E9A889C0F}" type="datetimeFigureOut">
               <a:rPr lang="en-US" smtClean="0"/>
-              <a:t>8/1/2019</a:t>
+              <a:t>8/2/2019</a:t>
             </a:fld>
             <a:endParaRPr lang="en-US"/>
           </a:p>
@@ -4703,7 +5037,7 @@
           <a:p>
             <a:fld id="{A76116CE-C4A3-4A05-B2D7-7C2E9A889C0F}" type="datetimeFigureOut">
               <a:rPr lang="en-US" smtClean="0"/>
-              <a:t>8/1/2019</a:t>
+              <a:t>8/2/2019</a:t>
             </a:fld>
             <a:endParaRPr lang="en-US"/>
           </a:p>
@@ -4975,7 +5309,7 @@
           <a:p>
             <a:fld id="{A76116CE-C4A3-4A05-B2D7-7C2E9A889C0F}" type="datetimeFigureOut">
               <a:rPr lang="en-US" smtClean="0"/>
-              <a:t>8/1/2019</a:t>
+              <a:t>8/2/2019</a:t>
             </a:fld>
             <a:endParaRPr lang="en-US"/>
           </a:p>
@@ -5223,7 +5557,7 @@
           <a:p>
             <a:fld id="{A76116CE-C4A3-4A05-B2D7-7C2E9A889C0F}" type="datetimeFigureOut">
               <a:rPr lang="en-US" smtClean="0"/>
-              <a:t>8/1/2019</a:t>
+              <a:t>8/2/2019</a:t>
             </a:fld>
             <a:endParaRPr lang="en-US"/>
           </a:p>
@@ -5431,7 +5765,7 @@
           <a:p>
             <a:fld id="{F8166F1F-CE9B-4651-A6AA-CD717754106B}" type="datetimeFigureOut">
               <a:rPr lang="en-US" smtClean="0"/>
-              <a:t>8/1/2019</a:t>
+              <a:t>8/2/2019</a:t>
             </a:fld>
             <a:endParaRPr lang="en-US"/>
           </a:p>
@@ -6014,7 +6348,11 @@
             </a:pPr>
             <a:r>
               <a:rPr lang="en-US" sz="2500" dirty="0" smtClean="0"/>
-              <a:t>Count of whacked gnomes is maintained</a:t>
+              <a:t>The count of whacked gnomes is </a:t>
+            </a:r>
+            <a:r>
+              <a:rPr lang="en-US" sz="2500" dirty="0" smtClean="0"/>
+              <a:t>maintained</a:t>
             </a:r>
           </a:p>
           <a:p>
@@ -6764,11 +7102,7 @@
             </a:pPr>
             <a:r>
               <a:rPr lang="en-US" sz="2000" dirty="0" smtClean="0"/>
-              <a:t>A canvas to give </a:t>
-            </a:r>
-            <a:r>
-              <a:rPr lang="en-US" sz="2000" dirty="0" smtClean="0"/>
-              <a:t>its </a:t>
+              <a:t>A canvas to give its </a:t>
             </a:r>
             <a:r>
               <a:rPr lang="en-US" sz="2000" b="1" i="1" dirty="0" smtClean="0"/>
@@ -8373,9 +8707,10 @@
               <a:t> and </a:t>
             </a:r>
             <a:r>
-              <a:rPr lang="en-US" sz="2000" b="1" i="1" dirty="0" smtClean="0"/>
+              <a:rPr lang="en-US" sz="2000" b="1" i="1" dirty="0" err="1" smtClean="0"/>
               <a:t>gnomeFamily</a:t>
             </a:r>
+            <a:endParaRPr lang="en-US" sz="2000" b="1" i="1" dirty="0" smtClean="0"/>
           </a:p>
           <a:p>
             <a:pPr marL="1657350" lvl="2" indent="-742950">
@@ -8535,8 +8870,12 @@
               <a:t>Ask the </a:t>
             </a:r>
             <a:r>
+              <a:rPr lang="en-US" sz="2000" b="1" i="1" dirty="0" err="1" smtClean="0"/>
+              <a:t>gnomeFamily</a:t>
+            </a:r>
+            <a:r>
               <a:rPr lang="en-US" sz="2000" b="1" i="1" dirty="0" smtClean="0"/>
-              <a:t>gnomeFamily </a:t>
+              <a:t> </a:t>
             </a:r>
             <a:r>
               <a:rPr lang="en-US" sz="2000" dirty="0" smtClean="0"/>
@@ -8544,26 +8883,27 @@
             </a:r>
           </a:p>
           <a:p>
+            <a:pPr lvl="3"/>
+            <a:r>
+              <a:rPr lang="en-US" sz="2000" dirty="0" smtClean="0"/>
+              <a:t>		within </a:t>
+            </a:r>
+            <a:r>
+              <a:rPr lang="en-US" sz="2000" dirty="0" smtClean="0"/>
+              <a:t>the current </a:t>
+            </a:r>
+            <a:r>
+              <a:rPr lang="en-US" sz="2000" b="1" i="1" dirty="0" smtClean="0"/>
+              <a:t>gnome</a:t>
+            </a:r>
+          </a:p>
+          <a:p>
             <a:pPr marL="2114550" lvl="3" indent="-742950">
               <a:buFont typeface="Arial" panose="020B0604020202020204" pitchFamily="34" charset="0"/>
               <a:buChar char="•"/>
             </a:pPr>
             <a:r>
               <a:rPr lang="en-US" sz="2000" dirty="0" smtClean="0"/>
-              <a:t>within the current </a:t>
-            </a:r>
-            <a:r>
-              <a:rPr lang="en-US" sz="2000" b="1" i="1" dirty="0" smtClean="0"/>
-              <a:t>gnome</a:t>
-            </a:r>
-          </a:p>
-          <a:p>
-            <a:pPr marL="2114550" lvl="3" indent="-742950">
-              <a:buFont typeface="Arial" panose="020B0604020202020204" pitchFamily="34" charset="0"/>
-              <a:buChar char="•"/>
-            </a:pPr>
-            <a:r>
-              <a:rPr lang="en-US" sz="2000" dirty="0" smtClean="0"/>
               <a:t>If true:</a:t>
             </a:r>
             <a:endParaRPr lang="en-US" sz="2000" b="1" i="1" dirty="0" smtClean="0"/>
@@ -8578,7 +8918,7 @@
               <a:t>Tell the </a:t>
             </a:r>
             <a:r>
-              <a:rPr lang="en-US" sz="2000" b="1" i="1" dirty="0" smtClean="0"/>
+              <a:rPr lang="en-US" sz="2000" b="1" i="1" dirty="0" err="1" smtClean="0"/>
               <a:t>gnomeFamily</a:t>
             </a:r>
             <a:r>
@@ -8615,7 +8955,7 @@
               <a:t>Tell the </a:t>
             </a:r>
             <a:r>
-              <a:rPr lang="en-US" sz="2000" b="1" i="1" dirty="0" smtClean="0"/>
+              <a:rPr lang="en-US" sz="2000" b="1" i="1" dirty="0" err="1" smtClean="0"/>
               <a:t>gnomeFamily</a:t>
             </a:r>
             <a:r>
@@ -8783,7 +9123,15 @@
             </a:pPr>
             <a:r>
               <a:rPr lang="en-US" sz="2000" dirty="0" smtClean="0"/>
-              <a:t>Display all hamstered </a:t>
+              <a:t>Display </a:t>
+            </a:r>
+            <a:r>
+              <a:rPr lang="en-US" sz="2000" smtClean="0"/>
+              <a:t>all </a:t>
+            </a:r>
+            <a:r>
+              <a:rPr lang="en-US" sz="2000" smtClean="0"/>
+              <a:t>squashed  </a:t>
             </a:r>
             <a:r>
               <a:rPr lang="en-US" sz="2000" b="1" i="1" dirty="0" smtClean="0"/>
@@ -8823,13 +9171,8 @@
             </a:r>
             <a:r>
               <a:rPr lang="en-US" sz="2000" dirty="0" smtClean="0"/>
-              <a:t> have been </a:t>
-            </a:r>
-            <a:r>
-              <a:rPr lang="en-US" sz="2000" dirty="0" smtClean="0"/>
-              <a:t>squashed:</a:t>
-            </a:r>
-            <a:endParaRPr lang="en-US" sz="2000" dirty="0" smtClean="0"/>
+              <a:t> have been squashed:</a:t>
+            </a:r>
           </a:p>
           <a:p>
             <a:pPr marL="2571750" lvl="4" indent="-742950">

</xml_diff>